<commit_message>
Back to the Roots
Dom, ich hab meine Folien aus deinem Teil gelöscht und neu hochgeladen
</commit_message>
<xml_diff>
--- a/Referat_BWP_KG_dom.pptx
+++ b/Referat_BWP_KG_dom.pptx
@@ -14,9 +14,6 @@
     <p:sldId id="261" r:id="rId9"/>
     <p:sldId id="262" r:id="rId10"/>
     <p:sldId id="263" r:id="rId11"/>
-    <p:sldId id="264" r:id="rId12"/>
-    <p:sldId id="265" r:id="rId13"/>
-    <p:sldId id="266" r:id="rId14"/>
   </p:sldIdLst>
   <p:sldSz cx="9144000" cy="5143500"/>
   <p:notesSz cx="7559675" cy="10691812"/>
@@ -2768,7 +2765,7 @@
         <p:spPr>
           <a:xfrm>
             <a:off x="0" y="4824360"/>
-            <a:ext cx="9141120" cy="316080"/>
+            <a:ext cx="9140760" cy="315720"/>
           </a:xfrm>
           <a:prstGeom prst="rect">
             <a:avLst/>
@@ -2804,7 +2801,7 @@
         <p:spPr>
           <a:xfrm>
             <a:off x="8714160" y="4897080"/>
-            <a:ext cx="189000" cy="189000"/>
+            <a:ext cx="188640" cy="188640"/>
           </a:xfrm>
           <a:prstGeom prst="ellipse">
             <a:avLst/>
@@ -2840,7 +2837,7 @@
                 <a:spcPct val="100000"/>
               </a:lnSpc>
             </a:pPr>
-            <a:fld id="{CECB26BB-1909-4B62-83C1-51575620C5DE}" type="slidenum">
+            <a:fld id="{EE4DBB9D-6777-4F1C-9C26-4B57A7E443D1}" type="slidenum">
               <a:rPr b="0" lang="de-DE" sz="680" spc="-1" strike="noStrike">
                 <a:solidFill>
                   <a:srgbClr val="02d35f"/>
@@ -2869,7 +2866,7 @@
         <p:spPr>
           <a:xfrm>
             <a:off x="0" y="0"/>
-            <a:ext cx="9141120" cy="5140440"/>
+            <a:ext cx="9140760" cy="5140080"/>
           </a:xfrm>
           <a:prstGeom prst="rect">
             <a:avLst/>
@@ -2892,7 +2889,7 @@
         <p:spPr>
           <a:xfrm>
             <a:off x="7395120" y="486360"/>
-            <a:ext cx="874440" cy="530280"/>
+            <a:ext cx="874080" cy="529920"/>
           </a:xfrm>
           <a:prstGeom prst="rect">
             <a:avLst/>
@@ -3171,7 +3168,7 @@
         <p:spPr>
           <a:xfrm>
             <a:off x="0" y="4824360"/>
-            <a:ext cx="9141120" cy="316080"/>
+            <a:ext cx="9140760" cy="315720"/>
           </a:xfrm>
           <a:prstGeom prst="rect">
             <a:avLst/>
@@ -3232,7 +3229,7 @@
         <p:spPr>
           <a:xfrm>
             <a:off x="8714160" y="4897080"/>
-            <a:ext cx="189000" cy="189000"/>
+            <a:ext cx="188640" cy="188640"/>
           </a:xfrm>
           <a:prstGeom prst="ellipse">
             <a:avLst/>
@@ -3268,7 +3265,7 @@
                 <a:spcPct val="100000"/>
               </a:lnSpc>
             </a:pPr>
-            <a:fld id="{C3CC1103-6617-406B-83D6-58DE4AEB5655}" type="slidenum">
+            <a:fld id="{BCDFFFC8-C07B-4670-9B0F-2D9A35F65246}" type="slidenum">
               <a:rPr b="0" lang="de-DE" sz="680" spc="-1" strike="noStrike">
                 <a:solidFill>
                   <a:srgbClr val="02d35f"/>
@@ -3276,7 +3273,7 @@
                 <a:latin typeface="Arial"/>
                 <a:ea typeface="DejaVu Sans"/>
               </a:rPr>
-              <a:t>1</a:t>
+              <a:t>&lt;Foliennummer&gt;</a:t>
             </a:fld>
             <a:endParaRPr b="0" lang="de-DE" sz="680" spc="-1" strike="noStrike">
               <a:latin typeface="Arial"/>
@@ -3546,7 +3543,7 @@
         <p:spPr>
           <a:xfrm>
             <a:off x="867960" y="1080360"/>
-            <a:ext cx="7401600" cy="1787760"/>
+            <a:ext cx="7401240" cy="1787400"/>
           </a:xfrm>
           <a:prstGeom prst="rect">
             <a:avLst/>
@@ -3597,7 +3594,7 @@
         <p:spPr>
           <a:xfrm>
             <a:off x="867960" y="2926800"/>
-            <a:ext cx="7401600" cy="787680"/>
+            <a:ext cx="7401240" cy="787320"/>
           </a:xfrm>
           <a:prstGeom prst="rect">
             <a:avLst/>
@@ -3678,7 +3675,7 @@
         <p:spPr>
           <a:xfrm>
             <a:off x="867960" y="4218840"/>
-            <a:ext cx="3251160" cy="678960"/>
+            <a:ext cx="3250800" cy="678600"/>
           </a:xfrm>
           <a:prstGeom prst="rect">
             <a:avLst/>
@@ -3755,7 +3752,7 @@
         <p:spPr>
           <a:xfrm>
             <a:off x="7223760" y="274320"/>
-            <a:ext cx="1279440" cy="822240"/>
+            <a:ext cx="1279080" cy="821880"/>
           </a:xfrm>
           <a:prstGeom prst="rect">
             <a:avLst/>
@@ -3775,720 +3772,6 @@
           <a:effectRef idx="0"/>
           <a:fontRef idx="minor"/>
         </p:style>
-      </p:sp>
-    </p:spTree>
-  </p:cSld>
-  <mc:AlternateContent>
-    <mc:Choice Requires="p14">
-      <p:transition p14:dur="10"/>
-    </mc:Choice>
-    <mc:Fallback>
-      <p:transition/>
-    </mc:Fallback>
-  </mc:AlternateContent>
-</p:sld>
-</file>
-
-<file path=ppt/slides/slide10.xml><?xml version="1.0" encoding="utf-8"?>
-<p:sld xmlns:a="http://schemas.openxmlformats.org/drawingml/2006/main" xmlns:p="http://schemas.openxmlformats.org/presentationml/2006/main" xmlns:r="http://schemas.openxmlformats.org/officeDocument/2006/relationships" xmlns:p14="http://schemas.microsoft.com/office/powerpoint/2010/main" xmlns:p15="http://schemas.microsoft.com/office/powerpoint/2012/main" xmlns:mc="http://schemas.openxmlformats.org/markup-compatibility/2006">
-  <p:cSld>
-    <p:spTree>
-      <p:nvGrpSpPr>
-        <p:cNvPr id="1" name=""/>
-        <p:cNvGrpSpPr/>
-        <p:nvPr/>
-      </p:nvGrpSpPr>
-      <p:grpSpPr>
-        <a:xfrm>
-          <a:off x="0" y="0"/>
-          <a:ext cx="0" cy="0"/>
-          <a:chOff x="0" y="0"/>
-          <a:chExt cx="0" cy="0"/>
-        </a:xfrm>
-      </p:grpSpPr>
-      <p:sp>
-        <p:nvSpPr>
-          <p:cNvPr id="130" name="CustomShape 1"/>
-          <p:cNvSpPr/>
-          <p:nvPr/>
-        </p:nvSpPr>
-        <p:spPr>
-          <a:xfrm>
-            <a:off x="874800" y="343080"/>
-            <a:ext cx="7963200" cy="582840"/>
-          </a:xfrm>
-          <a:prstGeom prst="rect">
-            <a:avLst/>
-          </a:prstGeom>
-          <a:noFill/>
-          <a:ln>
-            <a:noFill/>
-          </a:ln>
-        </p:spPr>
-        <p:style>
-          <a:lnRef idx="0"/>
-          <a:fillRef idx="0"/>
-          <a:effectRef idx="0"/>
-          <a:fontRef idx="minor"/>
-        </p:style>
-      </p:sp>
-      <p:sp>
-        <p:nvSpPr>
-          <p:cNvPr id="131" name="CustomShape 2"/>
-          <p:cNvSpPr/>
-          <p:nvPr/>
-        </p:nvSpPr>
-        <p:spPr>
-          <a:xfrm>
-            <a:off x="874800" y="1381680"/>
-            <a:ext cx="3894120" cy="3280320"/>
-          </a:xfrm>
-          <a:prstGeom prst="rect">
-            <a:avLst/>
-          </a:prstGeom>
-          <a:noFill/>
-          <a:ln>
-            <a:noFill/>
-          </a:ln>
-        </p:spPr>
-        <p:style>
-          <a:lnRef idx="0"/>
-          <a:fillRef idx="0"/>
-          <a:effectRef idx="0"/>
-          <a:fontRef idx="minor"/>
-        </p:style>
-      </p:sp>
-      <p:sp>
-        <p:nvSpPr>
-          <p:cNvPr id="132" name="CustomShape 3"/>
-          <p:cNvSpPr/>
-          <p:nvPr/>
-        </p:nvSpPr>
-        <p:spPr>
-          <a:xfrm>
-            <a:off x="874800" y="990360"/>
-            <a:ext cx="3894120" cy="325800"/>
-          </a:xfrm>
-          <a:prstGeom prst="rect">
-            <a:avLst/>
-          </a:prstGeom>
-          <a:noFill/>
-          <a:ln>
-            <a:noFill/>
-          </a:ln>
-        </p:spPr>
-        <p:style>
-          <a:lnRef idx="0"/>
-          <a:fillRef idx="0"/>
-          <a:effectRef idx="0"/>
-          <a:fontRef idx="minor"/>
-        </p:style>
-      </p:sp>
-      <p:sp>
-        <p:nvSpPr>
-          <p:cNvPr id="133" name="CustomShape 4"/>
-          <p:cNvSpPr/>
-          <p:nvPr/>
-        </p:nvSpPr>
-        <p:spPr>
-          <a:xfrm>
-            <a:off x="4943520" y="1382400"/>
-            <a:ext cx="3897720" cy="3280320"/>
-          </a:xfrm>
-          <a:prstGeom prst="rect">
-            <a:avLst/>
-          </a:prstGeom>
-          <a:noFill/>
-          <a:ln>
-            <a:noFill/>
-          </a:ln>
-        </p:spPr>
-        <p:style>
-          <a:lnRef idx="0"/>
-          <a:fillRef idx="0"/>
-          <a:effectRef idx="0"/>
-          <a:fontRef idx="minor"/>
-        </p:style>
-      </p:sp>
-      <p:sp>
-        <p:nvSpPr>
-          <p:cNvPr id="134" name="CustomShape 5"/>
-          <p:cNvSpPr/>
-          <p:nvPr/>
-        </p:nvSpPr>
-        <p:spPr>
-          <a:xfrm>
-            <a:off x="4943520" y="990360"/>
-            <a:ext cx="3897720" cy="325800"/>
-          </a:xfrm>
-          <a:prstGeom prst="rect">
-            <a:avLst/>
-          </a:prstGeom>
-          <a:noFill/>
-          <a:ln>
-            <a:noFill/>
-          </a:ln>
-        </p:spPr>
-        <p:style>
-          <a:lnRef idx="0"/>
-          <a:fillRef idx="0"/>
-          <a:effectRef idx="0"/>
-          <a:fontRef idx="minor"/>
-        </p:style>
-      </p:sp>
-      <p:sp>
-        <p:nvSpPr>
-          <p:cNvPr id="135" name="CustomShape 6"/>
-          <p:cNvSpPr/>
-          <p:nvPr/>
-        </p:nvSpPr>
-        <p:spPr>
-          <a:xfrm>
-            <a:off x="874800" y="343080"/>
-            <a:ext cx="7963200" cy="582840"/>
-          </a:xfrm>
-          <a:prstGeom prst="rect">
-            <a:avLst/>
-          </a:prstGeom>
-          <a:noFill/>
-          <a:ln>
-            <a:noFill/>
-          </a:ln>
-        </p:spPr>
-        <p:style>
-          <a:lnRef idx="0"/>
-          <a:fillRef idx="0"/>
-          <a:effectRef idx="0"/>
-          <a:fontRef idx="minor"/>
-        </p:style>
-        <p:txBody>
-          <a:bodyPr lIns="90000" rIns="90000" tIns="45000" bIns="45000" anchor="ctr">
-            <a:noAutofit/>
-          </a:bodyPr>
-          <a:p>
-            <a:pPr>
-              <a:lnSpc>
-                <a:spcPts val="2520"/>
-              </a:lnSpc>
-            </a:pPr>
-            <a:r>
-              <a:rPr b="1" lang="de-DE" sz="2800" spc="-1" strike="noStrike">
-                <a:solidFill>
-                  <a:srgbClr val="003259"/>
-                </a:solidFill>
-                <a:latin typeface="Arial"/>
-                <a:ea typeface="DejaVu Sans"/>
-              </a:rPr>
-              <a:t>Verlustverteilung</a:t>
-            </a:r>
-            <a:endParaRPr b="0" lang="de-DE" sz="2800" spc="-1" strike="noStrike">
-              <a:latin typeface="Arial"/>
-            </a:endParaRPr>
-          </a:p>
-        </p:txBody>
-      </p:sp>
-      <p:sp>
-        <p:nvSpPr>
-          <p:cNvPr id="136" name="CustomShape 7"/>
-          <p:cNvSpPr/>
-          <p:nvPr/>
-        </p:nvSpPr>
-        <p:spPr>
-          <a:xfrm>
-            <a:off x="822960" y="1188720"/>
-            <a:ext cx="7131600" cy="1881360"/>
-          </a:xfrm>
-          <a:prstGeom prst="rect">
-            <a:avLst/>
-          </a:prstGeom>
-          <a:noFill/>
-          <a:ln>
-            <a:noFill/>
-          </a:ln>
-        </p:spPr>
-        <p:style>
-          <a:lnRef idx="0"/>
-          <a:fillRef idx="0"/>
-          <a:effectRef idx="0"/>
-          <a:fontRef idx="minor"/>
-        </p:style>
-        <p:txBody>
-          <a:bodyPr lIns="90000" rIns="90000" tIns="45000" bIns="45000">
-            <a:noAutofit/>
-          </a:bodyPr>
-          <a:p>
-            <a:pPr>
-              <a:lnSpc>
-                <a:spcPct val="100000"/>
-              </a:lnSpc>
-            </a:pPr>
-            <a:r>
-              <a:rPr b="0" lang="de-DE" sz="1800" spc="-1" strike="noStrike">
-                <a:solidFill>
-                  <a:srgbClr val="000000"/>
-                </a:solidFill>
-                <a:latin typeface="Arial"/>
-                <a:ea typeface="DejaVu Sans"/>
-              </a:rPr>
-              <a:t>- Verluste werden wie Gewinne verteilt</a:t>
-            </a:r>
-            <a:endParaRPr b="0" lang="de-DE" sz="1800" spc="-1" strike="noStrike">
-              <a:latin typeface="Arial"/>
-            </a:endParaRPr>
-          </a:p>
-          <a:p>
-            <a:pPr>
-              <a:lnSpc>
-                <a:spcPct val="100000"/>
-              </a:lnSpc>
-            </a:pPr>
-            <a:endParaRPr b="0" lang="de-DE" sz="1800" spc="-1" strike="noStrike">
-              <a:latin typeface="Arial"/>
-            </a:endParaRPr>
-          </a:p>
-          <a:p>
-            <a:pPr>
-              <a:lnSpc>
-                <a:spcPct val="100000"/>
-              </a:lnSpc>
-            </a:pPr>
-            <a:r>
-              <a:rPr b="0" lang="de-DE" sz="1800" spc="-1" strike="noStrike">
-                <a:solidFill>
-                  <a:srgbClr val="000000"/>
-                </a:solidFill>
-                <a:latin typeface="Arial"/>
-                <a:ea typeface="DejaVu Sans"/>
-              </a:rPr>
-              <a:t>- Kommanditisten haften maximal mit Höhe ihrer Kapitaleinlagen</a:t>
-            </a:r>
-            <a:endParaRPr b="0" lang="de-DE" sz="1800" spc="-1" strike="noStrike">
-              <a:latin typeface="Arial"/>
-            </a:endParaRPr>
-          </a:p>
-          <a:p>
-            <a:pPr>
-              <a:lnSpc>
-                <a:spcPct val="100000"/>
-              </a:lnSpc>
-            </a:pPr>
-            <a:endParaRPr b="0" lang="de-DE" sz="1800" spc="-1" strike="noStrike">
-              <a:latin typeface="Arial"/>
-            </a:endParaRPr>
-          </a:p>
-          <a:p>
-            <a:pPr>
-              <a:lnSpc>
-                <a:spcPct val="100000"/>
-              </a:lnSpc>
-            </a:pPr>
-            <a:r>
-              <a:rPr b="0" lang="de-DE" sz="1800" spc="-1" strike="noStrike">
-                <a:solidFill>
-                  <a:srgbClr val="000000"/>
-                </a:solidFill>
-                <a:latin typeface="Arial"/>
-                <a:ea typeface="DejaVu Sans"/>
-              </a:rPr>
-              <a:t>- Komplementäre haften unbeschränkt</a:t>
-            </a:r>
-            <a:endParaRPr b="0" lang="de-DE" sz="1800" spc="-1" strike="noStrike">
-              <a:latin typeface="Arial"/>
-            </a:endParaRPr>
-          </a:p>
-          <a:p>
-            <a:pPr>
-              <a:lnSpc>
-                <a:spcPct val="100000"/>
-              </a:lnSpc>
-            </a:pPr>
-            <a:endParaRPr b="0" lang="de-DE" sz="1800" spc="-1" strike="noStrike">
-              <a:latin typeface="Arial"/>
-            </a:endParaRPr>
-          </a:p>
-          <a:p>
-            <a:pPr>
-              <a:lnSpc>
-                <a:spcPct val="100000"/>
-              </a:lnSpc>
-            </a:pPr>
-            <a:endParaRPr b="0" lang="de-DE" sz="1800" spc="-1" strike="noStrike">
-              <a:latin typeface="Arial"/>
-            </a:endParaRPr>
-          </a:p>
-        </p:txBody>
-      </p:sp>
-    </p:spTree>
-  </p:cSld>
-  <mc:AlternateContent>
-    <mc:Choice Requires="p14">
-      <p:transition p14:dur="10"/>
-    </mc:Choice>
-    <mc:Fallback>
-      <p:transition/>
-    </mc:Fallback>
-  </mc:AlternateContent>
-</p:sld>
-</file>
-
-<file path=ppt/slides/slide11.xml><?xml version="1.0" encoding="utf-8"?>
-<p:sld xmlns:a="http://schemas.openxmlformats.org/drawingml/2006/main" xmlns:p="http://schemas.openxmlformats.org/presentationml/2006/main" xmlns:r="http://schemas.openxmlformats.org/officeDocument/2006/relationships" xmlns:p14="http://schemas.microsoft.com/office/powerpoint/2010/main" xmlns:p15="http://schemas.microsoft.com/office/powerpoint/2012/main" xmlns:mc="http://schemas.openxmlformats.org/markup-compatibility/2006">
-  <p:cSld>
-    <p:spTree>
-      <p:nvGrpSpPr>
-        <p:cNvPr id="1" name=""/>
-        <p:cNvGrpSpPr/>
-        <p:nvPr/>
-      </p:nvGrpSpPr>
-      <p:grpSpPr>
-        <a:xfrm>
-          <a:off x="0" y="0"/>
-          <a:ext cx="0" cy="0"/>
-          <a:chOff x="0" y="0"/>
-          <a:chExt cx="0" cy="0"/>
-        </a:xfrm>
-      </p:grpSpPr>
-      <p:sp>
-        <p:nvSpPr>
-          <p:cNvPr id="137" name="CustomShape 1"/>
-          <p:cNvSpPr/>
-          <p:nvPr/>
-        </p:nvSpPr>
-        <p:spPr>
-          <a:xfrm>
-            <a:off x="874800" y="343080"/>
-            <a:ext cx="7963200" cy="582840"/>
-          </a:xfrm>
-          <a:prstGeom prst="rect">
-            <a:avLst/>
-          </a:prstGeom>
-          <a:noFill/>
-          <a:ln>
-            <a:noFill/>
-          </a:ln>
-        </p:spPr>
-        <p:style>
-          <a:lnRef idx="0"/>
-          <a:fillRef idx="0"/>
-          <a:effectRef idx="0"/>
-          <a:fontRef idx="minor"/>
-        </p:style>
-      </p:sp>
-      <p:sp>
-        <p:nvSpPr>
-          <p:cNvPr id="138" name="CustomShape 2"/>
-          <p:cNvSpPr/>
-          <p:nvPr/>
-        </p:nvSpPr>
-        <p:spPr>
-          <a:xfrm>
-            <a:off x="874800" y="1381680"/>
-            <a:ext cx="3894120" cy="3280320"/>
-          </a:xfrm>
-          <a:prstGeom prst="rect">
-            <a:avLst/>
-          </a:prstGeom>
-          <a:noFill/>
-          <a:ln>
-            <a:noFill/>
-          </a:ln>
-        </p:spPr>
-        <p:style>
-          <a:lnRef idx="0"/>
-          <a:fillRef idx="0"/>
-          <a:effectRef idx="0"/>
-          <a:fontRef idx="minor"/>
-        </p:style>
-      </p:sp>
-      <p:sp>
-        <p:nvSpPr>
-          <p:cNvPr id="139" name="CustomShape 3"/>
-          <p:cNvSpPr/>
-          <p:nvPr/>
-        </p:nvSpPr>
-        <p:spPr>
-          <a:xfrm>
-            <a:off x="874800" y="990360"/>
-            <a:ext cx="3894120" cy="325800"/>
-          </a:xfrm>
-          <a:prstGeom prst="rect">
-            <a:avLst/>
-          </a:prstGeom>
-          <a:noFill/>
-          <a:ln>
-            <a:noFill/>
-          </a:ln>
-        </p:spPr>
-        <p:style>
-          <a:lnRef idx="0"/>
-          <a:fillRef idx="0"/>
-          <a:effectRef idx="0"/>
-          <a:fontRef idx="minor"/>
-        </p:style>
-      </p:sp>
-      <p:sp>
-        <p:nvSpPr>
-          <p:cNvPr id="140" name="CustomShape 4"/>
-          <p:cNvSpPr/>
-          <p:nvPr/>
-        </p:nvSpPr>
-        <p:spPr>
-          <a:xfrm>
-            <a:off x="4943520" y="1382400"/>
-            <a:ext cx="3897720" cy="3280320"/>
-          </a:xfrm>
-          <a:prstGeom prst="rect">
-            <a:avLst/>
-          </a:prstGeom>
-          <a:noFill/>
-          <a:ln>
-            <a:noFill/>
-          </a:ln>
-        </p:spPr>
-        <p:style>
-          <a:lnRef idx="0"/>
-          <a:fillRef idx="0"/>
-          <a:effectRef idx="0"/>
-          <a:fontRef idx="minor"/>
-        </p:style>
-      </p:sp>
-      <p:sp>
-        <p:nvSpPr>
-          <p:cNvPr id="141" name="CustomShape 5"/>
-          <p:cNvSpPr/>
-          <p:nvPr/>
-        </p:nvSpPr>
-        <p:spPr>
-          <a:xfrm>
-            <a:off x="4943520" y="990360"/>
-            <a:ext cx="3897720" cy="325800"/>
-          </a:xfrm>
-          <a:prstGeom prst="rect">
-            <a:avLst/>
-          </a:prstGeom>
-          <a:noFill/>
-          <a:ln>
-            <a:noFill/>
-          </a:ln>
-        </p:spPr>
-        <p:style>
-          <a:lnRef idx="0"/>
-          <a:fillRef idx="0"/>
-          <a:effectRef idx="0"/>
-          <a:fontRef idx="minor"/>
-        </p:style>
-      </p:sp>
-      <p:sp>
-        <p:nvSpPr>
-          <p:cNvPr id="142" name="CustomShape 6"/>
-          <p:cNvSpPr/>
-          <p:nvPr/>
-        </p:nvSpPr>
-        <p:spPr>
-          <a:xfrm>
-            <a:off x="874800" y="343080"/>
-            <a:ext cx="7963200" cy="582840"/>
-          </a:xfrm>
-          <a:prstGeom prst="rect">
-            <a:avLst/>
-          </a:prstGeom>
-          <a:noFill/>
-          <a:ln>
-            <a:noFill/>
-          </a:ln>
-        </p:spPr>
-        <p:style>
-          <a:lnRef idx="0"/>
-          <a:fillRef idx="0"/>
-          <a:effectRef idx="0"/>
-          <a:fontRef idx="minor"/>
-        </p:style>
-        <p:txBody>
-          <a:bodyPr lIns="90000" rIns="90000" tIns="45000" bIns="45000" anchor="ctr">
-            <a:noAutofit/>
-          </a:bodyPr>
-          <a:p>
-            <a:pPr>
-              <a:lnSpc>
-                <a:spcPts val="2520"/>
-              </a:lnSpc>
-            </a:pPr>
-            <a:r>
-              <a:rPr b="1" lang="de-DE" sz="2800" spc="-1" strike="noStrike">
-                <a:solidFill>
-                  <a:srgbClr val="003259"/>
-                </a:solidFill>
-                <a:latin typeface="Arial"/>
-                <a:ea typeface="DejaVu Sans"/>
-              </a:rPr>
-              <a:t>Quellen</a:t>
-            </a:r>
-            <a:endParaRPr b="0" lang="de-DE" sz="2800" spc="-1" strike="noStrike">
-              <a:latin typeface="Arial"/>
-            </a:endParaRPr>
-          </a:p>
-        </p:txBody>
-      </p:sp>
-      <p:sp>
-        <p:nvSpPr>
-          <p:cNvPr id="143" name="CustomShape 7"/>
-          <p:cNvSpPr/>
-          <p:nvPr/>
-        </p:nvSpPr>
-        <p:spPr>
-          <a:xfrm>
-            <a:off x="822960" y="1188720"/>
-            <a:ext cx="7131600" cy="1881360"/>
-          </a:xfrm>
-          <a:prstGeom prst="rect">
-            <a:avLst/>
-          </a:prstGeom>
-          <a:noFill/>
-          <a:ln>
-            <a:noFill/>
-          </a:ln>
-        </p:spPr>
-        <p:style>
-          <a:lnRef idx="0"/>
-          <a:fillRef idx="0"/>
-          <a:effectRef idx="0"/>
-          <a:fontRef idx="minor"/>
-        </p:style>
-        <p:txBody>
-          <a:bodyPr lIns="90000" rIns="90000" tIns="45000" bIns="45000">
-            <a:noAutofit/>
-          </a:bodyPr>
-          <a:p>
-            <a:pPr>
-              <a:lnSpc>
-                <a:spcPct val="100000"/>
-              </a:lnSpc>
-            </a:pPr>
-            <a:r>
-              <a:rPr b="0" lang="de-DE" sz="1800" spc="-1" strike="noStrike">
-                <a:solidFill>
-                  <a:srgbClr val="000000"/>
-                </a:solidFill>
-                <a:latin typeface="Arial"/>
-                <a:ea typeface="DejaVu Sans"/>
-              </a:rPr>
-              <a:t>Wikipedia</a:t>
-            </a:r>
-            <a:endParaRPr b="0" lang="de-DE" sz="1800" spc="-1" strike="noStrike">
-              <a:latin typeface="Arial"/>
-            </a:endParaRPr>
-          </a:p>
-          <a:p>
-            <a:pPr>
-              <a:lnSpc>
-                <a:spcPct val="100000"/>
-              </a:lnSpc>
-            </a:pPr>
-            <a:r>
-              <a:rPr b="0" lang="de-DE" sz="1800" spc="-1" strike="noStrike">
-                <a:solidFill>
-                  <a:srgbClr val="000000"/>
-                </a:solidFill>
-                <a:latin typeface="Arial"/>
-                <a:ea typeface="DejaVu Sans"/>
-              </a:rPr>
-              <a:t>https://de.wikipedia.org/wiki/Kommanditgesellschaft_(Deutschland)</a:t>
-            </a:r>
-            <a:endParaRPr b="0" lang="de-DE" sz="1800" spc="-1" strike="noStrike">
-              <a:latin typeface="Arial"/>
-            </a:endParaRPr>
-          </a:p>
-          <a:p>
-            <a:pPr>
-              <a:lnSpc>
-                <a:spcPct val="100000"/>
-              </a:lnSpc>
-            </a:pPr>
-            <a:endParaRPr b="0" lang="de-DE" sz="1800" spc="-1" strike="noStrike">
-              <a:latin typeface="Arial"/>
-            </a:endParaRPr>
-          </a:p>
-          <a:p>
-            <a:pPr>
-              <a:lnSpc>
-                <a:spcPct val="100000"/>
-              </a:lnSpc>
-            </a:pPr>
-            <a:r>
-              <a:rPr b="0" lang="de-DE" sz="1800" spc="-1" strike="noStrike">
-                <a:solidFill>
-                  <a:srgbClr val="000000"/>
-                </a:solidFill>
-                <a:latin typeface="Arial"/>
-                <a:ea typeface="DejaVu Sans"/>
-              </a:rPr>
-              <a:t>Clever-Selbststaendig</a:t>
-            </a:r>
-            <a:endParaRPr b="0" lang="de-DE" sz="1800" spc="-1" strike="noStrike">
-              <a:latin typeface="Arial"/>
-            </a:endParaRPr>
-          </a:p>
-          <a:p>
-            <a:pPr>
-              <a:lnSpc>
-                <a:spcPct val="100000"/>
-              </a:lnSpc>
-            </a:pPr>
-            <a:r>
-              <a:rPr b="0" lang="de-DE" sz="1800" spc="-1" strike="noStrike">
-                <a:solidFill>
-                  <a:srgbClr val="000000"/>
-                </a:solidFill>
-                <a:latin typeface="Arial"/>
-                <a:ea typeface="DejaVu Sans"/>
-              </a:rPr>
-              <a:t>https://www.clever-selbstaendig.de/rechtsform/kommanditgesellschaft.php</a:t>
-            </a:r>
-            <a:endParaRPr b="0" lang="de-DE" sz="1800" spc="-1" strike="noStrike">
-              <a:latin typeface="Arial"/>
-            </a:endParaRPr>
-          </a:p>
-          <a:p>
-            <a:pPr>
-              <a:lnSpc>
-                <a:spcPct val="100000"/>
-              </a:lnSpc>
-            </a:pPr>
-            <a:endParaRPr b="0" lang="de-DE" sz="1800" spc="-1" strike="noStrike">
-              <a:latin typeface="Arial"/>
-            </a:endParaRPr>
-          </a:p>
-          <a:p>
-            <a:pPr>
-              <a:lnSpc>
-                <a:spcPct val="100000"/>
-              </a:lnSpc>
-            </a:pPr>
-            <a:endParaRPr b="0" lang="de-DE" sz="1800" spc="-1" strike="noStrike">
-              <a:latin typeface="Arial"/>
-            </a:endParaRPr>
-          </a:p>
-          <a:p>
-            <a:pPr>
-              <a:lnSpc>
-                <a:spcPct val="100000"/>
-              </a:lnSpc>
-            </a:pPr>
-            <a:endParaRPr b="0" lang="de-DE" sz="1800" spc="-1" strike="noStrike">
-              <a:latin typeface="Arial"/>
-            </a:endParaRPr>
-          </a:p>
-          <a:p>
-            <a:pPr>
-              <a:lnSpc>
-                <a:spcPct val="100000"/>
-              </a:lnSpc>
-            </a:pPr>
-            <a:endParaRPr b="0" lang="de-DE" sz="1800" spc="-1" strike="noStrike">
-              <a:latin typeface="Arial"/>
-            </a:endParaRPr>
-          </a:p>
-        </p:txBody>
       </p:sp>
     </p:spTree>
   </p:cSld>
@@ -4529,7 +3812,7 @@
         <p:spPr>
           <a:xfrm>
             <a:off x="874800" y="343080"/>
-            <a:ext cx="7963200" cy="582840"/>
+            <a:ext cx="7962840" cy="582480"/>
           </a:xfrm>
           <a:prstGeom prst="rect">
             <a:avLst/>
@@ -4555,7 +3838,7 @@
         <p:spPr>
           <a:xfrm>
             <a:off x="874800" y="1127520"/>
-            <a:ext cx="7963200" cy="3534480"/>
+            <a:ext cx="7962840" cy="3534120"/>
           </a:xfrm>
           <a:prstGeom prst="rect">
             <a:avLst/>
@@ -4581,7 +3864,7 @@
         <p:spPr>
           <a:xfrm>
             <a:off x="874800" y="343080"/>
-            <a:ext cx="7963200" cy="582840"/>
+            <a:ext cx="7962840" cy="582480"/>
           </a:xfrm>
           <a:prstGeom prst="rect">
             <a:avLst/>
@@ -4632,7 +3915,7 @@
         <p:spPr>
           <a:xfrm>
             <a:off x="874800" y="1428480"/>
-            <a:ext cx="7963200" cy="3181680"/>
+            <a:ext cx="7962840" cy="3181320"/>
           </a:xfrm>
           <a:prstGeom prst="rect">
             <a:avLst/>
@@ -4857,7 +4140,7 @@
         <p:spPr>
           <a:xfrm>
             <a:off x="874800" y="343080"/>
-            <a:ext cx="7963200" cy="582840"/>
+            <a:ext cx="7962840" cy="582480"/>
           </a:xfrm>
           <a:prstGeom prst="rect">
             <a:avLst/>
@@ -4883,7 +4166,7 @@
         <p:spPr>
           <a:xfrm>
             <a:off x="874800" y="1428480"/>
-            <a:ext cx="7963200" cy="3181680"/>
+            <a:ext cx="7962840" cy="3181320"/>
           </a:xfrm>
           <a:prstGeom prst="rect">
             <a:avLst/>
@@ -4909,7 +4192,7 @@
         <p:spPr>
           <a:xfrm>
             <a:off x="874800" y="343080"/>
-            <a:ext cx="7963200" cy="582840"/>
+            <a:ext cx="7962840" cy="582480"/>
           </a:xfrm>
           <a:prstGeom prst="rect">
             <a:avLst/>
@@ -4960,7 +4243,7 @@
         <p:spPr>
           <a:xfrm>
             <a:off x="822960" y="1188720"/>
-            <a:ext cx="7131600" cy="3581640"/>
+            <a:ext cx="7131240" cy="3581280"/>
           </a:xfrm>
           <a:prstGeom prst="rect">
             <a:avLst/>
@@ -5291,7 +4574,7 @@
         <p:spPr>
           <a:xfrm>
             <a:off x="874800" y="343080"/>
-            <a:ext cx="7963200" cy="582840"/>
+            <a:ext cx="7962840" cy="582480"/>
           </a:xfrm>
           <a:prstGeom prst="rect">
             <a:avLst/>
@@ -5316,8 +4599,8 @@
         </p:nvSpPr>
         <p:spPr>
           <a:xfrm>
-            <a:off x="874800" y="1428480"/>
-            <a:ext cx="7963200" cy="3181680"/>
+            <a:off x="874800" y="1381680"/>
+            <a:ext cx="3893760" cy="3279960"/>
           </a:xfrm>
           <a:prstGeom prst="rect">
             <a:avLst/>
@@ -5342,8 +4625,8 @@
         </p:nvSpPr>
         <p:spPr>
           <a:xfrm>
-            <a:off x="874800" y="343080"/>
-            <a:ext cx="7963200" cy="582840"/>
+            <a:off x="874800" y="990360"/>
+            <a:ext cx="3893760" cy="325440"/>
           </a:xfrm>
           <a:prstGeom prst="rect">
             <a:avLst/>
@@ -5359,31 +4642,6 @@
           <a:effectRef idx="0"/>
           <a:fontRef idx="minor"/>
         </p:style>
-        <p:txBody>
-          <a:bodyPr lIns="90000" rIns="90000" tIns="45000" bIns="45000" anchor="ctr">
-            <a:noAutofit/>
-          </a:bodyPr>
-          <a:p>
-            <a:pPr>
-              <a:lnSpc>
-                <a:spcPts val="2520"/>
-              </a:lnSpc>
-            </a:pPr>
-            <a:r>
-              <a:rPr b="1" lang="de-DE" sz="2800" spc="-1" strike="noStrike">
-                <a:solidFill>
-                  <a:srgbClr val="003259"/>
-                </a:solidFill>
-                <a:latin typeface="Arial"/>
-                <a:ea typeface="DejaVu Sans"/>
-              </a:rPr>
-              <a:t>Gründung</a:t>
-            </a:r>
-            <a:endParaRPr b="0" lang="de-DE" sz="2800" spc="-1" strike="noStrike">
-              <a:latin typeface="Arial"/>
-            </a:endParaRPr>
-          </a:p>
-        </p:txBody>
       </p:sp>
       <p:sp>
         <p:nvSpPr>
@@ -5393,8 +4651,8 @@
         </p:nvSpPr>
         <p:spPr>
           <a:xfrm>
-            <a:off x="822960" y="1188720"/>
-            <a:ext cx="7131600" cy="3581640"/>
+            <a:off x="4943520" y="1382400"/>
+            <a:ext cx="3897360" cy="3279960"/>
           </a:xfrm>
           <a:prstGeom prst="rect">
             <a:avLst/>
@@ -5410,10 +4668,143 @@
           <a:effectRef idx="0"/>
           <a:fontRef idx="minor"/>
         </p:style>
+      </p:sp>
+      <p:sp>
+        <p:nvSpPr>
+          <p:cNvPr id="98" name="CustomShape 5"/>
+          <p:cNvSpPr/>
+          <p:nvPr/>
+        </p:nvSpPr>
+        <p:spPr>
+          <a:xfrm>
+            <a:off x="4943520" y="990360"/>
+            <a:ext cx="3897360" cy="325440"/>
+          </a:xfrm>
+          <a:prstGeom prst="rect">
+            <a:avLst/>
+          </a:prstGeom>
+          <a:noFill/>
+          <a:ln>
+            <a:noFill/>
+          </a:ln>
+        </p:spPr>
+        <p:style>
+          <a:lnRef idx="0"/>
+          <a:fillRef idx="0"/>
+          <a:effectRef idx="0"/>
+          <a:fontRef idx="minor"/>
+        </p:style>
+      </p:sp>
+      <p:sp>
+        <p:nvSpPr>
+          <p:cNvPr id="99" name="CustomShape 6"/>
+          <p:cNvSpPr/>
+          <p:nvPr/>
+        </p:nvSpPr>
+        <p:spPr>
+          <a:xfrm>
+            <a:off x="874800" y="343080"/>
+            <a:ext cx="7962840" cy="582480"/>
+          </a:xfrm>
+          <a:prstGeom prst="rect">
+            <a:avLst/>
+          </a:prstGeom>
+          <a:noFill/>
+          <a:ln>
+            <a:noFill/>
+          </a:ln>
+        </p:spPr>
+        <p:style>
+          <a:lnRef idx="0"/>
+          <a:fillRef idx="0"/>
+          <a:effectRef idx="0"/>
+          <a:fontRef idx="minor"/>
+        </p:style>
+        <p:txBody>
+          <a:bodyPr lIns="90000" rIns="90000" tIns="45000" bIns="45000" anchor="ctr">
+            <a:noAutofit/>
+          </a:bodyPr>
+          <a:p>
+            <a:pPr>
+              <a:lnSpc>
+                <a:spcPts val="2520"/>
+              </a:lnSpc>
+            </a:pPr>
+            <a:r>
+              <a:rPr b="1" lang="de-DE" sz="2800" spc="-1" strike="noStrike">
+                <a:solidFill>
+                  <a:srgbClr val="003259"/>
+                </a:solidFill>
+                <a:latin typeface="Arial"/>
+                <a:ea typeface="DejaVu Sans"/>
+              </a:rPr>
+              <a:t>Gewinnverteilung</a:t>
+            </a:r>
+            <a:endParaRPr b="0" lang="de-DE" sz="2800" spc="-1" strike="noStrike">
+              <a:latin typeface="Arial"/>
+            </a:endParaRPr>
+          </a:p>
+        </p:txBody>
+      </p:sp>
+      <p:sp>
+        <p:nvSpPr>
+          <p:cNvPr id="100" name="CustomShape 7"/>
+          <p:cNvSpPr/>
+          <p:nvPr/>
+        </p:nvSpPr>
+        <p:spPr>
+          <a:xfrm>
+            <a:off x="822960" y="1188720"/>
+            <a:ext cx="7131240" cy="3160800"/>
+          </a:xfrm>
+          <a:prstGeom prst="rect">
+            <a:avLst/>
+          </a:prstGeom>
+          <a:noFill/>
+          <a:ln>
+            <a:noFill/>
+          </a:ln>
+        </p:spPr>
+        <p:style>
+          <a:lnRef idx="0"/>
+          <a:fillRef idx="0"/>
+          <a:effectRef idx="0"/>
+          <a:fontRef idx="minor"/>
+        </p:style>
         <p:txBody>
           <a:bodyPr lIns="90000" rIns="90000" tIns="45000" bIns="45000">
             <a:noAutofit/>
           </a:bodyPr>
+          <a:p>
+            <a:pPr>
+              <a:lnSpc>
+                <a:spcPct val="100000"/>
+              </a:lnSpc>
+            </a:pPr>
+            <a:r>
+              <a:rPr b="1" lang="de-DE" sz="1800" spc="-1" strike="noStrike">
+                <a:solidFill>
+                  <a:srgbClr val="000000"/>
+                </a:solidFill>
+                <a:latin typeface="Arial"/>
+                <a:ea typeface="DejaVu Sans"/>
+              </a:rPr>
+              <a:t>1. Nach dem Gesellschaftsvertrag</a:t>
+            </a:r>
+            <a:endParaRPr b="0" lang="de-DE" sz="1800" spc="-1" strike="noStrike">
+              <a:latin typeface="Arial"/>
+            </a:endParaRPr>
+          </a:p>
+          <a:p>
+            <a:pPr>
+              <a:lnSpc>
+                <a:spcPct val="100000"/>
+              </a:lnSpc>
+            </a:pPr>
+            <a:endParaRPr b="0" lang="de-DE" sz="1800" spc="-1" strike="noStrike">
+              <a:latin typeface="Arial"/>
+            </a:endParaRPr>
+          </a:p>
           <a:p>
             <a:pPr>
               <a:lnSpc>
@@ -5426,40 +4817,20 @@
                   <a:srgbClr val="000000"/>
                 </a:solidFill>
                 <a:latin typeface="Arial"/>
-                <a:ea typeface="Droid Sans Fallback"/>
-              </a:rPr>
-              <a:t>Die Gründung setzt den Abschluss eines Gesellschaftsvertrages zwischen mindestens einem Komplementär (Vollhafter) und einem Kommanditisten(Teilhafter) voraus.</a:t>
-            </a:r>
-            <a:endParaRPr b="0" lang="de-DE" sz="1800" spc="-1" strike="noStrike">
-              <a:latin typeface="Arial"/>
-            </a:endParaRPr>
-          </a:p>
-          <a:p>
-            <a:pPr>
-              <a:lnSpc>
-                <a:spcPct val="100000"/>
-              </a:lnSpc>
-            </a:pPr>
+                <a:ea typeface="DejaVu Sans"/>
+              </a:rPr>
+              <a:t>	</a:t>
+            </a:r>
             <a:r>
               <a:rPr b="0" lang="de-DE" sz="1800" spc="-1" strike="noStrike">
                 <a:solidFill>
                   <a:srgbClr val="000000"/>
                 </a:solidFill>
                 <a:latin typeface="Arial"/>
-                <a:ea typeface="Droid Sans Fallback"/>
-              </a:rPr>
-              <a:t> </a:t>
-            </a:r>
-            <a:endParaRPr b="0" lang="de-DE" sz="1800" spc="-1" strike="noStrike">
-              <a:latin typeface="Arial"/>
-            </a:endParaRPr>
-          </a:p>
-          <a:p>
-            <a:pPr>
-              <a:lnSpc>
-                <a:spcPct val="100000"/>
-              </a:lnSpc>
-            </a:pPr>
+                <a:ea typeface="DejaVu Sans"/>
+              </a:rPr>
+              <a:t>- Gestaltung nach eigenem Interesse</a:t>
+            </a:r>
             <a:endParaRPr b="0" lang="de-DE" sz="1800" spc="-1" strike="noStrike">
               <a:latin typeface="Arial"/>
             </a:endParaRPr>
@@ -5476,9 +4847,209 @@
                   <a:srgbClr val="000000"/>
                 </a:solidFill>
                 <a:latin typeface="Arial"/>
-                <a:ea typeface="Droid Sans Fallback"/>
-              </a:rPr>
-              <a:t>Die KG ist zur Eintragung im Handelsregister, beim Gewerbeamt und dem Finanzamt anzumelden, in der Regel außerdem bei der Industrie- und Handelskammer. </a:t>
+                <a:ea typeface="DejaVu Sans"/>
+              </a:rPr>
+              <a:t>	</a:t>
+            </a:r>
+            <a:r>
+              <a:rPr b="0" lang="de-DE" sz="1800" spc="-1" strike="noStrike">
+                <a:solidFill>
+                  <a:srgbClr val="000000"/>
+                </a:solidFill>
+                <a:latin typeface="Arial"/>
+                <a:ea typeface="DejaVu Sans"/>
+              </a:rPr>
+              <a:t>- Höhe der Kapitaleinlagen</a:t>
+            </a:r>
+            <a:endParaRPr b="0" lang="de-DE" sz="1800" spc="-1" strike="noStrike">
+              <a:latin typeface="Arial"/>
+            </a:endParaRPr>
+          </a:p>
+          <a:p>
+            <a:pPr>
+              <a:lnSpc>
+                <a:spcPct val="100000"/>
+              </a:lnSpc>
+            </a:pPr>
+            <a:r>
+              <a:rPr b="0" lang="de-DE" sz="1800" spc="-1" strike="noStrike">
+                <a:solidFill>
+                  <a:srgbClr val="000000"/>
+                </a:solidFill>
+                <a:latin typeface="Arial"/>
+                <a:ea typeface="DejaVu Sans"/>
+              </a:rPr>
+              <a:t>	</a:t>
+            </a:r>
+            <a:r>
+              <a:rPr b="0" lang="de-DE" sz="1800" spc="-1" strike="noStrike">
+                <a:solidFill>
+                  <a:srgbClr val="000000"/>
+                </a:solidFill>
+                <a:latin typeface="Arial"/>
+                <a:ea typeface="DejaVu Sans"/>
+              </a:rPr>
+              <a:t>- Pflicht: Beteiligung an der Gesellschaft</a:t>
+            </a:r>
+            <a:endParaRPr b="0" lang="de-DE" sz="1800" spc="-1" strike="noStrike">
+              <a:latin typeface="Arial"/>
+            </a:endParaRPr>
+          </a:p>
+          <a:p>
+            <a:pPr>
+              <a:lnSpc>
+                <a:spcPct val="100000"/>
+              </a:lnSpc>
+            </a:pPr>
+            <a:endParaRPr b="0" lang="de-DE" sz="1800" spc="-1" strike="noStrike">
+              <a:latin typeface="Arial"/>
+            </a:endParaRPr>
+          </a:p>
+          <a:p>
+            <a:pPr>
+              <a:lnSpc>
+                <a:spcPct val="100000"/>
+              </a:lnSpc>
+            </a:pPr>
+            <a:r>
+              <a:rPr b="1" lang="de-DE" sz="1800" spc="-1" strike="noStrike">
+                <a:solidFill>
+                  <a:srgbClr val="000000"/>
+                </a:solidFill>
+                <a:latin typeface="Arial"/>
+                <a:ea typeface="DejaVu Sans"/>
+              </a:rPr>
+              <a:t>2. Nach dem Handelsgesetzbuch</a:t>
+            </a:r>
+            <a:endParaRPr b="0" lang="de-DE" sz="1800" spc="-1" strike="noStrike">
+              <a:latin typeface="Arial"/>
+            </a:endParaRPr>
+          </a:p>
+          <a:p>
+            <a:pPr>
+              <a:lnSpc>
+                <a:spcPct val="100000"/>
+              </a:lnSpc>
+            </a:pPr>
+            <a:endParaRPr b="0" lang="de-DE" sz="1800" spc="-1" strike="noStrike">
+              <a:latin typeface="Arial"/>
+            </a:endParaRPr>
+          </a:p>
+          <a:p>
+            <a:pPr>
+              <a:lnSpc>
+                <a:spcPct val="100000"/>
+              </a:lnSpc>
+            </a:pPr>
+            <a:r>
+              <a:rPr b="0" lang="de-DE" sz="1800" spc="-1" strike="noStrike">
+                <a:solidFill>
+                  <a:srgbClr val="000000"/>
+                </a:solidFill>
+                <a:latin typeface="Arial"/>
+                <a:ea typeface="DejaVu Sans"/>
+              </a:rPr>
+              <a:t>	</a:t>
+            </a:r>
+            <a:r>
+              <a:rPr b="0" lang="de-DE" sz="1800" spc="-1" strike="noStrike">
+                <a:solidFill>
+                  <a:srgbClr val="000000"/>
+                </a:solidFill>
+                <a:latin typeface="Arial"/>
+                <a:ea typeface="DejaVu Sans"/>
+              </a:rPr>
+              <a:t>- angemessene Verteilung (Höhe Kapitaleinlage)</a:t>
+            </a:r>
+            <a:endParaRPr b="0" lang="de-DE" sz="1800" spc="-1" strike="noStrike">
+              <a:latin typeface="Arial"/>
+            </a:endParaRPr>
+          </a:p>
+          <a:p>
+            <a:pPr>
+              <a:lnSpc>
+                <a:spcPct val="100000"/>
+              </a:lnSpc>
+            </a:pPr>
+            <a:r>
+              <a:rPr b="0" lang="de-DE" sz="1800" spc="-1" strike="noStrike">
+                <a:solidFill>
+                  <a:srgbClr val="000000"/>
+                </a:solidFill>
+                <a:latin typeface="Arial"/>
+                <a:ea typeface="DejaVu Sans"/>
+              </a:rPr>
+              <a:t>	</a:t>
+            </a:r>
+            <a:r>
+              <a:rPr b="0" lang="de-DE" sz="1800" spc="-1" strike="noStrike">
+                <a:solidFill>
+                  <a:srgbClr val="000000"/>
+                </a:solidFill>
+                <a:latin typeface="Arial"/>
+                <a:ea typeface="DejaVu Sans"/>
+              </a:rPr>
+              <a:t>- festgelegter Gewinn: 4 % Verzinsung Kapitaleinlagen</a:t>
+            </a:r>
+            <a:endParaRPr b="0" lang="de-DE" sz="1800" spc="-1" strike="noStrike">
+              <a:latin typeface="Arial"/>
+            </a:endParaRPr>
+          </a:p>
+          <a:p>
+            <a:pPr>
+              <a:lnSpc>
+                <a:spcPct val="100000"/>
+              </a:lnSpc>
+            </a:pPr>
+            <a:r>
+              <a:rPr b="0" lang="de-DE" sz="1800" spc="-1" strike="noStrike">
+                <a:solidFill>
+                  <a:srgbClr val="000000"/>
+                </a:solidFill>
+                <a:latin typeface="Arial"/>
+                <a:ea typeface="DejaVu Sans"/>
+              </a:rPr>
+              <a:t>	</a:t>
+            </a:r>
+            <a:r>
+              <a:rPr b="0" lang="de-DE" sz="1800" spc="-1" strike="noStrike">
+                <a:solidFill>
+                  <a:srgbClr val="000000"/>
+                </a:solidFill>
+                <a:latin typeface="Arial"/>
+                <a:ea typeface="DejaVu Sans"/>
+              </a:rPr>
+              <a:t>- Zinssumme und Gehalt werden vom Gewinn abgezogen</a:t>
+            </a:r>
+            <a:endParaRPr b="0" lang="de-DE" sz="1800" spc="-1" strike="noStrike">
+              <a:latin typeface="Arial"/>
+            </a:endParaRPr>
+          </a:p>
+          <a:p>
+            <a:pPr>
+              <a:lnSpc>
+                <a:spcPct val="100000"/>
+              </a:lnSpc>
+            </a:pPr>
+            <a:r>
+              <a:rPr b="0" lang="de-DE" sz="1800" spc="-1" strike="noStrike">
+                <a:solidFill>
+                  <a:srgbClr val="000000"/>
+                </a:solidFill>
+                <a:latin typeface="Arial"/>
+                <a:ea typeface="DejaVu Sans"/>
+              </a:rPr>
+              <a:t>	</a:t>
+            </a:r>
+            <a:r>
+              <a:rPr b="0" lang="de-DE" sz="1800" spc="-1" strike="noStrike">
+                <a:solidFill>
+                  <a:srgbClr val="000000"/>
+                </a:solidFill>
+                <a:latin typeface="Arial"/>
+                <a:ea typeface="DejaVu Sans"/>
+              </a:rPr>
+              <a:t>- Restlicher Gewinn wird verteilt</a:t>
             </a:r>
             <a:endParaRPr b="0" lang="de-DE" sz="1800" spc="-1" strike="noStrike">
               <a:latin typeface="Arial"/>
@@ -5518,14 +5089,14 @@
       </p:grpSpPr>
       <p:sp>
         <p:nvSpPr>
-          <p:cNvPr id="98" name="CustomShape 1"/>
+          <p:cNvPr id="101" name="CustomShape 1"/>
           <p:cNvSpPr/>
           <p:nvPr/>
         </p:nvSpPr>
         <p:spPr>
           <a:xfrm>
             <a:off x="874800" y="343080"/>
-            <a:ext cx="7963200" cy="582840"/>
+            <a:ext cx="7962840" cy="582480"/>
           </a:xfrm>
           <a:prstGeom prst="rect">
             <a:avLst/>
@@ -5544,14 +5115,14 @@
       </p:sp>
       <p:sp>
         <p:nvSpPr>
-          <p:cNvPr id="99" name="CustomShape 2"/>
+          <p:cNvPr id="102" name="CustomShape 2"/>
           <p:cNvSpPr/>
           <p:nvPr/>
         </p:nvSpPr>
         <p:spPr>
           <a:xfrm>
-            <a:off x="874800" y="1428480"/>
-            <a:ext cx="7963200" cy="3181680"/>
+            <a:off x="874800" y="1381680"/>
+            <a:ext cx="3893760" cy="3279960"/>
           </a:xfrm>
           <a:prstGeom prst="rect">
             <a:avLst/>
@@ -5570,14 +5141,14 @@
       </p:sp>
       <p:sp>
         <p:nvSpPr>
-          <p:cNvPr id="100" name="CustomShape 3"/>
+          <p:cNvPr id="103" name="CustomShape 3"/>
           <p:cNvSpPr/>
           <p:nvPr/>
         </p:nvSpPr>
         <p:spPr>
           <a:xfrm>
-            <a:off x="874800" y="343080"/>
-            <a:ext cx="7963200" cy="582840"/>
+            <a:off x="874800" y="990360"/>
+            <a:ext cx="3893760" cy="325440"/>
           </a:xfrm>
           <a:prstGeom prst="rect">
             <a:avLst/>
@@ -5593,42 +5164,17 @@
           <a:effectRef idx="0"/>
           <a:fontRef idx="minor"/>
         </p:style>
-        <p:txBody>
-          <a:bodyPr lIns="90000" rIns="90000" tIns="45000" bIns="45000" anchor="ctr">
-            <a:noAutofit/>
-          </a:bodyPr>
-          <a:p>
-            <a:pPr>
-              <a:lnSpc>
-                <a:spcPts val="2520"/>
-              </a:lnSpc>
-            </a:pPr>
-            <a:r>
-              <a:rPr b="1" lang="de-DE" sz="2800" spc="-1" strike="noStrike">
-                <a:solidFill>
-                  <a:srgbClr val="003259"/>
-                </a:solidFill>
-                <a:latin typeface="Arial"/>
-                <a:ea typeface="DejaVu Sans"/>
-              </a:rPr>
-              <a:t>Haftung</a:t>
-            </a:r>
-            <a:endParaRPr b="0" lang="de-DE" sz="2800" spc="-1" strike="noStrike">
-              <a:latin typeface="Arial"/>
-            </a:endParaRPr>
-          </a:p>
-        </p:txBody>
-      </p:sp>
-      <p:sp>
-        <p:nvSpPr>
-          <p:cNvPr id="101" name="CustomShape 4"/>
+      </p:sp>
+      <p:sp>
+        <p:nvSpPr>
+          <p:cNvPr id="104" name="CustomShape 4"/>
           <p:cNvSpPr/>
           <p:nvPr/>
         </p:nvSpPr>
         <p:spPr>
           <a:xfrm>
-            <a:off x="822960" y="1188720"/>
-            <a:ext cx="7131600" cy="3581640"/>
+            <a:off x="4943520" y="1382400"/>
+            <a:ext cx="3897360" cy="3279960"/>
           </a:xfrm>
           <a:prstGeom prst="rect">
             <a:avLst/>
@@ -5644,6 +5190,109 @@
           <a:effectRef idx="0"/>
           <a:fontRef idx="minor"/>
         </p:style>
+      </p:sp>
+      <p:sp>
+        <p:nvSpPr>
+          <p:cNvPr id="105" name="CustomShape 5"/>
+          <p:cNvSpPr/>
+          <p:nvPr/>
+        </p:nvSpPr>
+        <p:spPr>
+          <a:xfrm>
+            <a:off x="4943520" y="990360"/>
+            <a:ext cx="3897360" cy="325440"/>
+          </a:xfrm>
+          <a:prstGeom prst="rect">
+            <a:avLst/>
+          </a:prstGeom>
+          <a:noFill/>
+          <a:ln>
+            <a:noFill/>
+          </a:ln>
+        </p:spPr>
+        <p:style>
+          <a:lnRef idx="0"/>
+          <a:fillRef idx="0"/>
+          <a:effectRef idx="0"/>
+          <a:fontRef idx="minor"/>
+        </p:style>
+      </p:sp>
+      <p:sp>
+        <p:nvSpPr>
+          <p:cNvPr id="106" name="CustomShape 6"/>
+          <p:cNvSpPr/>
+          <p:nvPr/>
+        </p:nvSpPr>
+        <p:spPr>
+          <a:xfrm>
+            <a:off x="874800" y="343080"/>
+            <a:ext cx="7962840" cy="582480"/>
+          </a:xfrm>
+          <a:prstGeom prst="rect">
+            <a:avLst/>
+          </a:prstGeom>
+          <a:noFill/>
+          <a:ln>
+            <a:noFill/>
+          </a:ln>
+        </p:spPr>
+        <p:style>
+          <a:lnRef idx="0"/>
+          <a:fillRef idx="0"/>
+          <a:effectRef idx="0"/>
+          <a:fontRef idx="minor"/>
+        </p:style>
+        <p:txBody>
+          <a:bodyPr lIns="90000" rIns="90000" tIns="45000" bIns="45000" anchor="ctr">
+            <a:noAutofit/>
+          </a:bodyPr>
+          <a:p>
+            <a:pPr>
+              <a:lnSpc>
+                <a:spcPts val="2520"/>
+              </a:lnSpc>
+            </a:pPr>
+            <a:r>
+              <a:rPr b="1" lang="de-DE" sz="2800" spc="-1" strike="noStrike">
+                <a:solidFill>
+                  <a:srgbClr val="003259"/>
+                </a:solidFill>
+                <a:latin typeface="Arial"/>
+                <a:ea typeface="DejaVu Sans"/>
+              </a:rPr>
+              <a:t>Rechenbeispiel</a:t>
+            </a:r>
+            <a:endParaRPr b="0" lang="de-DE" sz="2800" spc="-1" strike="noStrike">
+              <a:latin typeface="Arial"/>
+            </a:endParaRPr>
+          </a:p>
+        </p:txBody>
+      </p:sp>
+      <p:sp>
+        <p:nvSpPr>
+          <p:cNvPr id="107" name="CustomShape 7"/>
+          <p:cNvSpPr/>
+          <p:nvPr/>
+        </p:nvSpPr>
+        <p:spPr>
+          <a:xfrm>
+            <a:off x="822960" y="1188720"/>
+            <a:ext cx="7131240" cy="3141360"/>
+          </a:xfrm>
+          <a:prstGeom prst="rect">
+            <a:avLst/>
+          </a:prstGeom>
+          <a:noFill/>
+          <a:ln>
+            <a:noFill/>
+          </a:ln>
+        </p:spPr>
+        <p:style>
+          <a:lnRef idx="0"/>
+          <a:fillRef idx="0"/>
+          <a:effectRef idx="0"/>
+          <a:fontRef idx="minor"/>
+        </p:style>
         <p:txBody>
           <a:bodyPr lIns="90000" rIns="90000" tIns="45000" bIns="45000">
             <a:noAutofit/>
@@ -5660,20 +5309,10 @@
                   <a:srgbClr val="000000"/>
                 </a:solidFill>
                 <a:latin typeface="Arial"/>
-                <a:ea typeface="Droid Sans Fallback"/>
-              </a:rPr>
-              <a:t>Bei der KG werden nur die die Vollhafter mit Geschäfts- und Privatvermögen für die Verbindlichkeiten gegenüber Dritten herangezogen</a:t>
-            </a:r>
-            <a:endParaRPr b="0" lang="de-DE" sz="1800" spc="-1" strike="noStrike">
-              <a:latin typeface="Arial"/>
-            </a:endParaRPr>
-          </a:p>
-          <a:p>
-            <a:pPr>
-              <a:lnSpc>
-                <a:spcPct val="100000"/>
-              </a:lnSpc>
-            </a:pPr>
+                <a:ea typeface="DejaVu Sans"/>
+              </a:rPr>
+              <a:t>Gewinn: 200.000 €</a:t>
+            </a:r>
             <a:endParaRPr b="0" lang="de-DE" sz="1800" spc="-1" strike="noStrike">
               <a:latin typeface="Arial"/>
             </a:endParaRPr>
@@ -5700,9 +5339,9 @@
                   <a:srgbClr val="000000"/>
                 </a:solidFill>
                 <a:latin typeface="Arial"/>
-                <a:ea typeface="Droid Sans Fallback"/>
-              </a:rPr>
-              <a:t>Besteht die KG aus mehreren Komplementären, kann jeder einzelne Vollhafter für die gesamten Verbindlichkeiten der Gesellschaft haftbar gemacht werden.</a:t>
+                <a:ea typeface="DejaVu Sans"/>
+              </a:rPr>
+              <a:t>2 Komplementäre: je 400.000 € Kapitaleinlage, 50.000 € Gehalt</a:t>
             </a:r>
             <a:endParaRPr b="0" lang="de-DE" sz="1800" spc="-1" strike="noStrike">
               <a:latin typeface="Arial"/>
@@ -5730,9 +5369,9 @@
                   <a:srgbClr val="000000"/>
                 </a:solidFill>
                 <a:latin typeface="Arial"/>
-                <a:ea typeface="Droid Sans Fallback"/>
-              </a:rPr>
-              <a:t> </a:t>
+                <a:ea typeface="DejaVu Sans"/>
+              </a:rPr>
+              <a:t>1 Kommanditist: 100.000 € Kapitaleinlage</a:t>
             </a:r>
             <a:endParaRPr b="0" lang="de-DE" sz="1800" spc="-1" strike="noStrike">
               <a:latin typeface="Arial"/>
@@ -5774,16 +5413,16 @@
                 <a:spcPct val="100000"/>
               </a:lnSpc>
             </a:pPr>
-            <a:r>
-              <a:rPr b="0" lang="de-DE" sz="1800" spc="-1" strike="noStrike">
-                <a:solidFill>
-                  <a:srgbClr val="000000"/>
-                </a:solidFill>
-                <a:latin typeface="Arial"/>
-                <a:ea typeface="Droid Sans Fallback"/>
-              </a:rPr>
-              <a:t>. </a:t>
-            </a:r>
+            <a:endParaRPr b="0" lang="de-DE" sz="1800" spc="-1" strike="noStrike">
+              <a:latin typeface="Arial"/>
+            </a:endParaRPr>
+          </a:p>
+          <a:p>
+            <a:pPr>
+              <a:lnSpc>
+                <a:spcPct val="100000"/>
+              </a:lnSpc>
+            </a:pPr>
             <a:endParaRPr b="0" lang="de-DE" sz="1800" spc="-1" strike="noStrike">
               <a:latin typeface="Arial"/>
             </a:endParaRPr>
@@ -5822,14 +5461,14 @@
       </p:grpSpPr>
       <p:sp>
         <p:nvSpPr>
-          <p:cNvPr id="102" name="CustomShape 1"/>
+          <p:cNvPr id="108" name="CustomShape 1"/>
           <p:cNvSpPr/>
           <p:nvPr/>
         </p:nvSpPr>
         <p:spPr>
           <a:xfrm>
             <a:off x="874800" y="343080"/>
-            <a:ext cx="7963200" cy="582840"/>
+            <a:ext cx="7962840" cy="582480"/>
           </a:xfrm>
           <a:prstGeom prst="rect">
             <a:avLst/>
@@ -5848,14 +5487,14 @@
       </p:sp>
       <p:sp>
         <p:nvSpPr>
-          <p:cNvPr id="103" name="CustomShape 2"/>
+          <p:cNvPr id="109" name="CustomShape 2"/>
           <p:cNvSpPr/>
           <p:nvPr/>
         </p:nvSpPr>
         <p:spPr>
           <a:xfrm>
             <a:off x="874800" y="1381680"/>
-            <a:ext cx="3894120" cy="3280320"/>
+            <a:ext cx="3893760" cy="3279960"/>
           </a:xfrm>
           <a:prstGeom prst="rect">
             <a:avLst/>
@@ -5874,14 +5513,14 @@
       </p:sp>
       <p:sp>
         <p:nvSpPr>
-          <p:cNvPr id="104" name="CustomShape 3"/>
+          <p:cNvPr id="110" name="CustomShape 3"/>
           <p:cNvSpPr/>
           <p:nvPr/>
         </p:nvSpPr>
         <p:spPr>
           <a:xfrm>
             <a:off x="874800" y="990360"/>
-            <a:ext cx="3894120" cy="325800"/>
+            <a:ext cx="3893760" cy="325440"/>
           </a:xfrm>
           <a:prstGeom prst="rect">
             <a:avLst/>
@@ -5900,14 +5539,14 @@
       </p:sp>
       <p:sp>
         <p:nvSpPr>
-          <p:cNvPr id="105" name="CustomShape 4"/>
+          <p:cNvPr id="111" name="CustomShape 4"/>
           <p:cNvSpPr/>
           <p:nvPr/>
         </p:nvSpPr>
         <p:spPr>
           <a:xfrm>
             <a:off x="4943520" y="1382400"/>
-            <a:ext cx="3897720" cy="3280320"/>
+            <a:ext cx="3897360" cy="3279960"/>
           </a:xfrm>
           <a:prstGeom prst="rect">
             <a:avLst/>
@@ -5926,14 +5565,14 @@
       </p:sp>
       <p:sp>
         <p:nvSpPr>
-          <p:cNvPr id="106" name="CustomShape 5"/>
+          <p:cNvPr id="112" name="CustomShape 5"/>
           <p:cNvSpPr/>
           <p:nvPr/>
         </p:nvSpPr>
         <p:spPr>
           <a:xfrm>
             <a:off x="4943520" y="990360"/>
-            <a:ext cx="3897720" cy="325800"/>
+            <a:ext cx="3897360" cy="325440"/>
           </a:xfrm>
           <a:prstGeom prst="rect">
             <a:avLst/>
@@ -5952,14 +5591,14 @@
       </p:sp>
       <p:sp>
         <p:nvSpPr>
-          <p:cNvPr id="107" name="CustomShape 6"/>
+          <p:cNvPr id="113" name="CustomShape 6"/>
           <p:cNvSpPr/>
           <p:nvPr/>
         </p:nvSpPr>
         <p:spPr>
           <a:xfrm>
             <a:off x="874800" y="343080"/>
-            <a:ext cx="7963200" cy="582840"/>
+            <a:ext cx="7962840" cy="582480"/>
           </a:xfrm>
           <a:prstGeom prst="rect">
             <a:avLst/>
@@ -5993,7 +5632,7 @@
                 <a:latin typeface="Arial"/>
                 <a:ea typeface="DejaVu Sans"/>
               </a:rPr>
-              <a:t>Gewinnverteilung</a:t>
+              <a:t>Rechenbeispiel II</a:t>
             </a:r>
             <a:endParaRPr b="0" lang="de-DE" sz="2800" spc="-1" strike="noStrike">
               <a:latin typeface="Arial"/>
@@ -6003,14 +5642,14 @@
       </p:sp>
       <p:sp>
         <p:nvSpPr>
-          <p:cNvPr id="108" name="CustomShape 7"/>
+          <p:cNvPr id="114" name="CustomShape 7"/>
           <p:cNvSpPr/>
           <p:nvPr/>
         </p:nvSpPr>
         <p:spPr>
           <a:xfrm>
             <a:off x="822960" y="1188720"/>
-            <a:ext cx="7131600" cy="3161160"/>
+            <a:ext cx="7131240" cy="2703600"/>
           </a:xfrm>
           <a:prstGeom prst="rect">
             <a:avLst/>
@@ -6044,7 +5683,7 @@
                 <a:latin typeface="Arial"/>
                 <a:ea typeface="DejaVu Sans"/>
               </a:rPr>
-              <a:t>1. Nach dem Gesellschaftsvertrag</a:t>
+              <a:t>Verzinsung der Kapitaleinlagen</a:t>
             </a:r>
             <a:endParaRPr b="0" lang="de-DE" sz="1800" spc="-1" strike="noStrike">
               <a:latin typeface="Arial"/>
@@ -6074,8 +5713,18 @@
                 <a:latin typeface="Arial"/>
                 <a:ea typeface="DejaVu Sans"/>
               </a:rPr>
-              <a:t>	</a:t>
-            </a:r>
+              <a:t>4 % von 400.000 € = 16.000 €</a:t>
+            </a:r>
+            <a:endParaRPr b="0" lang="de-DE" sz="1800" spc="-1" strike="noStrike">
+              <a:latin typeface="Arial"/>
+            </a:endParaRPr>
+          </a:p>
+          <a:p>
+            <a:pPr>
+              <a:lnSpc>
+                <a:spcPct val="100000"/>
+              </a:lnSpc>
+            </a:pPr>
             <a:r>
               <a:rPr b="0" lang="de-DE" sz="1800" spc="-1" strike="noStrike">
                 <a:solidFill>
@@ -6084,8 +5733,18 @@
                 <a:latin typeface="Arial"/>
                 <a:ea typeface="DejaVu Sans"/>
               </a:rPr>
-              <a:t>- Gestaltung nach eigenem Interesse</a:t>
-            </a:r>
+              <a:t>4 % von 200.000 € = 8.000 €</a:t>
+            </a:r>
+            <a:endParaRPr b="0" lang="de-DE" sz="1800" spc="-1" strike="noStrike">
+              <a:latin typeface="Arial"/>
+            </a:endParaRPr>
+          </a:p>
+          <a:p>
+            <a:pPr>
+              <a:lnSpc>
+                <a:spcPct val="100000"/>
+              </a:lnSpc>
+            </a:pPr>
             <a:endParaRPr b="0" lang="de-DE" sz="1800" spc="-1" strike="noStrike">
               <a:latin typeface="Arial"/>
             </a:endParaRPr>
@@ -6104,8 +5763,58 @@
                 <a:latin typeface="Arial"/>
                 <a:ea typeface="DejaVu Sans"/>
               </a:rPr>
-              <a:t>	</a:t>
-            </a:r>
+              <a:t>--&gt; 200.000 € - 32.000 € - 8.000 € = 160.000 €</a:t>
+            </a:r>
+            <a:endParaRPr b="0" lang="de-DE" sz="1800" spc="-1" strike="noStrike">
+              <a:latin typeface="Arial"/>
+            </a:endParaRPr>
+          </a:p>
+          <a:p>
+            <a:pPr>
+              <a:lnSpc>
+                <a:spcPct val="100000"/>
+              </a:lnSpc>
+            </a:pPr>
+            <a:endParaRPr b="0" lang="de-DE" sz="1800" spc="-1" strike="noStrike">
+              <a:latin typeface="Arial"/>
+            </a:endParaRPr>
+          </a:p>
+          <a:p>
+            <a:pPr>
+              <a:lnSpc>
+                <a:spcPct val="100000"/>
+              </a:lnSpc>
+            </a:pPr>
+            <a:r>
+              <a:rPr b="1" lang="de-DE" sz="1800" spc="-1" strike="noStrike">
+                <a:solidFill>
+                  <a:srgbClr val="000000"/>
+                </a:solidFill>
+                <a:latin typeface="Arial"/>
+                <a:ea typeface="DejaVu Sans"/>
+              </a:rPr>
+              <a:t>Abzug der Gehälter</a:t>
+            </a:r>
+            <a:endParaRPr b="0" lang="de-DE" sz="1800" spc="-1" strike="noStrike">
+              <a:latin typeface="Arial"/>
+            </a:endParaRPr>
+          </a:p>
+          <a:p>
+            <a:pPr>
+              <a:lnSpc>
+                <a:spcPct val="100000"/>
+              </a:lnSpc>
+            </a:pPr>
+            <a:endParaRPr b="0" lang="de-DE" sz="1800" spc="-1" strike="noStrike">
+              <a:latin typeface="Arial"/>
+            </a:endParaRPr>
+          </a:p>
+          <a:p>
+            <a:pPr>
+              <a:lnSpc>
+                <a:spcPct val="100000"/>
+              </a:lnSpc>
+            </a:pPr>
             <a:r>
               <a:rPr b="0" lang="de-DE" sz="1800" spc="-1" strike="noStrike">
                 <a:solidFill>
@@ -6114,197 +5823,7 @@
                 <a:latin typeface="Arial"/>
                 <a:ea typeface="DejaVu Sans"/>
               </a:rPr>
-              <a:t>- Höhe der Kapitaleinlagen</a:t>
-            </a:r>
-            <a:endParaRPr b="0" lang="de-DE" sz="1800" spc="-1" strike="noStrike">
-              <a:latin typeface="Arial"/>
-            </a:endParaRPr>
-          </a:p>
-          <a:p>
-            <a:pPr>
-              <a:lnSpc>
-                <a:spcPct val="100000"/>
-              </a:lnSpc>
-            </a:pPr>
-            <a:r>
-              <a:rPr b="0" lang="de-DE" sz="1800" spc="-1" strike="noStrike">
-                <a:solidFill>
-                  <a:srgbClr val="000000"/>
-                </a:solidFill>
-                <a:latin typeface="Arial"/>
-                <a:ea typeface="DejaVu Sans"/>
-              </a:rPr>
-              <a:t>	</a:t>
-            </a:r>
-            <a:r>
-              <a:rPr b="0" lang="de-DE" sz="1800" spc="-1" strike="noStrike">
-                <a:solidFill>
-                  <a:srgbClr val="000000"/>
-                </a:solidFill>
-                <a:latin typeface="Arial"/>
-                <a:ea typeface="DejaVu Sans"/>
-              </a:rPr>
-              <a:t>- Pflicht: Beteiligung an der Gesellschaft</a:t>
-            </a:r>
-            <a:endParaRPr b="0" lang="de-DE" sz="1800" spc="-1" strike="noStrike">
-              <a:latin typeface="Arial"/>
-            </a:endParaRPr>
-          </a:p>
-          <a:p>
-            <a:pPr>
-              <a:lnSpc>
-                <a:spcPct val="100000"/>
-              </a:lnSpc>
-            </a:pPr>
-            <a:endParaRPr b="0" lang="de-DE" sz="1800" spc="-1" strike="noStrike">
-              <a:latin typeface="Arial"/>
-            </a:endParaRPr>
-          </a:p>
-          <a:p>
-            <a:pPr>
-              <a:lnSpc>
-                <a:spcPct val="100000"/>
-              </a:lnSpc>
-            </a:pPr>
-            <a:r>
-              <a:rPr b="1" lang="de-DE" sz="1800" spc="-1" strike="noStrike">
-                <a:solidFill>
-                  <a:srgbClr val="000000"/>
-                </a:solidFill>
-                <a:latin typeface="Arial"/>
-                <a:ea typeface="DejaVu Sans"/>
-              </a:rPr>
-              <a:t>2. Nach dem Handelsgesetzbuch</a:t>
-            </a:r>
-            <a:endParaRPr b="0" lang="de-DE" sz="1800" spc="-1" strike="noStrike">
-              <a:latin typeface="Arial"/>
-            </a:endParaRPr>
-          </a:p>
-          <a:p>
-            <a:pPr>
-              <a:lnSpc>
-                <a:spcPct val="100000"/>
-              </a:lnSpc>
-            </a:pPr>
-            <a:endParaRPr b="0" lang="de-DE" sz="1800" spc="-1" strike="noStrike">
-              <a:latin typeface="Arial"/>
-            </a:endParaRPr>
-          </a:p>
-          <a:p>
-            <a:pPr>
-              <a:lnSpc>
-                <a:spcPct val="100000"/>
-              </a:lnSpc>
-            </a:pPr>
-            <a:r>
-              <a:rPr b="0" lang="de-DE" sz="1800" spc="-1" strike="noStrike">
-                <a:solidFill>
-                  <a:srgbClr val="000000"/>
-                </a:solidFill>
-                <a:latin typeface="Arial"/>
-                <a:ea typeface="DejaVu Sans"/>
-              </a:rPr>
-              <a:t>	</a:t>
-            </a:r>
-            <a:r>
-              <a:rPr b="0" lang="de-DE" sz="1800" spc="-1" strike="noStrike">
-                <a:solidFill>
-                  <a:srgbClr val="000000"/>
-                </a:solidFill>
-                <a:latin typeface="Arial"/>
-                <a:ea typeface="DejaVu Sans"/>
-              </a:rPr>
-              <a:t>- angemessene Verteilung (Höhe Kapitaleinlage)</a:t>
-            </a:r>
-            <a:endParaRPr b="0" lang="de-DE" sz="1800" spc="-1" strike="noStrike">
-              <a:latin typeface="Arial"/>
-            </a:endParaRPr>
-          </a:p>
-          <a:p>
-            <a:pPr>
-              <a:lnSpc>
-                <a:spcPct val="100000"/>
-              </a:lnSpc>
-            </a:pPr>
-            <a:r>
-              <a:rPr b="0" lang="de-DE" sz="1800" spc="-1" strike="noStrike">
-                <a:solidFill>
-                  <a:srgbClr val="000000"/>
-                </a:solidFill>
-                <a:latin typeface="Arial"/>
-                <a:ea typeface="DejaVu Sans"/>
-              </a:rPr>
-              <a:t>	</a:t>
-            </a:r>
-            <a:r>
-              <a:rPr b="0" lang="de-DE" sz="1800" spc="-1" strike="noStrike">
-                <a:solidFill>
-                  <a:srgbClr val="000000"/>
-                </a:solidFill>
-                <a:latin typeface="Arial"/>
-                <a:ea typeface="DejaVu Sans"/>
-              </a:rPr>
-              <a:t>- festgelegter Gewinn: 4 % Verzinsung Kapitaleinlagen</a:t>
-            </a:r>
-            <a:endParaRPr b="0" lang="de-DE" sz="1800" spc="-1" strike="noStrike">
-              <a:latin typeface="Arial"/>
-            </a:endParaRPr>
-          </a:p>
-          <a:p>
-            <a:pPr>
-              <a:lnSpc>
-                <a:spcPct val="100000"/>
-              </a:lnSpc>
-            </a:pPr>
-            <a:r>
-              <a:rPr b="0" lang="de-DE" sz="1800" spc="-1" strike="noStrike">
-                <a:solidFill>
-                  <a:srgbClr val="000000"/>
-                </a:solidFill>
-                <a:latin typeface="Arial"/>
-                <a:ea typeface="DejaVu Sans"/>
-              </a:rPr>
-              <a:t>	</a:t>
-            </a:r>
-            <a:r>
-              <a:rPr b="0" lang="de-DE" sz="1800" spc="-1" strike="noStrike">
-                <a:solidFill>
-                  <a:srgbClr val="000000"/>
-                </a:solidFill>
-                <a:latin typeface="Arial"/>
-                <a:ea typeface="DejaVu Sans"/>
-              </a:rPr>
-              <a:t>- Zinssumme und Gehalt werden vom Gewinn abgezogen</a:t>
-            </a:r>
-            <a:endParaRPr b="0" lang="de-DE" sz="1800" spc="-1" strike="noStrike">
-              <a:latin typeface="Arial"/>
-            </a:endParaRPr>
-          </a:p>
-          <a:p>
-            <a:pPr>
-              <a:lnSpc>
-                <a:spcPct val="100000"/>
-              </a:lnSpc>
-            </a:pPr>
-            <a:r>
-              <a:rPr b="0" lang="de-DE" sz="1800" spc="-1" strike="noStrike">
-                <a:solidFill>
-                  <a:srgbClr val="000000"/>
-                </a:solidFill>
-                <a:latin typeface="Arial"/>
-                <a:ea typeface="DejaVu Sans"/>
-              </a:rPr>
-              <a:t>	</a:t>
-            </a:r>
-            <a:r>
-              <a:rPr b="0" lang="de-DE" sz="1800" spc="-1" strike="noStrike">
-                <a:solidFill>
-                  <a:srgbClr val="000000"/>
-                </a:solidFill>
-                <a:latin typeface="Arial"/>
-                <a:ea typeface="DejaVu Sans"/>
-              </a:rPr>
-              <a:t>- Restlicher Gewinn wird verteilt</a:t>
+              <a:t>160.000 € - 100.000 € = 60.000 €</a:t>
             </a:r>
             <a:endParaRPr b="0" lang="de-DE" sz="1800" spc="-1" strike="noStrike">
               <a:latin typeface="Arial"/>
@@ -6344,14 +5863,14 @@
       </p:grpSpPr>
       <p:sp>
         <p:nvSpPr>
-          <p:cNvPr id="109" name="CustomShape 1"/>
+          <p:cNvPr id="115" name="CustomShape 1"/>
           <p:cNvSpPr/>
           <p:nvPr/>
         </p:nvSpPr>
         <p:spPr>
           <a:xfrm>
             <a:off x="874800" y="343080"/>
-            <a:ext cx="7963200" cy="582840"/>
+            <a:ext cx="7962840" cy="582480"/>
           </a:xfrm>
           <a:prstGeom prst="rect">
             <a:avLst/>
@@ -6370,14 +5889,14 @@
       </p:sp>
       <p:sp>
         <p:nvSpPr>
-          <p:cNvPr id="110" name="CustomShape 2"/>
+          <p:cNvPr id="116" name="CustomShape 2"/>
           <p:cNvSpPr/>
           <p:nvPr/>
         </p:nvSpPr>
         <p:spPr>
           <a:xfrm>
             <a:off x="874800" y="1381680"/>
-            <a:ext cx="3894120" cy="3280320"/>
+            <a:ext cx="3893760" cy="3279960"/>
           </a:xfrm>
           <a:prstGeom prst="rect">
             <a:avLst/>
@@ -6396,14 +5915,14 @@
       </p:sp>
       <p:sp>
         <p:nvSpPr>
-          <p:cNvPr id="111" name="CustomShape 3"/>
+          <p:cNvPr id="117" name="CustomShape 3"/>
           <p:cNvSpPr/>
           <p:nvPr/>
         </p:nvSpPr>
         <p:spPr>
           <a:xfrm>
             <a:off x="874800" y="990360"/>
-            <a:ext cx="3894120" cy="325800"/>
+            <a:ext cx="3893760" cy="325440"/>
           </a:xfrm>
           <a:prstGeom prst="rect">
             <a:avLst/>
@@ -6422,14 +5941,14 @@
       </p:sp>
       <p:sp>
         <p:nvSpPr>
-          <p:cNvPr id="112" name="CustomShape 4"/>
+          <p:cNvPr id="118" name="CustomShape 4"/>
           <p:cNvSpPr/>
           <p:nvPr/>
         </p:nvSpPr>
         <p:spPr>
           <a:xfrm>
             <a:off x="4943520" y="1382400"/>
-            <a:ext cx="3897720" cy="3280320"/>
+            <a:ext cx="3897360" cy="3279960"/>
           </a:xfrm>
           <a:prstGeom prst="rect">
             <a:avLst/>
@@ -6448,14 +5967,14 @@
       </p:sp>
       <p:sp>
         <p:nvSpPr>
-          <p:cNvPr id="113" name="CustomShape 5"/>
+          <p:cNvPr id="119" name="CustomShape 5"/>
           <p:cNvSpPr/>
           <p:nvPr/>
         </p:nvSpPr>
         <p:spPr>
           <a:xfrm>
             <a:off x="4943520" y="990360"/>
-            <a:ext cx="3897720" cy="325800"/>
+            <a:ext cx="3897360" cy="325440"/>
           </a:xfrm>
           <a:prstGeom prst="rect">
             <a:avLst/>
@@ -6474,14 +5993,14 @@
       </p:sp>
       <p:sp>
         <p:nvSpPr>
-          <p:cNvPr id="114" name="CustomShape 6"/>
+          <p:cNvPr id="120" name="CustomShape 6"/>
           <p:cNvSpPr/>
           <p:nvPr/>
         </p:nvSpPr>
         <p:spPr>
           <a:xfrm>
             <a:off x="874800" y="343080"/>
-            <a:ext cx="7963200" cy="582840"/>
+            <a:ext cx="7962840" cy="582480"/>
           </a:xfrm>
           <a:prstGeom prst="rect">
             <a:avLst/>
@@ -6515,7 +6034,7 @@
                 <a:latin typeface="Arial"/>
                 <a:ea typeface="DejaVu Sans"/>
               </a:rPr>
-              <a:t>Rechenbeispiel</a:t>
+              <a:t>Rechenbeispiel III</a:t>
             </a:r>
             <a:endParaRPr b="0" lang="de-DE" sz="2800" spc="-1" strike="noStrike">
               <a:latin typeface="Arial"/>
@@ -6525,14 +6044,14 @@
       </p:sp>
       <p:sp>
         <p:nvSpPr>
-          <p:cNvPr id="115" name="CustomShape 7"/>
+          <p:cNvPr id="121" name="CustomShape 7"/>
           <p:cNvSpPr/>
           <p:nvPr/>
         </p:nvSpPr>
         <p:spPr>
           <a:xfrm>
             <a:off x="822960" y="1188720"/>
-            <a:ext cx="7131600" cy="3141720"/>
+            <a:ext cx="7131240" cy="2648880"/>
           </a:xfrm>
           <a:prstGeom prst="rect">
             <a:avLst/>
@@ -6559,6 +6078,36 @@
               </a:lnSpc>
             </a:pPr>
             <a:r>
+              <a:rPr b="1" lang="de-DE" sz="1800" spc="-1" strike="noStrike">
+                <a:solidFill>
+                  <a:srgbClr val="000000"/>
+                </a:solidFill>
+                <a:latin typeface="Arial"/>
+                <a:ea typeface="DejaVu Sans"/>
+              </a:rPr>
+              <a:t>Verteilung anhand der Kapitaleinlagen</a:t>
+            </a:r>
+            <a:endParaRPr b="0" lang="de-DE" sz="1800" spc="-1" strike="noStrike">
+              <a:latin typeface="Arial"/>
+            </a:endParaRPr>
+          </a:p>
+          <a:p>
+            <a:pPr>
+              <a:lnSpc>
+                <a:spcPct val="100000"/>
+              </a:lnSpc>
+            </a:pPr>
+            <a:endParaRPr b="0" lang="de-DE" sz="1800" spc="-1" strike="noStrike">
+              <a:latin typeface="Arial"/>
+            </a:endParaRPr>
+          </a:p>
+          <a:p>
+            <a:pPr>
+              <a:lnSpc>
+                <a:spcPct val="100000"/>
+              </a:lnSpc>
+            </a:pPr>
+            <a:r>
               <a:rPr b="0" lang="de-DE" sz="1800" spc="-1" strike="noStrike">
                 <a:solidFill>
                   <a:srgbClr val="000000"/>
@@ -6566,18 +6115,8 @@
                 <a:latin typeface="Arial"/>
                 <a:ea typeface="DejaVu Sans"/>
               </a:rPr>
-              <a:t>Gewinn: 200.000 €</a:t>
-            </a:r>
-            <a:endParaRPr b="0" lang="de-DE" sz="1800" spc="-1" strike="noStrike">
-              <a:latin typeface="Arial"/>
-            </a:endParaRPr>
-          </a:p>
-          <a:p>
-            <a:pPr>
-              <a:lnSpc>
-                <a:spcPct val="100000"/>
-              </a:lnSpc>
-            </a:pPr>
+              <a:t>60.000 € * 0,4 = 24.000 €</a:t>
+            </a:r>
             <a:endParaRPr b="0" lang="de-DE" sz="1800" spc="-1" strike="noStrike">
               <a:latin typeface="Arial"/>
             </a:endParaRPr>
@@ -6596,7 +6135,47 @@
                 <a:latin typeface="Arial"/>
                 <a:ea typeface="DejaVu Sans"/>
               </a:rPr>
-              <a:t>2 Komplementäre: je 400.000 € Kapitaleinlage, 50.000 € Gehalt</a:t>
+              <a:t>60.000 € * 0,2 = 12.000 €</a:t>
+            </a:r>
+            <a:endParaRPr b="0" lang="de-DE" sz="1800" spc="-1" strike="noStrike">
+              <a:latin typeface="Arial"/>
+            </a:endParaRPr>
+          </a:p>
+          <a:p>
+            <a:pPr>
+              <a:lnSpc>
+                <a:spcPct val="100000"/>
+              </a:lnSpc>
+            </a:pPr>
+            <a:endParaRPr b="0" lang="de-DE" sz="1800" spc="-1" strike="noStrike">
+              <a:latin typeface="Arial"/>
+            </a:endParaRPr>
+          </a:p>
+          <a:p>
+            <a:pPr>
+              <a:lnSpc>
+                <a:spcPct val="100000"/>
+              </a:lnSpc>
+            </a:pPr>
+            <a:endParaRPr b="0" lang="de-DE" sz="1800" spc="-1" strike="noStrike">
+              <a:latin typeface="Arial"/>
+            </a:endParaRPr>
+          </a:p>
+          <a:p>
+            <a:pPr>
+              <a:lnSpc>
+                <a:spcPct val="100000"/>
+              </a:lnSpc>
+            </a:pPr>
+            <a:r>
+              <a:rPr b="1" lang="de-DE" sz="1800" spc="-1" strike="noStrike">
+                <a:solidFill>
+                  <a:srgbClr val="000000"/>
+                </a:solidFill>
+                <a:latin typeface="Arial"/>
+                <a:ea typeface="DejaVu Sans"/>
+              </a:rPr>
+              <a:t>Persönlicher Gesamtgewinn</a:t>
             </a:r>
             <a:endParaRPr b="0" lang="de-DE" sz="1800" spc="-1" strike="noStrike">
               <a:latin typeface="Arial"/>
@@ -6626,7 +6205,7 @@
                 <a:latin typeface="Arial"/>
                 <a:ea typeface="DejaVu Sans"/>
               </a:rPr>
-              <a:t>1 Kommanditist: 100.000 € Kapitaleinlage</a:t>
+              <a:t>16.000 € + 50.000 € + 24.000 € = 90.000 €</a:t>
             </a:r>
             <a:endParaRPr b="0" lang="de-DE" sz="1800" spc="-1" strike="noStrike">
               <a:latin typeface="Arial"/>
@@ -6638,46 +6217,16 @@
                 <a:spcPct val="100000"/>
               </a:lnSpc>
             </a:pPr>
-            <a:endParaRPr b="0" lang="de-DE" sz="1800" spc="-1" strike="noStrike">
-              <a:latin typeface="Arial"/>
-            </a:endParaRPr>
-          </a:p>
-          <a:p>
-            <a:pPr>
-              <a:lnSpc>
-                <a:spcPct val="100000"/>
-              </a:lnSpc>
-            </a:pPr>
-            <a:endParaRPr b="0" lang="de-DE" sz="1800" spc="-1" strike="noStrike">
-              <a:latin typeface="Arial"/>
-            </a:endParaRPr>
-          </a:p>
-          <a:p>
-            <a:pPr>
-              <a:lnSpc>
-                <a:spcPct val="100000"/>
-              </a:lnSpc>
-            </a:pPr>
-            <a:endParaRPr b="0" lang="de-DE" sz="1800" spc="-1" strike="noStrike">
-              <a:latin typeface="Arial"/>
-            </a:endParaRPr>
-          </a:p>
-          <a:p>
-            <a:pPr>
-              <a:lnSpc>
-                <a:spcPct val="100000"/>
-              </a:lnSpc>
-            </a:pPr>
-            <a:endParaRPr b="0" lang="de-DE" sz="1800" spc="-1" strike="noStrike">
-              <a:latin typeface="Arial"/>
-            </a:endParaRPr>
-          </a:p>
-          <a:p>
-            <a:pPr>
-              <a:lnSpc>
-                <a:spcPct val="100000"/>
-              </a:lnSpc>
-            </a:pPr>
+            <a:r>
+              <a:rPr b="0" lang="de-DE" sz="1800" spc="-1" strike="noStrike">
+                <a:solidFill>
+                  <a:srgbClr val="000000"/>
+                </a:solidFill>
+                <a:latin typeface="Arial"/>
+                <a:ea typeface="DejaVu Sans"/>
+              </a:rPr>
+              <a:t>8.000 € + 12.000 € = 20.000 €</a:t>
+            </a:r>
             <a:endParaRPr b="0" lang="de-DE" sz="1800" spc="-1" strike="noStrike">
               <a:latin typeface="Arial"/>
             </a:endParaRPr>
@@ -6716,14 +6265,14 @@
       </p:grpSpPr>
       <p:sp>
         <p:nvSpPr>
-          <p:cNvPr id="116" name="CustomShape 1"/>
+          <p:cNvPr id="122" name="CustomShape 1"/>
           <p:cNvSpPr/>
           <p:nvPr/>
         </p:nvSpPr>
         <p:spPr>
           <a:xfrm>
             <a:off x="874800" y="343080"/>
-            <a:ext cx="7963200" cy="582840"/>
+            <a:ext cx="7962840" cy="582480"/>
           </a:xfrm>
           <a:prstGeom prst="rect">
             <a:avLst/>
@@ -6742,14 +6291,14 @@
       </p:sp>
       <p:sp>
         <p:nvSpPr>
-          <p:cNvPr id="117" name="CustomShape 2"/>
+          <p:cNvPr id="123" name="CustomShape 2"/>
           <p:cNvSpPr/>
           <p:nvPr/>
         </p:nvSpPr>
         <p:spPr>
           <a:xfrm>
             <a:off x="874800" y="1381680"/>
-            <a:ext cx="3894120" cy="3280320"/>
+            <a:ext cx="3893760" cy="3279960"/>
           </a:xfrm>
           <a:prstGeom prst="rect">
             <a:avLst/>
@@ -6768,14 +6317,14 @@
       </p:sp>
       <p:sp>
         <p:nvSpPr>
-          <p:cNvPr id="118" name="CustomShape 3"/>
+          <p:cNvPr id="124" name="CustomShape 3"/>
           <p:cNvSpPr/>
           <p:nvPr/>
         </p:nvSpPr>
         <p:spPr>
           <a:xfrm>
             <a:off x="874800" y="990360"/>
-            <a:ext cx="3894120" cy="325800"/>
+            <a:ext cx="3893760" cy="325440"/>
           </a:xfrm>
           <a:prstGeom prst="rect">
             <a:avLst/>
@@ -6794,14 +6343,14 @@
       </p:sp>
       <p:sp>
         <p:nvSpPr>
-          <p:cNvPr id="119" name="CustomShape 4"/>
+          <p:cNvPr id="125" name="CustomShape 4"/>
           <p:cNvSpPr/>
           <p:nvPr/>
         </p:nvSpPr>
         <p:spPr>
           <a:xfrm>
             <a:off x="4943520" y="1382400"/>
-            <a:ext cx="3897720" cy="3280320"/>
+            <a:ext cx="3897360" cy="3279960"/>
           </a:xfrm>
           <a:prstGeom prst="rect">
             <a:avLst/>
@@ -6820,14 +6369,14 @@
       </p:sp>
       <p:sp>
         <p:nvSpPr>
-          <p:cNvPr id="120" name="CustomShape 5"/>
+          <p:cNvPr id="126" name="CustomShape 5"/>
           <p:cNvSpPr/>
           <p:nvPr/>
         </p:nvSpPr>
         <p:spPr>
           <a:xfrm>
             <a:off x="4943520" y="990360"/>
-            <a:ext cx="3897720" cy="325800"/>
+            <a:ext cx="3897360" cy="325440"/>
           </a:xfrm>
           <a:prstGeom prst="rect">
             <a:avLst/>
@@ -6846,14 +6395,14 @@
       </p:sp>
       <p:sp>
         <p:nvSpPr>
-          <p:cNvPr id="121" name="CustomShape 6"/>
+          <p:cNvPr id="127" name="CustomShape 6"/>
           <p:cNvSpPr/>
           <p:nvPr/>
         </p:nvSpPr>
         <p:spPr>
           <a:xfrm>
             <a:off x="874800" y="343080"/>
-            <a:ext cx="7963200" cy="582840"/>
+            <a:ext cx="7962840" cy="582480"/>
           </a:xfrm>
           <a:prstGeom prst="rect">
             <a:avLst/>
@@ -6887,7 +6436,7 @@
                 <a:latin typeface="Arial"/>
                 <a:ea typeface="DejaVu Sans"/>
               </a:rPr>
-              <a:t>Rechenbeispiel II</a:t>
+              <a:t>Verlustverteilung</a:t>
             </a:r>
             <a:endParaRPr b="0" lang="de-DE" sz="2800" spc="-1" strike="noStrike">
               <a:latin typeface="Arial"/>
@@ -6897,14 +6446,14 @@
       </p:sp>
       <p:sp>
         <p:nvSpPr>
-          <p:cNvPr id="122" name="CustomShape 7"/>
+          <p:cNvPr id="128" name="CustomShape 7"/>
           <p:cNvSpPr/>
           <p:nvPr/>
         </p:nvSpPr>
         <p:spPr>
           <a:xfrm>
             <a:off x="822960" y="1188720"/>
-            <a:ext cx="7131600" cy="2703960"/>
+            <a:ext cx="7131240" cy="1881000"/>
           </a:xfrm>
           <a:prstGeom prst="rect">
             <a:avLst/>
@@ -6931,36 +6480,6 @@
               </a:lnSpc>
             </a:pPr>
             <a:r>
-              <a:rPr b="1" lang="de-DE" sz="1800" spc="-1" strike="noStrike">
-                <a:solidFill>
-                  <a:srgbClr val="000000"/>
-                </a:solidFill>
-                <a:latin typeface="Arial"/>
-                <a:ea typeface="DejaVu Sans"/>
-              </a:rPr>
-              <a:t>Verzinsung der Kapitaleinlagen</a:t>
-            </a:r>
-            <a:endParaRPr b="0" lang="de-DE" sz="1800" spc="-1" strike="noStrike">
-              <a:latin typeface="Arial"/>
-            </a:endParaRPr>
-          </a:p>
-          <a:p>
-            <a:pPr>
-              <a:lnSpc>
-                <a:spcPct val="100000"/>
-              </a:lnSpc>
-            </a:pPr>
-            <a:endParaRPr b="0" lang="de-DE" sz="1800" spc="-1" strike="noStrike">
-              <a:latin typeface="Arial"/>
-            </a:endParaRPr>
-          </a:p>
-          <a:p>
-            <a:pPr>
-              <a:lnSpc>
-                <a:spcPct val="100000"/>
-              </a:lnSpc>
-            </a:pPr>
-            <a:r>
               <a:rPr b="0" lang="de-DE" sz="1800" spc="-1" strike="noStrike">
                 <a:solidFill>
                   <a:srgbClr val="000000"/>
@@ -6968,8 +6487,18 @@
                 <a:latin typeface="Arial"/>
                 <a:ea typeface="DejaVu Sans"/>
               </a:rPr>
-              <a:t>4 % von 400.000 € = 16.000 €</a:t>
-            </a:r>
+              <a:t>- Verluste werden wie Gewinne verteilt</a:t>
+            </a:r>
+            <a:endParaRPr b="0" lang="de-DE" sz="1800" spc="-1" strike="noStrike">
+              <a:latin typeface="Arial"/>
+            </a:endParaRPr>
+          </a:p>
+          <a:p>
+            <a:pPr>
+              <a:lnSpc>
+                <a:spcPct val="100000"/>
+              </a:lnSpc>
+            </a:pPr>
             <a:endParaRPr b="0" lang="de-DE" sz="1800" spc="-1" strike="noStrike">
               <a:latin typeface="Arial"/>
             </a:endParaRPr>
@@ -6988,7 +6517,7 @@
                 <a:latin typeface="Arial"/>
                 <a:ea typeface="DejaVu Sans"/>
               </a:rPr>
-              <a:t>4 % von 200.000 € = 8.000 €</a:t>
+              <a:t>- Kommanditisten haften maximal mit Höhe ihrer Kapitaleinlagen</a:t>
             </a:r>
             <a:endParaRPr b="0" lang="de-DE" sz="1800" spc="-1" strike="noStrike">
               <a:latin typeface="Arial"/>
@@ -7018,7 +6547,7 @@
                 <a:latin typeface="Arial"/>
                 <a:ea typeface="DejaVu Sans"/>
               </a:rPr>
-              <a:t>--&gt; 200.000 € - 32.000 € - 8.000 € = 160.000 €</a:t>
+              <a:t>- Komplementäre haften unbeschränkt</a:t>
             </a:r>
             <a:endParaRPr b="0" lang="de-DE" sz="1800" spc="-1" strike="noStrike">
               <a:latin typeface="Arial"/>
@@ -7040,448 +6569,6 @@
                 <a:spcPct val="100000"/>
               </a:lnSpc>
             </a:pPr>
-            <a:r>
-              <a:rPr b="1" lang="de-DE" sz="1800" spc="-1" strike="noStrike">
-                <a:solidFill>
-                  <a:srgbClr val="000000"/>
-                </a:solidFill>
-                <a:latin typeface="Arial"/>
-                <a:ea typeface="DejaVu Sans"/>
-              </a:rPr>
-              <a:t>Abzug der Gehälter</a:t>
-            </a:r>
-            <a:endParaRPr b="0" lang="de-DE" sz="1800" spc="-1" strike="noStrike">
-              <a:latin typeface="Arial"/>
-            </a:endParaRPr>
-          </a:p>
-          <a:p>
-            <a:pPr>
-              <a:lnSpc>
-                <a:spcPct val="100000"/>
-              </a:lnSpc>
-            </a:pPr>
-            <a:endParaRPr b="0" lang="de-DE" sz="1800" spc="-1" strike="noStrike">
-              <a:latin typeface="Arial"/>
-            </a:endParaRPr>
-          </a:p>
-          <a:p>
-            <a:pPr>
-              <a:lnSpc>
-                <a:spcPct val="100000"/>
-              </a:lnSpc>
-            </a:pPr>
-            <a:r>
-              <a:rPr b="0" lang="de-DE" sz="1800" spc="-1" strike="noStrike">
-                <a:solidFill>
-                  <a:srgbClr val="000000"/>
-                </a:solidFill>
-                <a:latin typeface="Arial"/>
-                <a:ea typeface="DejaVu Sans"/>
-              </a:rPr>
-              <a:t>160.000 € - 100.000 € = 60.000 €</a:t>
-            </a:r>
-            <a:endParaRPr b="0" lang="de-DE" sz="1800" spc="-1" strike="noStrike">
-              <a:latin typeface="Arial"/>
-            </a:endParaRPr>
-          </a:p>
-        </p:txBody>
-      </p:sp>
-    </p:spTree>
-  </p:cSld>
-  <mc:AlternateContent>
-    <mc:Choice Requires="p14">
-      <p:transition p14:dur="10"/>
-    </mc:Choice>
-    <mc:Fallback>
-      <p:transition/>
-    </mc:Fallback>
-  </mc:AlternateContent>
-</p:sld>
-</file>
-
-<file path=ppt/slides/slide9.xml><?xml version="1.0" encoding="utf-8"?>
-<p:sld xmlns:a="http://schemas.openxmlformats.org/drawingml/2006/main" xmlns:p="http://schemas.openxmlformats.org/presentationml/2006/main" xmlns:r="http://schemas.openxmlformats.org/officeDocument/2006/relationships" xmlns:p14="http://schemas.microsoft.com/office/powerpoint/2010/main" xmlns:p15="http://schemas.microsoft.com/office/powerpoint/2012/main" xmlns:mc="http://schemas.openxmlformats.org/markup-compatibility/2006">
-  <p:cSld>
-    <p:spTree>
-      <p:nvGrpSpPr>
-        <p:cNvPr id="1" name=""/>
-        <p:cNvGrpSpPr/>
-        <p:nvPr/>
-      </p:nvGrpSpPr>
-      <p:grpSpPr>
-        <a:xfrm>
-          <a:off x="0" y="0"/>
-          <a:ext cx="0" cy="0"/>
-          <a:chOff x="0" y="0"/>
-          <a:chExt cx="0" cy="0"/>
-        </a:xfrm>
-      </p:grpSpPr>
-      <p:sp>
-        <p:nvSpPr>
-          <p:cNvPr id="123" name="CustomShape 1"/>
-          <p:cNvSpPr/>
-          <p:nvPr/>
-        </p:nvSpPr>
-        <p:spPr>
-          <a:xfrm>
-            <a:off x="874800" y="343080"/>
-            <a:ext cx="7963200" cy="582840"/>
-          </a:xfrm>
-          <a:prstGeom prst="rect">
-            <a:avLst/>
-          </a:prstGeom>
-          <a:noFill/>
-          <a:ln>
-            <a:noFill/>
-          </a:ln>
-        </p:spPr>
-        <p:style>
-          <a:lnRef idx="0"/>
-          <a:fillRef idx="0"/>
-          <a:effectRef idx="0"/>
-          <a:fontRef idx="minor"/>
-        </p:style>
-      </p:sp>
-      <p:sp>
-        <p:nvSpPr>
-          <p:cNvPr id="124" name="CustomShape 2"/>
-          <p:cNvSpPr/>
-          <p:nvPr/>
-        </p:nvSpPr>
-        <p:spPr>
-          <a:xfrm>
-            <a:off x="874800" y="1381680"/>
-            <a:ext cx="3894120" cy="3280320"/>
-          </a:xfrm>
-          <a:prstGeom prst="rect">
-            <a:avLst/>
-          </a:prstGeom>
-          <a:noFill/>
-          <a:ln>
-            <a:noFill/>
-          </a:ln>
-        </p:spPr>
-        <p:style>
-          <a:lnRef idx="0"/>
-          <a:fillRef idx="0"/>
-          <a:effectRef idx="0"/>
-          <a:fontRef idx="minor"/>
-        </p:style>
-      </p:sp>
-      <p:sp>
-        <p:nvSpPr>
-          <p:cNvPr id="125" name="CustomShape 3"/>
-          <p:cNvSpPr/>
-          <p:nvPr/>
-        </p:nvSpPr>
-        <p:spPr>
-          <a:xfrm>
-            <a:off x="874800" y="990360"/>
-            <a:ext cx="3894120" cy="325800"/>
-          </a:xfrm>
-          <a:prstGeom prst="rect">
-            <a:avLst/>
-          </a:prstGeom>
-          <a:noFill/>
-          <a:ln>
-            <a:noFill/>
-          </a:ln>
-        </p:spPr>
-        <p:style>
-          <a:lnRef idx="0"/>
-          <a:fillRef idx="0"/>
-          <a:effectRef idx="0"/>
-          <a:fontRef idx="minor"/>
-        </p:style>
-      </p:sp>
-      <p:sp>
-        <p:nvSpPr>
-          <p:cNvPr id="126" name="CustomShape 4"/>
-          <p:cNvSpPr/>
-          <p:nvPr/>
-        </p:nvSpPr>
-        <p:spPr>
-          <a:xfrm>
-            <a:off x="4943520" y="1382400"/>
-            <a:ext cx="3897720" cy="3280320"/>
-          </a:xfrm>
-          <a:prstGeom prst="rect">
-            <a:avLst/>
-          </a:prstGeom>
-          <a:noFill/>
-          <a:ln>
-            <a:noFill/>
-          </a:ln>
-        </p:spPr>
-        <p:style>
-          <a:lnRef idx="0"/>
-          <a:fillRef idx="0"/>
-          <a:effectRef idx="0"/>
-          <a:fontRef idx="minor"/>
-        </p:style>
-      </p:sp>
-      <p:sp>
-        <p:nvSpPr>
-          <p:cNvPr id="127" name="CustomShape 5"/>
-          <p:cNvSpPr/>
-          <p:nvPr/>
-        </p:nvSpPr>
-        <p:spPr>
-          <a:xfrm>
-            <a:off x="4943520" y="990360"/>
-            <a:ext cx="3897720" cy="325800"/>
-          </a:xfrm>
-          <a:prstGeom prst="rect">
-            <a:avLst/>
-          </a:prstGeom>
-          <a:noFill/>
-          <a:ln>
-            <a:noFill/>
-          </a:ln>
-        </p:spPr>
-        <p:style>
-          <a:lnRef idx="0"/>
-          <a:fillRef idx="0"/>
-          <a:effectRef idx="0"/>
-          <a:fontRef idx="minor"/>
-        </p:style>
-      </p:sp>
-      <p:sp>
-        <p:nvSpPr>
-          <p:cNvPr id="128" name="CustomShape 6"/>
-          <p:cNvSpPr/>
-          <p:nvPr/>
-        </p:nvSpPr>
-        <p:spPr>
-          <a:xfrm>
-            <a:off x="874800" y="343080"/>
-            <a:ext cx="7963200" cy="582840"/>
-          </a:xfrm>
-          <a:prstGeom prst="rect">
-            <a:avLst/>
-          </a:prstGeom>
-          <a:noFill/>
-          <a:ln>
-            <a:noFill/>
-          </a:ln>
-        </p:spPr>
-        <p:style>
-          <a:lnRef idx="0"/>
-          <a:fillRef idx="0"/>
-          <a:effectRef idx="0"/>
-          <a:fontRef idx="minor"/>
-        </p:style>
-        <p:txBody>
-          <a:bodyPr lIns="90000" rIns="90000" tIns="45000" bIns="45000" anchor="ctr">
-            <a:noAutofit/>
-          </a:bodyPr>
-          <a:p>
-            <a:pPr>
-              <a:lnSpc>
-                <a:spcPts val="2520"/>
-              </a:lnSpc>
-            </a:pPr>
-            <a:r>
-              <a:rPr b="1" lang="de-DE" sz="2800" spc="-1" strike="noStrike">
-                <a:solidFill>
-                  <a:srgbClr val="003259"/>
-                </a:solidFill>
-                <a:latin typeface="Arial"/>
-                <a:ea typeface="DejaVu Sans"/>
-              </a:rPr>
-              <a:t>Rechenbeispiel III</a:t>
-            </a:r>
-            <a:endParaRPr b="0" lang="de-DE" sz="2800" spc="-1" strike="noStrike">
-              <a:latin typeface="Arial"/>
-            </a:endParaRPr>
-          </a:p>
-        </p:txBody>
-      </p:sp>
-      <p:sp>
-        <p:nvSpPr>
-          <p:cNvPr id="129" name="CustomShape 7"/>
-          <p:cNvSpPr/>
-          <p:nvPr/>
-        </p:nvSpPr>
-        <p:spPr>
-          <a:xfrm>
-            <a:off x="822960" y="1188720"/>
-            <a:ext cx="7131600" cy="2649240"/>
-          </a:xfrm>
-          <a:prstGeom prst="rect">
-            <a:avLst/>
-          </a:prstGeom>
-          <a:noFill/>
-          <a:ln>
-            <a:noFill/>
-          </a:ln>
-        </p:spPr>
-        <p:style>
-          <a:lnRef idx="0"/>
-          <a:fillRef idx="0"/>
-          <a:effectRef idx="0"/>
-          <a:fontRef idx="minor"/>
-        </p:style>
-        <p:txBody>
-          <a:bodyPr lIns="90000" rIns="90000" tIns="45000" bIns="45000">
-            <a:noAutofit/>
-          </a:bodyPr>
-          <a:p>
-            <a:pPr>
-              <a:lnSpc>
-                <a:spcPct val="100000"/>
-              </a:lnSpc>
-            </a:pPr>
-            <a:r>
-              <a:rPr b="1" lang="de-DE" sz="1800" spc="-1" strike="noStrike">
-                <a:solidFill>
-                  <a:srgbClr val="000000"/>
-                </a:solidFill>
-                <a:latin typeface="Arial"/>
-                <a:ea typeface="DejaVu Sans"/>
-              </a:rPr>
-              <a:t>Verteilung anhand der Kapitaleinlagen</a:t>
-            </a:r>
-            <a:endParaRPr b="0" lang="de-DE" sz="1800" spc="-1" strike="noStrike">
-              <a:latin typeface="Arial"/>
-            </a:endParaRPr>
-          </a:p>
-          <a:p>
-            <a:pPr>
-              <a:lnSpc>
-                <a:spcPct val="100000"/>
-              </a:lnSpc>
-            </a:pPr>
-            <a:endParaRPr b="0" lang="de-DE" sz="1800" spc="-1" strike="noStrike">
-              <a:latin typeface="Arial"/>
-            </a:endParaRPr>
-          </a:p>
-          <a:p>
-            <a:pPr>
-              <a:lnSpc>
-                <a:spcPct val="100000"/>
-              </a:lnSpc>
-            </a:pPr>
-            <a:r>
-              <a:rPr b="0" lang="de-DE" sz="1800" spc="-1" strike="noStrike">
-                <a:solidFill>
-                  <a:srgbClr val="000000"/>
-                </a:solidFill>
-                <a:latin typeface="Arial"/>
-                <a:ea typeface="DejaVu Sans"/>
-              </a:rPr>
-              <a:t>60.000 € * 0,4 = 24.000 €</a:t>
-            </a:r>
-            <a:endParaRPr b="0" lang="de-DE" sz="1800" spc="-1" strike="noStrike">
-              <a:latin typeface="Arial"/>
-            </a:endParaRPr>
-          </a:p>
-          <a:p>
-            <a:pPr>
-              <a:lnSpc>
-                <a:spcPct val="100000"/>
-              </a:lnSpc>
-            </a:pPr>
-            <a:r>
-              <a:rPr b="0" lang="de-DE" sz="1800" spc="-1" strike="noStrike">
-                <a:solidFill>
-                  <a:srgbClr val="000000"/>
-                </a:solidFill>
-                <a:latin typeface="Arial"/>
-                <a:ea typeface="DejaVu Sans"/>
-              </a:rPr>
-              <a:t>60.000 € * 0,2 = 12.000 €</a:t>
-            </a:r>
-            <a:endParaRPr b="0" lang="de-DE" sz="1800" spc="-1" strike="noStrike">
-              <a:latin typeface="Arial"/>
-            </a:endParaRPr>
-          </a:p>
-          <a:p>
-            <a:pPr>
-              <a:lnSpc>
-                <a:spcPct val="100000"/>
-              </a:lnSpc>
-            </a:pPr>
-            <a:endParaRPr b="0" lang="de-DE" sz="1800" spc="-1" strike="noStrike">
-              <a:latin typeface="Arial"/>
-            </a:endParaRPr>
-          </a:p>
-          <a:p>
-            <a:pPr>
-              <a:lnSpc>
-                <a:spcPct val="100000"/>
-              </a:lnSpc>
-            </a:pPr>
-            <a:endParaRPr b="0" lang="de-DE" sz="1800" spc="-1" strike="noStrike">
-              <a:latin typeface="Arial"/>
-            </a:endParaRPr>
-          </a:p>
-          <a:p>
-            <a:pPr>
-              <a:lnSpc>
-                <a:spcPct val="100000"/>
-              </a:lnSpc>
-            </a:pPr>
-            <a:r>
-              <a:rPr b="1" lang="de-DE" sz="1800" spc="-1" strike="noStrike">
-                <a:solidFill>
-                  <a:srgbClr val="000000"/>
-                </a:solidFill>
-                <a:latin typeface="Arial"/>
-                <a:ea typeface="DejaVu Sans"/>
-              </a:rPr>
-              <a:t>Persönlicher Gesamtgewinn</a:t>
-            </a:r>
-            <a:endParaRPr b="0" lang="de-DE" sz="1800" spc="-1" strike="noStrike">
-              <a:latin typeface="Arial"/>
-            </a:endParaRPr>
-          </a:p>
-          <a:p>
-            <a:pPr>
-              <a:lnSpc>
-                <a:spcPct val="100000"/>
-              </a:lnSpc>
-            </a:pPr>
-            <a:endParaRPr b="0" lang="de-DE" sz="1800" spc="-1" strike="noStrike">
-              <a:latin typeface="Arial"/>
-            </a:endParaRPr>
-          </a:p>
-          <a:p>
-            <a:pPr>
-              <a:lnSpc>
-                <a:spcPct val="100000"/>
-              </a:lnSpc>
-            </a:pPr>
-            <a:r>
-              <a:rPr b="0" lang="de-DE" sz="1800" spc="-1" strike="noStrike">
-                <a:solidFill>
-                  <a:srgbClr val="000000"/>
-                </a:solidFill>
-                <a:latin typeface="Arial"/>
-                <a:ea typeface="DejaVu Sans"/>
-              </a:rPr>
-              <a:t>16.000 € + 50.000 € + 24.000 € = 90.000 €</a:t>
-            </a:r>
-            <a:endParaRPr b="0" lang="de-DE" sz="1800" spc="-1" strike="noStrike">
-              <a:latin typeface="Arial"/>
-            </a:endParaRPr>
-          </a:p>
-          <a:p>
-            <a:pPr>
-              <a:lnSpc>
-                <a:spcPct val="100000"/>
-              </a:lnSpc>
-            </a:pPr>
-            <a:r>
-              <a:rPr b="0" lang="de-DE" sz="1800" spc="-1" strike="noStrike">
-                <a:solidFill>
-                  <a:srgbClr val="000000"/>
-                </a:solidFill>
-                <a:latin typeface="Arial"/>
-                <a:ea typeface="DejaVu Sans"/>
-              </a:rPr>
-              <a:t>8.000 € + 12.000 € = 20.000 €</a:t>
-            </a:r>
             <a:endParaRPr b="0" lang="de-DE" sz="1800" spc="-1" strike="noStrike">
               <a:latin typeface="Arial"/>
             </a:endParaRPr>

</xml_diff>

<commit_message>
Remove title and sources
</commit_message>
<xml_diff>
--- a/Referat_BWP_KG_dom.pptx
+++ b/Referat_BWP_KG_dom.pptx
@@ -12,8 +12,6 @@
     <p:sldId id="259" r:id="rId7"/>
     <p:sldId id="260" r:id="rId8"/>
     <p:sldId id="261" r:id="rId9"/>
-    <p:sldId id="262" r:id="rId10"/>
-    <p:sldId id="263" r:id="rId11"/>
   </p:sldIdLst>
   <p:sldSz cx="9144000" cy="5143500"/>
   <p:notesSz cx="7559675" cy="10691812"/>
@@ -2765,7 +2763,7 @@
         <p:spPr>
           <a:xfrm>
             <a:off x="0" y="4824360"/>
-            <a:ext cx="9140760" cy="315720"/>
+            <a:ext cx="9140400" cy="315360"/>
           </a:xfrm>
           <a:prstGeom prst="rect">
             <a:avLst/>
@@ -2801,7 +2799,7 @@
         <p:spPr>
           <a:xfrm>
             <a:off x="8714160" y="4897080"/>
-            <a:ext cx="188640" cy="188640"/>
+            <a:ext cx="188280" cy="188280"/>
           </a:xfrm>
           <a:prstGeom prst="ellipse">
             <a:avLst/>
@@ -2837,7 +2835,7 @@
                 <a:spcPct val="100000"/>
               </a:lnSpc>
             </a:pPr>
-            <a:fld id="{EE4DBB9D-6777-4F1C-9C26-4B57A7E443D1}" type="slidenum">
+            <a:fld id="{24F1BFA3-B4CD-41C9-B282-1FBF9FAD6419}" type="slidenum">
               <a:rPr b="0" lang="de-DE" sz="680" spc="-1" strike="noStrike">
                 <a:solidFill>
                   <a:srgbClr val="02d35f"/>
@@ -2845,7 +2843,7 @@
                 <a:latin typeface="Arial"/>
                 <a:ea typeface="DejaVu Sans"/>
               </a:rPr>
-              <a:t>&lt;Foliennummer&gt;</a:t>
+              <a:t>&lt;number&gt;</a:t>
             </a:fld>
             <a:endParaRPr b="0" lang="de-DE" sz="680" spc="-1" strike="noStrike">
               <a:latin typeface="Arial"/>
@@ -2866,7 +2864,7 @@
         <p:spPr>
           <a:xfrm>
             <a:off x="0" y="0"/>
-            <a:ext cx="9140760" cy="5140080"/>
+            <a:ext cx="9140400" cy="5139720"/>
           </a:xfrm>
           <a:prstGeom prst="rect">
             <a:avLst/>
@@ -2889,7 +2887,7 @@
         <p:spPr>
           <a:xfrm>
             <a:off x="7395120" y="486360"/>
-            <a:ext cx="874080" cy="529920"/>
+            <a:ext cx="873720" cy="529560"/>
           </a:xfrm>
           <a:prstGeom prst="rect">
             <a:avLst/>
@@ -2928,7 +2926,7 @@
               <a:rPr b="0" lang="de-DE" sz="4400" spc="-1" strike="noStrike">
                 <a:latin typeface="Arial"/>
               </a:rPr>
-              <a:t>Format des Titeltextes durch Klicken bearbeiten</a:t>
+              <a:t>Click to edit the title text format</a:t>
             </a:r>
             <a:endParaRPr b="0" lang="de-DE" sz="4400" spc="-1" strike="noStrike">
               <a:latin typeface="Arial"/>
@@ -2957,7 +2955,7 @@
         </p:spPr>
         <p:txBody>
           <a:bodyPr lIns="0" rIns="0" tIns="0" bIns="0">
-            <a:normAutofit fontScale="80000"/>
+            <a:normAutofit/>
           </a:bodyPr>
           <a:p>
             <a:pPr marL="432000" indent="-324000">
@@ -2975,7 +2973,7 @@
               <a:rPr b="0" lang="de-DE" sz="3200" spc="-1" strike="noStrike">
                 <a:latin typeface="Arial"/>
               </a:rPr>
-              <a:t>Format des Gliederungstextes durch Klicken bearbeiten</a:t>
+              <a:t>Click to edit the outline text format</a:t>
             </a:r>
             <a:endParaRPr b="0" lang="de-DE" sz="3200" spc="-1" strike="noStrike">
               <a:latin typeface="Arial"/>
@@ -2997,7 +2995,7 @@
               <a:rPr b="0" lang="de-DE" sz="2800" spc="-1" strike="noStrike">
                 <a:latin typeface="Arial"/>
               </a:rPr>
-              <a:t>Zweite Gliederungsebene</a:t>
+              <a:t>Second Outline Level</a:t>
             </a:r>
             <a:endParaRPr b="0" lang="de-DE" sz="2800" spc="-1" strike="noStrike">
               <a:latin typeface="Arial"/>
@@ -3019,7 +3017,7 @@
               <a:rPr b="0" lang="de-DE" sz="2400" spc="-1" strike="noStrike">
                 <a:latin typeface="Arial"/>
               </a:rPr>
-              <a:t>Dritte Gliederungsebene</a:t>
+              <a:t>Third Outline Level</a:t>
             </a:r>
             <a:endParaRPr b="0" lang="de-DE" sz="2400" spc="-1" strike="noStrike">
               <a:latin typeface="Arial"/>
@@ -3041,7 +3039,7 @@
               <a:rPr b="0" lang="de-DE" sz="2000" spc="-1" strike="noStrike">
                 <a:latin typeface="Arial"/>
               </a:rPr>
-              <a:t>Vierte Gliederungsebene</a:t>
+              <a:t>Fourth Outline Level</a:t>
             </a:r>
             <a:endParaRPr b="0" lang="de-DE" sz="2000" spc="-1" strike="noStrike">
               <a:latin typeface="Arial"/>
@@ -3063,7 +3061,7 @@
               <a:rPr b="0" lang="de-DE" sz="2000" spc="-1" strike="noStrike">
                 <a:latin typeface="Arial"/>
               </a:rPr>
-              <a:t>Fünfte Gliederungsebene</a:t>
+              <a:t>Fifth Outline Level</a:t>
             </a:r>
             <a:endParaRPr b="0" lang="de-DE" sz="2000" spc="-1" strike="noStrike">
               <a:latin typeface="Arial"/>
@@ -3085,7 +3083,7 @@
               <a:rPr b="0" lang="de-DE" sz="2000" spc="-1" strike="noStrike">
                 <a:latin typeface="Arial"/>
               </a:rPr>
-              <a:t>Sechste Gliederungsebene</a:t>
+              <a:t>Sixth Outline Level</a:t>
             </a:r>
             <a:endParaRPr b="0" lang="de-DE" sz="2000" spc="-1" strike="noStrike">
               <a:latin typeface="Arial"/>
@@ -3107,7 +3105,7 @@
               <a:rPr b="0" lang="de-DE" sz="2000" spc="-1" strike="noStrike">
                 <a:latin typeface="Arial"/>
               </a:rPr>
-              <a:t>Siebte Gliederungsebene</a:t>
+              <a:t>Seventh Outline Level</a:t>
             </a:r>
             <a:endParaRPr b="0" lang="de-DE" sz="2000" spc="-1" strike="noStrike">
               <a:latin typeface="Arial"/>
@@ -3168,7 +3166,7 @@
         <p:spPr>
           <a:xfrm>
             <a:off x="0" y="4824360"/>
-            <a:ext cx="9140760" cy="315720"/>
+            <a:ext cx="9140400" cy="315360"/>
           </a:xfrm>
           <a:prstGeom prst="rect">
             <a:avLst/>
@@ -3229,7 +3227,7 @@
         <p:spPr>
           <a:xfrm>
             <a:off x="8714160" y="4897080"/>
-            <a:ext cx="188640" cy="188640"/>
+            <a:ext cx="188280" cy="188280"/>
           </a:xfrm>
           <a:prstGeom prst="ellipse">
             <a:avLst/>
@@ -3265,7 +3263,7 @@
                 <a:spcPct val="100000"/>
               </a:lnSpc>
             </a:pPr>
-            <a:fld id="{BCDFFFC8-C07B-4670-9B0F-2D9A35F65246}" type="slidenum">
+            <a:fld id="{5B045F53-C8C9-4FD5-BC91-DE033E7D9733}" type="slidenum">
               <a:rPr b="0" lang="de-DE" sz="680" spc="-1" strike="noStrike">
                 <a:solidFill>
                   <a:srgbClr val="02d35f"/>
@@ -3273,7 +3271,7 @@
                 <a:latin typeface="Arial"/>
                 <a:ea typeface="DejaVu Sans"/>
               </a:rPr>
-              <a:t>&lt;Foliennummer&gt;</a:t>
+              <a:t>&lt;number&gt;</a:t>
             </a:fld>
             <a:endParaRPr b="0" lang="de-DE" sz="680" spc="-1" strike="noStrike">
               <a:latin typeface="Arial"/>
@@ -3310,7 +3308,7 @@
               <a:rPr b="0" lang="de-DE" sz="4400" spc="-1" strike="noStrike">
                 <a:latin typeface="Arial"/>
               </a:rPr>
-              <a:t>Format des Titeltextes durch Klicken bearbeiten</a:t>
+              <a:t>Click to edit the title text format</a:t>
             </a:r>
             <a:endParaRPr b="0" lang="de-DE" sz="4400" spc="-1" strike="noStrike">
               <a:latin typeface="Arial"/>
@@ -3339,7 +3337,7 @@
         </p:spPr>
         <p:txBody>
           <a:bodyPr lIns="0" rIns="0" tIns="0" bIns="0">
-            <a:normAutofit fontScale="88000"/>
+            <a:normAutofit/>
           </a:bodyPr>
           <a:p>
             <a:pPr marL="432000" indent="-324000">
@@ -3357,7 +3355,7 @@
               <a:rPr b="0" lang="de-DE" sz="3200" spc="-1" strike="noStrike">
                 <a:latin typeface="Arial"/>
               </a:rPr>
-              <a:t>Format des Gliederungstextes durch Klicken bearbeiten</a:t>
+              <a:t>Click to edit the outline text format</a:t>
             </a:r>
             <a:endParaRPr b="0" lang="de-DE" sz="3200" spc="-1" strike="noStrike">
               <a:latin typeface="Arial"/>
@@ -3379,7 +3377,7 @@
               <a:rPr b="0" lang="de-DE" sz="2800" spc="-1" strike="noStrike">
                 <a:latin typeface="Arial"/>
               </a:rPr>
-              <a:t>Zweite Gliederungsebene</a:t>
+              <a:t>Second Outline Level</a:t>
             </a:r>
             <a:endParaRPr b="0" lang="de-DE" sz="2800" spc="-1" strike="noStrike">
               <a:latin typeface="Arial"/>
@@ -3401,7 +3399,7 @@
               <a:rPr b="0" lang="de-DE" sz="2400" spc="-1" strike="noStrike">
                 <a:latin typeface="Arial"/>
               </a:rPr>
-              <a:t>Dritte Gliederungsebene</a:t>
+              <a:t>Third Outline Level</a:t>
             </a:r>
             <a:endParaRPr b="0" lang="de-DE" sz="2400" spc="-1" strike="noStrike">
               <a:latin typeface="Arial"/>
@@ -3423,7 +3421,7 @@
               <a:rPr b="0" lang="de-DE" sz="2000" spc="-1" strike="noStrike">
                 <a:latin typeface="Arial"/>
               </a:rPr>
-              <a:t>Vierte Gliederungsebene</a:t>
+              <a:t>Fourth Outline Level</a:t>
             </a:r>
             <a:endParaRPr b="0" lang="de-DE" sz="2000" spc="-1" strike="noStrike">
               <a:latin typeface="Arial"/>
@@ -3445,7 +3443,7 @@
               <a:rPr b="0" lang="de-DE" sz="2000" spc="-1" strike="noStrike">
                 <a:latin typeface="Arial"/>
               </a:rPr>
-              <a:t>Fünfte Gliederungsebene</a:t>
+              <a:t>Fifth Outline Level</a:t>
             </a:r>
             <a:endParaRPr b="0" lang="de-DE" sz="2000" spc="-1" strike="noStrike">
               <a:latin typeface="Arial"/>
@@ -3467,7 +3465,7 @@
               <a:rPr b="0" lang="de-DE" sz="2000" spc="-1" strike="noStrike">
                 <a:latin typeface="Arial"/>
               </a:rPr>
-              <a:t>Sechste Gliederungsebene</a:t>
+              <a:t>Sixth Outline Level</a:t>
             </a:r>
             <a:endParaRPr b="0" lang="de-DE" sz="2000" spc="-1" strike="noStrike">
               <a:latin typeface="Arial"/>
@@ -3489,7 +3487,7 @@
               <a:rPr b="0" lang="de-DE" sz="2000" spc="-1" strike="noStrike">
                 <a:latin typeface="Arial"/>
               </a:rPr>
-              <a:t>Siebte Gliederungsebene</a:t>
+              <a:t>Seventh Outline Level</a:t>
             </a:r>
             <a:endParaRPr b="0" lang="de-DE" sz="2000" spc="-1" strike="noStrike">
               <a:latin typeface="Arial"/>
@@ -3542,8 +3540,8 @@
         </p:nvSpPr>
         <p:spPr>
           <a:xfrm>
-            <a:off x="867960" y="1080360"/>
-            <a:ext cx="7401240" cy="1787400"/>
+            <a:off x="874800" y="343080"/>
+            <a:ext cx="7962480" cy="582120"/>
           </a:xfrm>
           <a:prstGeom prst="rect">
             <a:avLst/>
@@ -3559,31 +3557,6 @@
           <a:effectRef idx="0"/>
           <a:fontRef idx="minor"/>
         </p:style>
-        <p:txBody>
-          <a:bodyPr lIns="90000" rIns="90000" tIns="45000" bIns="45000" anchor="b">
-            <a:noAutofit/>
-          </a:bodyPr>
-          <a:p>
-            <a:pPr>
-              <a:lnSpc>
-                <a:spcPct val="100000"/>
-              </a:lnSpc>
-            </a:pPr>
-            <a:r>
-              <a:rPr b="1" lang="de-DE" sz="3200" spc="-1" strike="noStrike">
-                <a:solidFill>
-                  <a:srgbClr val="ffffff"/>
-                </a:solidFill>
-                <a:latin typeface="Arial"/>
-                <a:ea typeface="DejaVu Sans"/>
-              </a:rPr>
-              <a:t>Die Kommanditgesellschaft (KG)</a:t>
-            </a:r>
-            <a:endParaRPr b="0" lang="de-DE" sz="3200" spc="-1" strike="noStrike">
-              <a:latin typeface="Arial"/>
-            </a:endParaRPr>
-          </a:p>
-        </p:txBody>
       </p:sp>
       <p:sp>
         <p:nvSpPr>
@@ -3593,8 +3566,8 @@
         </p:nvSpPr>
         <p:spPr>
           <a:xfrm>
-            <a:off x="867960" y="2926800"/>
-            <a:ext cx="7401240" cy="787320"/>
+            <a:off x="874800" y="1428480"/>
+            <a:ext cx="7962480" cy="3180960"/>
           </a:xfrm>
           <a:prstGeom prst="rect">
             <a:avLst/>
@@ -3610,61 +3583,6 @@
           <a:effectRef idx="0"/>
           <a:fontRef idx="minor"/>
         </p:style>
-        <p:txBody>
-          <a:bodyPr lIns="90000" rIns="90000" tIns="45000" bIns="45000">
-            <a:noAutofit/>
-          </a:bodyPr>
-          <a:p>
-            <a:pPr>
-              <a:lnSpc>
-                <a:spcPct val="100000"/>
-              </a:lnSpc>
-            </a:pPr>
-            <a:r>
-              <a:rPr b="0" lang="de-DE" sz="1600" spc="-1" strike="noStrike">
-                <a:solidFill>
-                  <a:srgbClr val="ffffff"/>
-                </a:solidFill>
-                <a:latin typeface="Arial"/>
-                <a:ea typeface="DejaVu Sans"/>
-              </a:rPr>
-              <a:t>Jorik Cronnenberg, Dominik Gedon, Eugen Maksymenko, Michael Muschner</a:t>
-            </a:r>
-            <a:endParaRPr b="0" lang="de-DE" sz="1600" spc="-1" strike="noStrike">
-              <a:latin typeface="Arial"/>
-            </a:endParaRPr>
-          </a:p>
-          <a:p>
-            <a:pPr>
-              <a:lnSpc>
-                <a:spcPct val="100000"/>
-              </a:lnSpc>
-            </a:pPr>
-            <a:r>
-              <a:rPr b="0" lang="de-DE" sz="1600" spc="-1" strike="noStrike">
-                <a:solidFill>
-                  <a:srgbClr val="ffffff"/>
-                </a:solidFill>
-                <a:latin typeface="Arial"/>
-                <a:ea typeface="DejaVu Sans"/>
-              </a:rPr>
-              <a:t>Quang Tran, Daniel Yousaf</a:t>
-            </a:r>
-            <a:endParaRPr b="0" lang="de-DE" sz="1600" spc="-1" strike="noStrike">
-              <a:latin typeface="Arial"/>
-            </a:endParaRPr>
-          </a:p>
-          <a:p>
-            <a:pPr>
-              <a:lnSpc>
-                <a:spcPct val="100000"/>
-              </a:lnSpc>
-            </a:pPr>
-            <a:endParaRPr b="0" lang="de-DE" sz="1600" spc="-1" strike="noStrike">
-              <a:latin typeface="Arial"/>
-            </a:endParaRPr>
-          </a:p>
-        </p:txBody>
       </p:sp>
       <p:sp>
         <p:nvSpPr>
@@ -3674,8 +3592,8 @@
         </p:nvSpPr>
         <p:spPr>
           <a:xfrm>
-            <a:off x="867960" y="4218840"/>
-            <a:ext cx="3250800" cy="678600"/>
+            <a:off x="874800" y="343080"/>
+            <a:ext cx="7962480" cy="582120"/>
           </a:xfrm>
           <a:prstGeom prst="rect">
             <a:avLst/>
@@ -3692,52 +3610,26 @@
           <a:fontRef idx="minor"/>
         </p:style>
         <p:txBody>
-          <a:bodyPr lIns="90000" rIns="90000" tIns="45000" bIns="45000">
+          <a:bodyPr lIns="90000" rIns="90000" tIns="45000" bIns="45000" anchor="ctr">
             <a:noAutofit/>
           </a:bodyPr>
           <a:p>
             <a:pPr>
               <a:lnSpc>
-                <a:spcPct val="100000"/>
-              </a:lnSpc>
-              <a:spcAft>
-                <a:spcPts val="400"/>
-              </a:spcAft>
-            </a:pPr>
-            <a:r>
-              <a:rPr b="0" lang="de-DE" sz="1100" spc="-1" strike="noStrike">
+                <a:spcPts val="2520"/>
+              </a:lnSpc>
+            </a:pPr>
+            <a:r>
+              <a:rPr b="1" lang="de-DE" sz="2800" spc="-1" strike="noStrike">
                 <a:solidFill>
-                  <a:srgbClr val="ffffff"/>
+                  <a:srgbClr val="003259"/>
                 </a:solidFill>
                 <a:latin typeface="Arial"/>
                 <a:ea typeface="DejaVu Sans"/>
               </a:rPr>
-              <a:t>Klasse IF10I</a:t>
-            </a:r>
-            <a:endParaRPr b="0" lang="de-DE" sz="1100" spc="-1" strike="noStrike">
-              <a:latin typeface="Arial"/>
-            </a:endParaRPr>
-          </a:p>
-          <a:p>
-            <a:pPr>
-              <a:lnSpc>
-                <a:spcPct val="100000"/>
-              </a:lnSpc>
-              <a:spcAft>
-                <a:spcPts val="400"/>
-              </a:spcAft>
-            </a:pPr>
-            <a:r>
-              <a:rPr b="0" lang="de-DE" sz="1100" spc="-1" strike="noStrike">
-                <a:solidFill>
-                  <a:srgbClr val="ffffff"/>
-                </a:solidFill>
-                <a:latin typeface="Arial"/>
-                <a:ea typeface="DejaVu Sans"/>
-              </a:rPr>
-              <a:t>10.12.2019</a:t>
-            </a:r>
-            <a:endParaRPr b="0" lang="de-DE" sz="1100" spc="-1" strike="noStrike">
+              <a:t>Leitungsbefugnis</a:t>
+            </a:r>
+            <a:endParaRPr b="0" lang="de-DE" sz="2800" spc="-1" strike="noStrike">
               <a:latin typeface="Arial"/>
             </a:endParaRPr>
           </a:p>
@@ -3751,19 +3643,15 @@
         </p:nvSpPr>
         <p:spPr>
           <a:xfrm>
-            <a:off x="7223760" y="274320"/>
-            <a:ext cx="1279080" cy="821880"/>
-          </a:xfrm>
-          <a:prstGeom prst="rect">
-            <a:avLst/>
-          </a:prstGeom>
-          <a:solidFill>
-            <a:srgbClr val="02d35f"/>
-          </a:solidFill>
+            <a:off x="822960" y="1188720"/>
+            <a:ext cx="7130880" cy="3580920"/>
+          </a:xfrm>
+          <a:prstGeom prst="rect">
+            <a:avLst/>
+          </a:prstGeom>
+          <a:noFill/>
           <a:ln>
-            <a:solidFill>
-              <a:srgbClr val="02d35f"/>
-            </a:solidFill>
+            <a:noFill/>
           </a:ln>
         </p:spPr>
         <p:style>
@@ -3772,6 +3660,281 @@
           <a:effectRef idx="0"/>
           <a:fontRef idx="minor"/>
         </p:style>
+        <p:txBody>
+          <a:bodyPr lIns="90000" rIns="90000" tIns="45000" bIns="45000">
+            <a:noAutofit/>
+          </a:bodyPr>
+          <a:p>
+            <a:pPr>
+              <a:lnSpc>
+                <a:spcPct val="100000"/>
+              </a:lnSpc>
+            </a:pPr>
+            <a:r>
+              <a:rPr b="0" lang="de-DE" sz="1800" spc="-1" strike="noStrike">
+                <a:solidFill>
+                  <a:srgbClr val="000000"/>
+                </a:solidFill>
+                <a:latin typeface="Arial"/>
+                <a:ea typeface="DejaVu Sans"/>
+              </a:rPr>
+              <a:t>Komplementäre</a:t>
+            </a:r>
+            <a:endParaRPr b="0" lang="de-DE" sz="1800" spc="-1" strike="noStrike">
+              <a:latin typeface="Arial"/>
+            </a:endParaRPr>
+          </a:p>
+          <a:p>
+            <a:pPr>
+              <a:lnSpc>
+                <a:spcPct val="100000"/>
+              </a:lnSpc>
+            </a:pPr>
+            <a:endParaRPr b="0" lang="de-DE" sz="1800" spc="-1" strike="noStrike">
+              <a:latin typeface="Arial"/>
+            </a:endParaRPr>
+          </a:p>
+          <a:p>
+            <a:pPr>
+              <a:lnSpc>
+                <a:spcPct val="100000"/>
+              </a:lnSpc>
+            </a:pPr>
+            <a:r>
+              <a:rPr b="0" lang="de-DE" sz="1800" spc="-1" strike="noStrike">
+                <a:solidFill>
+                  <a:srgbClr val="000000"/>
+                </a:solidFill>
+                <a:latin typeface="Arial"/>
+                <a:ea typeface="Droid Sans Fallback"/>
+              </a:rPr>
+              <a:t>	</a:t>
+            </a:r>
+            <a:r>
+              <a:rPr b="0" lang="de-DE" sz="1800" spc="-1" strike="noStrike">
+                <a:solidFill>
+                  <a:srgbClr val="000000"/>
+                </a:solidFill>
+                <a:latin typeface="Arial"/>
+                <a:ea typeface="Droid Sans Fallback"/>
+              </a:rPr>
+              <a:t>- persönlich haftende Gesellschafter</a:t>
+            </a:r>
+            <a:endParaRPr b="0" lang="de-DE" sz="1800" spc="-1" strike="noStrike">
+              <a:latin typeface="Arial"/>
+            </a:endParaRPr>
+          </a:p>
+          <a:p>
+            <a:pPr>
+              <a:lnSpc>
+                <a:spcPct val="100000"/>
+              </a:lnSpc>
+            </a:pPr>
+            <a:r>
+              <a:rPr b="0" lang="de-DE" sz="1800" spc="-1" strike="noStrike">
+                <a:solidFill>
+                  <a:srgbClr val="000000"/>
+                </a:solidFill>
+                <a:latin typeface="Arial"/>
+                <a:ea typeface="Droid Sans Fallback"/>
+              </a:rPr>
+              <a:t>	</a:t>
+            </a:r>
+            <a:r>
+              <a:rPr b="0" lang="de-DE" sz="1800" spc="-1" strike="noStrike">
+                <a:solidFill>
+                  <a:srgbClr val="000000"/>
+                </a:solidFill>
+                <a:latin typeface="Arial"/>
+                <a:ea typeface="Droid Sans Fallback"/>
+              </a:rPr>
+              <a:t>- als Geschäftsführer</a:t>
+            </a:r>
+            <a:r>
+              <a:rPr b="0" lang="de-DE" sz="1800" spc="-1" strike="noStrike">
+                <a:solidFill>
+                  <a:srgbClr val="000000"/>
+                </a:solidFill>
+                <a:latin typeface="Arial"/>
+                <a:ea typeface="Droid Sans Fallback"/>
+              </a:rPr>
+              <a:t>	</a:t>
+            </a:r>
+            <a:endParaRPr b="0" lang="de-DE" sz="1800" spc="-1" strike="noStrike">
+              <a:latin typeface="Arial"/>
+            </a:endParaRPr>
+          </a:p>
+          <a:p>
+            <a:pPr>
+              <a:lnSpc>
+                <a:spcPct val="100000"/>
+              </a:lnSpc>
+            </a:pPr>
+            <a:r>
+              <a:rPr b="0" lang="de-DE" sz="1800" spc="-1" strike="noStrike">
+                <a:solidFill>
+                  <a:srgbClr val="000000"/>
+                </a:solidFill>
+                <a:latin typeface="Arial"/>
+                <a:ea typeface="Droid Sans Fallback"/>
+              </a:rPr>
+              <a:t>	</a:t>
+            </a:r>
+            <a:r>
+              <a:rPr b="0" lang="de-DE" sz="1800" spc="-1" strike="noStrike">
+                <a:solidFill>
+                  <a:srgbClr val="000000"/>
+                </a:solidFill>
+                <a:latin typeface="Arial"/>
+                <a:ea typeface="Droid Sans Fallback"/>
+              </a:rPr>
+              <a:t>- alleinige Vertretung der Gesellschaft</a:t>
+            </a:r>
+            <a:endParaRPr b="0" lang="de-DE" sz="1800" spc="-1" strike="noStrike">
+              <a:latin typeface="Arial"/>
+            </a:endParaRPr>
+          </a:p>
+          <a:p>
+            <a:pPr>
+              <a:lnSpc>
+                <a:spcPct val="100000"/>
+              </a:lnSpc>
+            </a:pPr>
+            <a:endParaRPr b="0" lang="de-DE" sz="1800" spc="-1" strike="noStrike">
+              <a:latin typeface="Arial"/>
+            </a:endParaRPr>
+          </a:p>
+          <a:p>
+            <a:pPr>
+              <a:lnSpc>
+                <a:spcPct val="100000"/>
+              </a:lnSpc>
+            </a:pPr>
+            <a:r>
+              <a:rPr b="0" lang="de-DE" sz="1800" spc="-1" strike="noStrike">
+                <a:solidFill>
+                  <a:srgbClr val="000000"/>
+                </a:solidFill>
+                <a:latin typeface="Arial"/>
+                <a:ea typeface="Droid Sans Fallback"/>
+              </a:rPr>
+              <a:t>Kommanditisten</a:t>
+            </a:r>
+            <a:endParaRPr b="0" lang="de-DE" sz="1800" spc="-1" strike="noStrike">
+              <a:latin typeface="Arial"/>
+            </a:endParaRPr>
+          </a:p>
+          <a:p>
+            <a:pPr>
+              <a:lnSpc>
+                <a:spcPct val="100000"/>
+              </a:lnSpc>
+            </a:pPr>
+            <a:endParaRPr b="0" lang="de-DE" sz="1800" spc="-1" strike="noStrike">
+              <a:latin typeface="Arial"/>
+            </a:endParaRPr>
+          </a:p>
+          <a:p>
+            <a:pPr>
+              <a:lnSpc>
+                <a:spcPct val="100000"/>
+              </a:lnSpc>
+            </a:pPr>
+            <a:r>
+              <a:rPr b="0" lang="de-DE" sz="1800" spc="-1" strike="noStrike">
+                <a:solidFill>
+                  <a:srgbClr val="000000"/>
+                </a:solidFill>
+                <a:latin typeface="Arial"/>
+                <a:ea typeface="Droid Sans Fallback"/>
+              </a:rPr>
+              <a:t>	</a:t>
+            </a:r>
+            <a:r>
+              <a:rPr b="0" lang="de-DE" sz="1800" spc="-1" strike="noStrike">
+                <a:solidFill>
+                  <a:srgbClr val="000000"/>
+                </a:solidFill>
+                <a:latin typeface="Arial"/>
+                <a:ea typeface="Droid Sans Fallback"/>
+              </a:rPr>
+              <a:t>- sind von Führung ausgeschlossen</a:t>
+            </a:r>
+            <a:endParaRPr b="0" lang="de-DE" sz="1800" spc="-1" strike="noStrike">
+              <a:latin typeface="Arial"/>
+            </a:endParaRPr>
+          </a:p>
+          <a:p>
+            <a:pPr>
+              <a:lnSpc>
+                <a:spcPct val="100000"/>
+              </a:lnSpc>
+            </a:pPr>
+            <a:r>
+              <a:rPr b="0" lang="de-DE" sz="1800" spc="-1" strike="noStrike">
+                <a:solidFill>
+                  <a:srgbClr val="000000"/>
+                </a:solidFill>
+                <a:latin typeface="Arial"/>
+                <a:ea typeface="Droid Sans Fallback"/>
+              </a:rPr>
+              <a:t>	</a:t>
+            </a:r>
+            <a:r>
+              <a:rPr b="0" lang="de-DE" sz="1800" spc="-1" strike="noStrike">
+                <a:solidFill>
+                  <a:srgbClr val="000000"/>
+                </a:solidFill>
+                <a:latin typeface="Arial"/>
+                <a:ea typeface="Droid Sans Fallback"/>
+              </a:rPr>
+              <a:t>- Erteilung von Rechten möglich</a:t>
+            </a:r>
+            <a:endParaRPr b="0" lang="de-DE" sz="1800" spc="-1" strike="noStrike">
+              <a:latin typeface="Arial"/>
+            </a:endParaRPr>
+          </a:p>
+          <a:p>
+            <a:pPr>
+              <a:lnSpc>
+                <a:spcPct val="100000"/>
+              </a:lnSpc>
+            </a:pPr>
+            <a:r>
+              <a:rPr b="0" lang="de-DE" sz="1800" spc="-1" strike="noStrike">
+                <a:solidFill>
+                  <a:srgbClr val="000000"/>
+                </a:solidFill>
+                <a:latin typeface="Arial"/>
+                <a:ea typeface="Droid Sans Fallback"/>
+              </a:rPr>
+              <a:t>	</a:t>
+            </a:r>
+            <a:r>
+              <a:rPr b="0" lang="de-DE" sz="1800" spc="-1" strike="noStrike">
+                <a:solidFill>
+                  <a:srgbClr val="000000"/>
+                </a:solidFill>
+                <a:latin typeface="Arial"/>
+                <a:ea typeface="Droid Sans Fallback"/>
+              </a:rPr>
+              <a:t>- Kontrollbefugnis</a:t>
+            </a:r>
+            <a:endParaRPr b="0" lang="de-DE" sz="1800" spc="-1" strike="noStrike">
+              <a:latin typeface="Arial"/>
+            </a:endParaRPr>
+          </a:p>
+          <a:p>
+            <a:pPr>
+              <a:lnSpc>
+                <a:spcPct val="100000"/>
+              </a:lnSpc>
+            </a:pPr>
+            <a:endParaRPr b="0" lang="de-DE" sz="1800" spc="-1" strike="noStrike">
+              <a:latin typeface="Arial"/>
+            </a:endParaRPr>
+          </a:p>
+        </p:txBody>
       </p:sp>
     </p:spTree>
   </p:cSld>
@@ -3812,7 +3975,7 @@
         <p:spPr>
           <a:xfrm>
             <a:off x="874800" y="343080"/>
-            <a:ext cx="7962840" cy="582480"/>
+            <a:ext cx="7962480" cy="582120"/>
           </a:xfrm>
           <a:prstGeom prst="rect">
             <a:avLst/>
@@ -3837,8 +4000,8 @@
         </p:nvSpPr>
         <p:spPr>
           <a:xfrm>
-            <a:off x="874800" y="1127520"/>
-            <a:ext cx="7962840" cy="3534120"/>
+            <a:off x="874800" y="1381680"/>
+            <a:ext cx="3893400" cy="3279600"/>
           </a:xfrm>
           <a:prstGeom prst="rect">
             <a:avLst/>
@@ -3863,8 +4026,8 @@
         </p:nvSpPr>
         <p:spPr>
           <a:xfrm>
-            <a:off x="874800" y="343080"/>
-            <a:ext cx="7962840" cy="582480"/>
+            <a:off x="874800" y="990360"/>
+            <a:ext cx="3893400" cy="325080"/>
           </a:xfrm>
           <a:prstGeom prst="rect">
             <a:avLst/>
@@ -3880,31 +4043,6 @@
           <a:effectRef idx="0"/>
           <a:fontRef idx="minor"/>
         </p:style>
-        <p:txBody>
-          <a:bodyPr lIns="90000" rIns="90000" tIns="45000" bIns="45000" anchor="ctr">
-            <a:noAutofit/>
-          </a:bodyPr>
-          <a:p>
-            <a:pPr>
-              <a:lnSpc>
-                <a:spcPts val="2520"/>
-              </a:lnSpc>
-            </a:pPr>
-            <a:r>
-              <a:rPr b="1" lang="de-DE" sz="2800" spc="-1" strike="noStrike">
-                <a:solidFill>
-                  <a:srgbClr val="003259"/>
-                </a:solidFill>
-                <a:latin typeface="Arial"/>
-                <a:ea typeface="DejaVu Sans"/>
-              </a:rPr>
-              <a:t>Die Kommanditgesellschaft</a:t>
-            </a:r>
-            <a:endParaRPr b="0" lang="de-DE" sz="2800" spc="-1" strike="noStrike">
-              <a:latin typeface="Arial"/>
-            </a:endParaRPr>
-          </a:p>
-        </p:txBody>
       </p:sp>
       <p:sp>
         <p:nvSpPr>
@@ -3914,8 +4052,8 @@
         </p:nvSpPr>
         <p:spPr>
           <a:xfrm>
-            <a:off x="874800" y="1428480"/>
-            <a:ext cx="7962840" cy="3181320"/>
+            <a:off x="4943520" y="1382400"/>
+            <a:ext cx="3897000" cy="3279600"/>
           </a:xfrm>
           <a:prstGeom prst="rect">
             <a:avLst/>
@@ -3931,51 +4069,128 @@
           <a:effectRef idx="0"/>
           <a:fontRef idx="minor"/>
         </p:style>
-        <p:txBody>
-          <a:bodyPr lIns="90000" rIns="90000" tIns="45000" bIns="45000">
+      </p:sp>
+      <p:sp>
+        <p:nvSpPr>
+          <p:cNvPr id="90" name="CustomShape 5"/>
+          <p:cNvSpPr/>
+          <p:nvPr/>
+        </p:nvSpPr>
+        <p:spPr>
+          <a:xfrm>
+            <a:off x="4943520" y="990360"/>
+            <a:ext cx="3897000" cy="325080"/>
+          </a:xfrm>
+          <a:prstGeom prst="rect">
+            <a:avLst/>
+          </a:prstGeom>
+          <a:noFill/>
+          <a:ln>
+            <a:noFill/>
+          </a:ln>
+        </p:spPr>
+        <p:style>
+          <a:lnRef idx="0"/>
+          <a:fillRef idx="0"/>
+          <a:effectRef idx="0"/>
+          <a:fontRef idx="minor"/>
+        </p:style>
+      </p:sp>
+      <p:sp>
+        <p:nvSpPr>
+          <p:cNvPr id="91" name="CustomShape 6"/>
+          <p:cNvSpPr/>
+          <p:nvPr/>
+        </p:nvSpPr>
+        <p:spPr>
+          <a:xfrm>
+            <a:off x="874800" y="343080"/>
+            <a:ext cx="7962480" cy="582120"/>
+          </a:xfrm>
+          <a:prstGeom prst="rect">
+            <a:avLst/>
+          </a:prstGeom>
+          <a:noFill/>
+          <a:ln>
+            <a:noFill/>
+          </a:ln>
+        </p:spPr>
+        <p:style>
+          <a:lnRef idx="0"/>
+          <a:fillRef idx="0"/>
+          <a:effectRef idx="0"/>
+          <a:fontRef idx="minor"/>
+        </p:style>
+        <p:txBody>
+          <a:bodyPr lIns="90000" rIns="90000" tIns="45000" bIns="45000" anchor="ctr">
             <a:noAutofit/>
           </a:bodyPr>
           <a:p>
             <a:pPr>
               <a:lnSpc>
-                <a:spcPct val="100000"/>
-              </a:lnSpc>
-              <a:spcAft>
-                <a:spcPts val="601"/>
-              </a:spcAft>
-            </a:pPr>
-            <a:r>
-              <a:rPr b="1" lang="de-DE" sz="1800" spc="-1" strike="noStrike">
+                <a:spcPts val="2520"/>
+              </a:lnSpc>
+            </a:pPr>
+            <a:r>
+              <a:rPr b="1" lang="de-DE" sz="2800" spc="-1" strike="noStrike">
                 <a:solidFill>
                   <a:srgbClr val="003259"/>
                 </a:solidFill>
                 <a:latin typeface="Arial"/>
                 <a:ea typeface="DejaVu Sans"/>
               </a:rPr>
-              <a:t>1. Definition</a:t>
-            </a:r>
-            <a:endParaRPr b="0" lang="de-DE" sz="1800" spc="-1" strike="noStrike">
-              <a:latin typeface="Arial"/>
-            </a:endParaRPr>
-          </a:p>
+              <a:t>Gewinnverteilung</a:t>
+            </a:r>
+            <a:endParaRPr b="0" lang="de-DE" sz="2800" spc="-1" strike="noStrike">
+              <a:latin typeface="Arial"/>
+            </a:endParaRPr>
+          </a:p>
+        </p:txBody>
+      </p:sp>
+      <p:sp>
+        <p:nvSpPr>
+          <p:cNvPr id="92" name="CustomShape 7"/>
+          <p:cNvSpPr/>
+          <p:nvPr/>
+        </p:nvSpPr>
+        <p:spPr>
+          <a:xfrm>
+            <a:off x="822960" y="1188720"/>
+            <a:ext cx="7130880" cy="3160440"/>
+          </a:xfrm>
+          <a:prstGeom prst="rect">
+            <a:avLst/>
+          </a:prstGeom>
+          <a:noFill/>
+          <a:ln>
+            <a:noFill/>
+          </a:ln>
+        </p:spPr>
+        <p:style>
+          <a:lnRef idx="0"/>
+          <a:fillRef idx="0"/>
+          <a:effectRef idx="0"/>
+          <a:fontRef idx="minor"/>
+        </p:style>
+        <p:txBody>
+          <a:bodyPr lIns="90000" rIns="90000" tIns="45000" bIns="45000">
+            <a:noAutofit/>
+          </a:bodyPr>
           <a:p>
             <a:pPr>
               <a:lnSpc>
                 <a:spcPct val="100000"/>
               </a:lnSpc>
-              <a:spcAft>
-                <a:spcPts val="601"/>
-              </a:spcAft>
             </a:pPr>
             <a:r>
               <a:rPr b="1" lang="de-DE" sz="1800" spc="-1" strike="noStrike">
                 <a:solidFill>
-                  <a:srgbClr val="003259"/>
+                  <a:srgbClr val="000000"/>
                 </a:solidFill>
                 <a:latin typeface="Arial"/>
                 <a:ea typeface="DejaVu Sans"/>
               </a:rPr>
-              <a:t>2. Gründung</a:t>
+              <a:t>1. Nach dem Gesellschaftsvertrag</a:t>
             </a:r>
             <a:endParaRPr b="0" lang="de-DE" sz="1800" spc="-1" strike="noStrike">
               <a:latin typeface="Arial"/>
@@ -3986,19 +4201,126 @@
               <a:lnSpc>
                 <a:spcPct val="100000"/>
               </a:lnSpc>
-              <a:spcAft>
-                <a:spcPts val="601"/>
-              </a:spcAft>
+            </a:pPr>
+            <a:endParaRPr b="0" lang="de-DE" sz="1800" spc="-1" strike="noStrike">
+              <a:latin typeface="Arial"/>
+            </a:endParaRPr>
+          </a:p>
+          <a:p>
+            <a:pPr>
+              <a:lnSpc>
+                <a:spcPct val="100000"/>
+              </a:lnSpc>
+            </a:pPr>
+            <a:r>
+              <a:rPr b="0" lang="de-DE" sz="1800" spc="-1" strike="noStrike">
+                <a:solidFill>
+                  <a:srgbClr val="000000"/>
+                </a:solidFill>
+                <a:latin typeface="Arial"/>
+                <a:ea typeface="DejaVu Sans"/>
+              </a:rPr>
+              <a:t>	</a:t>
+            </a:r>
+            <a:r>
+              <a:rPr b="0" lang="de-DE" sz="1800" spc="-1" strike="noStrike">
+                <a:solidFill>
+                  <a:srgbClr val="000000"/>
+                </a:solidFill>
+                <a:latin typeface="Arial"/>
+                <a:ea typeface="DejaVu Sans"/>
+              </a:rPr>
+              <a:t>- Gestaltung nach eigenem Interesse</a:t>
+            </a:r>
+            <a:endParaRPr b="0" lang="de-DE" sz="1800" spc="-1" strike="noStrike">
+              <a:latin typeface="Arial"/>
+            </a:endParaRPr>
+          </a:p>
+          <a:p>
+            <a:pPr>
+              <a:lnSpc>
+                <a:spcPct val="100000"/>
+              </a:lnSpc>
+            </a:pPr>
+            <a:r>
+              <a:rPr b="0" lang="de-DE" sz="1800" spc="-1" strike="noStrike">
+                <a:solidFill>
+                  <a:srgbClr val="000000"/>
+                </a:solidFill>
+                <a:latin typeface="Arial"/>
+                <a:ea typeface="DejaVu Sans"/>
+              </a:rPr>
+              <a:t>	</a:t>
+            </a:r>
+            <a:r>
+              <a:rPr b="0" lang="de-DE" sz="1800" spc="-1" strike="noStrike">
+                <a:solidFill>
+                  <a:srgbClr val="000000"/>
+                </a:solidFill>
+                <a:latin typeface="Arial"/>
+                <a:ea typeface="DejaVu Sans"/>
+              </a:rPr>
+              <a:t>- Höhe der Kapitaleinlagen</a:t>
+            </a:r>
+            <a:endParaRPr b="0" lang="de-DE" sz="1800" spc="-1" strike="noStrike">
+              <a:latin typeface="Arial"/>
+            </a:endParaRPr>
+          </a:p>
+          <a:p>
+            <a:pPr>
+              <a:lnSpc>
+                <a:spcPct val="100000"/>
+              </a:lnSpc>
+            </a:pPr>
+            <a:r>
+              <a:rPr b="0" lang="de-DE" sz="1800" spc="-1" strike="noStrike">
+                <a:solidFill>
+                  <a:srgbClr val="000000"/>
+                </a:solidFill>
+                <a:latin typeface="Arial"/>
+                <a:ea typeface="DejaVu Sans"/>
+              </a:rPr>
+              <a:t>	</a:t>
+            </a:r>
+            <a:r>
+              <a:rPr b="0" lang="de-DE" sz="1800" spc="-1" strike="noStrike">
+                <a:solidFill>
+                  <a:srgbClr val="000000"/>
+                </a:solidFill>
+                <a:latin typeface="Arial"/>
+                <a:ea typeface="DejaVu Sans"/>
+              </a:rPr>
+              <a:t>- Pflicht: Beteiligung an der Gesellschaft</a:t>
+            </a:r>
+            <a:endParaRPr b="0" lang="de-DE" sz="1800" spc="-1" strike="noStrike">
+              <a:latin typeface="Arial"/>
+            </a:endParaRPr>
+          </a:p>
+          <a:p>
+            <a:pPr>
+              <a:lnSpc>
+                <a:spcPct val="100000"/>
+              </a:lnSpc>
+            </a:pPr>
+            <a:endParaRPr b="0" lang="de-DE" sz="1800" spc="-1" strike="noStrike">
+              <a:latin typeface="Arial"/>
+            </a:endParaRPr>
+          </a:p>
+          <a:p>
+            <a:pPr>
+              <a:lnSpc>
+                <a:spcPct val="100000"/>
+              </a:lnSpc>
             </a:pPr>
             <a:r>
               <a:rPr b="1" lang="de-DE" sz="1800" spc="-1" strike="noStrike">
                 <a:solidFill>
-                  <a:srgbClr val="003259"/>
+                  <a:srgbClr val="000000"/>
                 </a:solidFill>
                 <a:latin typeface="Arial"/>
                 <a:ea typeface="DejaVu Sans"/>
               </a:rPr>
-              <a:t>3. Haftung</a:t>
+              <a:t>2. Nach dem Handelsgesetzbuch</a:t>
             </a:r>
             <a:endParaRPr b="0" lang="de-DE" sz="1800" spc="-1" strike="noStrike">
               <a:latin typeface="Arial"/>
@@ -4009,19 +4331,36 @@
               <a:lnSpc>
                 <a:spcPct val="100000"/>
               </a:lnSpc>
-              <a:spcAft>
-                <a:spcPts val="601"/>
-              </a:spcAft>
-            </a:pPr>
-            <a:r>
-              <a:rPr b="1" lang="de-DE" sz="1800" spc="-1" strike="noStrike">
+            </a:pPr>
+            <a:endParaRPr b="0" lang="de-DE" sz="1800" spc="-1" strike="noStrike">
+              <a:latin typeface="Arial"/>
+            </a:endParaRPr>
+          </a:p>
+          <a:p>
+            <a:pPr>
+              <a:lnSpc>
+                <a:spcPct val="100000"/>
+              </a:lnSpc>
+            </a:pPr>
+            <a:r>
+              <a:rPr b="0" lang="de-DE" sz="1800" spc="-1" strike="noStrike">
                 <a:solidFill>
-                  <a:srgbClr val="003259"/>
+                  <a:srgbClr val="000000"/>
                 </a:solidFill>
                 <a:latin typeface="Arial"/>
                 <a:ea typeface="DejaVu Sans"/>
               </a:rPr>
-              <a:t>4. Geschäftsführung</a:t>
+              <a:t>	</a:t>
+            </a:r>
+            <a:r>
+              <a:rPr b="0" lang="de-DE" sz="1800" spc="-1" strike="noStrike">
+                <a:solidFill>
+                  <a:srgbClr val="000000"/>
+                </a:solidFill>
+                <a:latin typeface="Arial"/>
+                <a:ea typeface="DejaVu Sans"/>
+              </a:rPr>
+              <a:t>- angemessene Verteilung (Höhe Kapitaleinlage)</a:t>
             </a:r>
             <a:endParaRPr b="0" lang="de-DE" sz="1800" spc="-1" strike="noStrike">
               <a:latin typeface="Arial"/>
@@ -4032,19 +4371,26 @@
               <a:lnSpc>
                 <a:spcPct val="100000"/>
               </a:lnSpc>
-              <a:spcAft>
-                <a:spcPts val="601"/>
-              </a:spcAft>
-            </a:pPr>
-            <a:r>
-              <a:rPr b="1" lang="de-DE" sz="1800" spc="-1" strike="noStrike">
+            </a:pPr>
+            <a:r>
+              <a:rPr b="0" lang="de-DE" sz="1800" spc="-1" strike="noStrike">
                 <a:solidFill>
-                  <a:srgbClr val="003259"/>
+                  <a:srgbClr val="000000"/>
                 </a:solidFill>
                 <a:latin typeface="Arial"/>
                 <a:ea typeface="DejaVu Sans"/>
               </a:rPr>
-              <a:t>5. Vor- und Nachteile</a:t>
+              <a:t>	</a:t>
+            </a:r>
+            <a:r>
+              <a:rPr b="0" lang="de-DE" sz="1800" spc="-1" strike="noStrike">
+                <a:solidFill>
+                  <a:srgbClr val="000000"/>
+                </a:solidFill>
+                <a:latin typeface="Arial"/>
+                <a:ea typeface="DejaVu Sans"/>
+              </a:rPr>
+              <a:t>- festgelegter Gewinn: 4 % Verzinsung Kapitaleinlagen</a:t>
             </a:r>
             <a:endParaRPr b="0" lang="de-DE" sz="1800" spc="-1" strike="noStrike">
               <a:latin typeface="Arial"/>
@@ -4055,19 +4401,26 @@
               <a:lnSpc>
                 <a:spcPct val="100000"/>
               </a:lnSpc>
-              <a:spcAft>
-                <a:spcPts val="601"/>
-              </a:spcAft>
-            </a:pPr>
-            <a:r>
-              <a:rPr b="1" lang="de-DE" sz="1800" spc="-1" strike="noStrike">
+            </a:pPr>
+            <a:r>
+              <a:rPr b="0" lang="de-DE" sz="1800" spc="-1" strike="noStrike">
                 <a:solidFill>
-                  <a:srgbClr val="003259"/>
+                  <a:srgbClr val="000000"/>
                 </a:solidFill>
                 <a:latin typeface="Arial"/>
                 <a:ea typeface="DejaVu Sans"/>
               </a:rPr>
-              <a:t>6. Beispiel: TODO</a:t>
+              <a:t>	</a:t>
+            </a:r>
+            <a:r>
+              <a:rPr b="0" lang="de-DE" sz="1800" spc="-1" strike="noStrike">
+                <a:solidFill>
+                  <a:srgbClr val="000000"/>
+                </a:solidFill>
+                <a:latin typeface="Arial"/>
+                <a:ea typeface="DejaVu Sans"/>
+              </a:rPr>
+              <a:t>- Zinssumme und Gehalt werden vom Gewinn abgezogen</a:t>
             </a:r>
             <a:endParaRPr b="0" lang="de-DE" sz="1800" spc="-1" strike="noStrike">
               <a:latin typeface="Arial"/>
@@ -4078,23 +4431,27 @@
               <a:lnSpc>
                 <a:spcPct val="100000"/>
               </a:lnSpc>
-              <a:spcAft>
-                <a:spcPts val="601"/>
-              </a:spcAft>
-            </a:pPr>
-            <a:endParaRPr b="0" lang="de-DE" sz="1800" spc="-1" strike="noStrike">
-              <a:latin typeface="Arial"/>
-            </a:endParaRPr>
-          </a:p>
-          <a:p>
-            <a:pPr>
-              <a:lnSpc>
-                <a:spcPct val="100000"/>
-              </a:lnSpc>
-              <a:spcAft>
-                <a:spcPts val="601"/>
-              </a:spcAft>
-            </a:pPr>
+            </a:pPr>
+            <a:r>
+              <a:rPr b="0" lang="de-DE" sz="1800" spc="-1" strike="noStrike">
+                <a:solidFill>
+                  <a:srgbClr val="000000"/>
+                </a:solidFill>
+                <a:latin typeface="Arial"/>
+                <a:ea typeface="DejaVu Sans"/>
+              </a:rPr>
+              <a:t>	</a:t>
+            </a:r>
+            <a:r>
+              <a:rPr b="0" lang="de-DE" sz="1800" spc="-1" strike="noStrike">
+                <a:solidFill>
+                  <a:srgbClr val="000000"/>
+                </a:solidFill>
+                <a:latin typeface="Arial"/>
+                <a:ea typeface="DejaVu Sans"/>
+              </a:rPr>
+              <a:t>- Restlicher Gewinn wird verteilt</a:t>
+            </a:r>
             <a:endParaRPr b="0" lang="de-DE" sz="1800" spc="-1" strike="noStrike">
               <a:latin typeface="Arial"/>
             </a:endParaRPr>
@@ -4133,14 +4490,14 @@
       </p:grpSpPr>
       <p:sp>
         <p:nvSpPr>
-          <p:cNvPr id="90" name="CustomShape 1"/>
+          <p:cNvPr id="93" name="CustomShape 1"/>
           <p:cNvSpPr/>
           <p:nvPr/>
         </p:nvSpPr>
         <p:spPr>
           <a:xfrm>
             <a:off x="874800" y="343080"/>
-            <a:ext cx="7962840" cy="582480"/>
+            <a:ext cx="7962480" cy="582120"/>
           </a:xfrm>
           <a:prstGeom prst="rect">
             <a:avLst/>
@@ -4159,14 +4516,14 @@
       </p:sp>
       <p:sp>
         <p:nvSpPr>
-          <p:cNvPr id="91" name="CustomShape 2"/>
+          <p:cNvPr id="94" name="CustomShape 2"/>
           <p:cNvSpPr/>
           <p:nvPr/>
         </p:nvSpPr>
         <p:spPr>
           <a:xfrm>
-            <a:off x="874800" y="1428480"/>
-            <a:ext cx="7962840" cy="3181320"/>
+            <a:off x="874800" y="1381680"/>
+            <a:ext cx="3893400" cy="3279600"/>
           </a:xfrm>
           <a:prstGeom prst="rect">
             <a:avLst/>
@@ -4185,14 +4542,14 @@
       </p:sp>
       <p:sp>
         <p:nvSpPr>
-          <p:cNvPr id="92" name="CustomShape 3"/>
+          <p:cNvPr id="95" name="CustomShape 3"/>
           <p:cNvSpPr/>
           <p:nvPr/>
         </p:nvSpPr>
         <p:spPr>
           <a:xfrm>
-            <a:off x="874800" y="343080"/>
-            <a:ext cx="7962840" cy="582480"/>
+            <a:off x="874800" y="990360"/>
+            <a:ext cx="3893400" cy="325080"/>
           </a:xfrm>
           <a:prstGeom prst="rect">
             <a:avLst/>
@@ -4208,42 +4565,17 @@
           <a:effectRef idx="0"/>
           <a:fontRef idx="minor"/>
         </p:style>
-        <p:txBody>
-          <a:bodyPr lIns="90000" rIns="90000" tIns="45000" bIns="45000" anchor="ctr">
-            <a:noAutofit/>
-          </a:bodyPr>
-          <a:p>
-            <a:pPr>
-              <a:lnSpc>
-                <a:spcPts val="2520"/>
-              </a:lnSpc>
-            </a:pPr>
-            <a:r>
-              <a:rPr b="1" lang="de-DE" sz="2800" spc="-1" strike="noStrike">
-                <a:solidFill>
-                  <a:srgbClr val="003259"/>
-                </a:solidFill>
-                <a:latin typeface="Arial"/>
-                <a:ea typeface="DejaVu Sans"/>
-              </a:rPr>
-              <a:t>Leitungsbefugnis</a:t>
-            </a:r>
-            <a:endParaRPr b="0" lang="de-DE" sz="2800" spc="-1" strike="noStrike">
-              <a:latin typeface="Arial"/>
-            </a:endParaRPr>
-          </a:p>
-        </p:txBody>
-      </p:sp>
-      <p:sp>
-        <p:nvSpPr>
-          <p:cNvPr id="93" name="CustomShape 4"/>
+      </p:sp>
+      <p:sp>
+        <p:nvSpPr>
+          <p:cNvPr id="96" name="CustomShape 4"/>
           <p:cNvSpPr/>
           <p:nvPr/>
         </p:nvSpPr>
         <p:spPr>
           <a:xfrm>
-            <a:off x="822960" y="1188720"/>
-            <a:ext cx="7131240" cy="3581280"/>
+            <a:off x="4943520" y="1382400"/>
+            <a:ext cx="3897000" cy="3279600"/>
           </a:xfrm>
           <a:prstGeom prst="rect">
             <a:avLst/>
@@ -4259,6 +4591,109 @@
           <a:effectRef idx="0"/>
           <a:fontRef idx="minor"/>
         </p:style>
+      </p:sp>
+      <p:sp>
+        <p:nvSpPr>
+          <p:cNvPr id="97" name="CustomShape 5"/>
+          <p:cNvSpPr/>
+          <p:nvPr/>
+        </p:nvSpPr>
+        <p:spPr>
+          <a:xfrm>
+            <a:off x="4943520" y="990360"/>
+            <a:ext cx="3897000" cy="325080"/>
+          </a:xfrm>
+          <a:prstGeom prst="rect">
+            <a:avLst/>
+          </a:prstGeom>
+          <a:noFill/>
+          <a:ln>
+            <a:noFill/>
+          </a:ln>
+        </p:spPr>
+        <p:style>
+          <a:lnRef idx="0"/>
+          <a:fillRef idx="0"/>
+          <a:effectRef idx="0"/>
+          <a:fontRef idx="minor"/>
+        </p:style>
+      </p:sp>
+      <p:sp>
+        <p:nvSpPr>
+          <p:cNvPr id="98" name="CustomShape 6"/>
+          <p:cNvSpPr/>
+          <p:nvPr/>
+        </p:nvSpPr>
+        <p:spPr>
+          <a:xfrm>
+            <a:off x="874800" y="343080"/>
+            <a:ext cx="7962480" cy="582120"/>
+          </a:xfrm>
+          <a:prstGeom prst="rect">
+            <a:avLst/>
+          </a:prstGeom>
+          <a:noFill/>
+          <a:ln>
+            <a:noFill/>
+          </a:ln>
+        </p:spPr>
+        <p:style>
+          <a:lnRef idx="0"/>
+          <a:fillRef idx="0"/>
+          <a:effectRef idx="0"/>
+          <a:fontRef idx="minor"/>
+        </p:style>
+        <p:txBody>
+          <a:bodyPr lIns="90000" rIns="90000" tIns="45000" bIns="45000" anchor="ctr">
+            <a:noAutofit/>
+          </a:bodyPr>
+          <a:p>
+            <a:pPr>
+              <a:lnSpc>
+                <a:spcPts val="2520"/>
+              </a:lnSpc>
+            </a:pPr>
+            <a:r>
+              <a:rPr b="1" lang="de-DE" sz="2800" spc="-1" strike="noStrike">
+                <a:solidFill>
+                  <a:srgbClr val="003259"/>
+                </a:solidFill>
+                <a:latin typeface="Arial"/>
+                <a:ea typeface="DejaVu Sans"/>
+              </a:rPr>
+              <a:t>Rechenbeispiel</a:t>
+            </a:r>
+            <a:endParaRPr b="0" lang="de-DE" sz="2800" spc="-1" strike="noStrike">
+              <a:latin typeface="Arial"/>
+            </a:endParaRPr>
+          </a:p>
+        </p:txBody>
+      </p:sp>
+      <p:sp>
+        <p:nvSpPr>
+          <p:cNvPr id="99" name="CustomShape 7"/>
+          <p:cNvSpPr/>
+          <p:nvPr/>
+        </p:nvSpPr>
+        <p:spPr>
+          <a:xfrm>
+            <a:off x="822960" y="1188720"/>
+            <a:ext cx="7130880" cy="3141000"/>
+          </a:xfrm>
+          <a:prstGeom prst="rect">
+            <a:avLst/>
+          </a:prstGeom>
+          <a:noFill/>
+          <a:ln>
+            <a:noFill/>
+          </a:ln>
+        </p:spPr>
+        <p:style>
+          <a:lnRef idx="0"/>
+          <a:fillRef idx="0"/>
+          <a:effectRef idx="0"/>
+          <a:fontRef idx="minor"/>
+        </p:style>
         <p:txBody>
           <a:bodyPr lIns="90000" rIns="90000" tIns="45000" bIns="45000">
             <a:noAutofit/>
@@ -4277,7 +4712,7 @@
                 <a:latin typeface="Arial"/>
                 <a:ea typeface="DejaVu Sans"/>
               </a:rPr>
-              <a:t>Komplementäre</a:t>
+              <a:t>Gewinn: 200.000 €</a:t>
             </a:r>
             <a:endParaRPr b="0" lang="de-DE" sz="1800" spc="-1" strike="noStrike">
               <a:latin typeface="Arial"/>
@@ -4305,19 +4740,39 @@
                   <a:srgbClr val="000000"/>
                 </a:solidFill>
                 <a:latin typeface="Arial"/>
-                <a:ea typeface="Droid Sans Fallback"/>
-              </a:rPr>
-              <a:t>	</a:t>
-            </a:r>
+                <a:ea typeface="DejaVu Sans"/>
+              </a:rPr>
+              <a:t>2 Komplementäre: je 400.000 € Kapitaleinlage, 50.000 € Gehalt</a:t>
+            </a:r>
+            <a:endParaRPr b="0" lang="de-DE" sz="1800" spc="-1" strike="noStrike">
+              <a:latin typeface="Arial"/>
+            </a:endParaRPr>
+          </a:p>
+          <a:p>
+            <a:pPr>
+              <a:lnSpc>
+                <a:spcPct val="100000"/>
+              </a:lnSpc>
+            </a:pPr>
+            <a:endParaRPr b="0" lang="de-DE" sz="1800" spc="-1" strike="noStrike">
+              <a:latin typeface="Arial"/>
+            </a:endParaRPr>
+          </a:p>
+          <a:p>
+            <a:pPr>
+              <a:lnSpc>
+                <a:spcPct val="100000"/>
+              </a:lnSpc>
+            </a:pPr>
             <a:r>
               <a:rPr b="0" lang="de-DE" sz="1800" spc="-1" strike="noStrike">
                 <a:solidFill>
                   <a:srgbClr val="000000"/>
                 </a:solidFill>
                 <a:latin typeface="Arial"/>
-                <a:ea typeface="Droid Sans Fallback"/>
-              </a:rPr>
-              <a:t>- persönlich haftende Gesellschafter</a:t>
+                <a:ea typeface="DejaVu Sans"/>
+              </a:rPr>
+              <a:t>1 Kommanditist: 100.000 € Kapitaleinlage</a:t>
             </a:r>
             <a:endParaRPr b="0" lang="de-DE" sz="1800" spc="-1" strike="noStrike">
               <a:latin typeface="Arial"/>
@@ -4329,36 +4784,6 @@
                 <a:spcPct val="100000"/>
               </a:lnSpc>
             </a:pPr>
-            <a:r>
-              <a:rPr b="0" lang="de-DE" sz="1800" spc="-1" strike="noStrike">
-                <a:solidFill>
-                  <a:srgbClr val="000000"/>
-                </a:solidFill>
-                <a:latin typeface="Arial"/>
-                <a:ea typeface="Droid Sans Fallback"/>
-              </a:rPr>
-              <a:t>	</a:t>
-            </a:r>
-            <a:r>
-              <a:rPr b="0" lang="de-DE" sz="1800" spc="-1" strike="noStrike">
-                <a:solidFill>
-                  <a:srgbClr val="000000"/>
-                </a:solidFill>
-                <a:latin typeface="Arial"/>
-                <a:ea typeface="Droid Sans Fallback"/>
-              </a:rPr>
-              <a:t>- als Geschäftsführer</a:t>
-            </a:r>
-            <a:r>
-              <a:rPr b="0" lang="de-DE" sz="1800" spc="-1" strike="noStrike">
-                <a:solidFill>
-                  <a:srgbClr val="000000"/>
-                </a:solidFill>
-                <a:latin typeface="Arial"/>
-                <a:ea typeface="Droid Sans Fallback"/>
-              </a:rPr>
-              <a:t>	</a:t>
-            </a:r>
             <a:endParaRPr b="0" lang="de-DE" sz="1800" spc="-1" strike="noStrike">
               <a:latin typeface="Arial"/>
             </a:endParaRPr>
@@ -4369,26 +4794,6 @@
                 <a:spcPct val="100000"/>
               </a:lnSpc>
             </a:pPr>
-            <a:r>
-              <a:rPr b="0" lang="de-DE" sz="1800" spc="-1" strike="noStrike">
-                <a:solidFill>
-                  <a:srgbClr val="000000"/>
-                </a:solidFill>
-                <a:latin typeface="Arial"/>
-                <a:ea typeface="Droid Sans Fallback"/>
-              </a:rPr>
-              <a:t>	</a:t>
-            </a:r>
-            <a:r>
-              <a:rPr b="0" lang="de-DE" sz="1800" spc="-1" strike="noStrike">
-                <a:solidFill>
-                  <a:srgbClr val="000000"/>
-                </a:solidFill>
-                <a:latin typeface="Arial"/>
-                <a:ea typeface="Droid Sans Fallback"/>
-              </a:rPr>
-              <a:t>- alleinige Vertretung der Gesellschaft</a:t>
-            </a:r>
             <a:endParaRPr b="0" lang="de-DE" sz="1800" spc="-1" strike="noStrike">
               <a:latin typeface="Arial"/>
             </a:endParaRPr>
@@ -4409,116 +4814,6 @@
                 <a:spcPct val="100000"/>
               </a:lnSpc>
             </a:pPr>
-            <a:r>
-              <a:rPr b="0" lang="de-DE" sz="1800" spc="-1" strike="noStrike">
-                <a:solidFill>
-                  <a:srgbClr val="000000"/>
-                </a:solidFill>
-                <a:latin typeface="Arial"/>
-                <a:ea typeface="Droid Sans Fallback"/>
-              </a:rPr>
-              <a:t>Kommanditisten</a:t>
-            </a:r>
-            <a:endParaRPr b="0" lang="de-DE" sz="1800" spc="-1" strike="noStrike">
-              <a:latin typeface="Arial"/>
-            </a:endParaRPr>
-          </a:p>
-          <a:p>
-            <a:pPr>
-              <a:lnSpc>
-                <a:spcPct val="100000"/>
-              </a:lnSpc>
-            </a:pPr>
-            <a:endParaRPr b="0" lang="de-DE" sz="1800" spc="-1" strike="noStrike">
-              <a:latin typeface="Arial"/>
-            </a:endParaRPr>
-          </a:p>
-          <a:p>
-            <a:pPr>
-              <a:lnSpc>
-                <a:spcPct val="100000"/>
-              </a:lnSpc>
-            </a:pPr>
-            <a:r>
-              <a:rPr b="0" lang="de-DE" sz="1800" spc="-1" strike="noStrike">
-                <a:solidFill>
-                  <a:srgbClr val="000000"/>
-                </a:solidFill>
-                <a:latin typeface="Arial"/>
-                <a:ea typeface="Droid Sans Fallback"/>
-              </a:rPr>
-              <a:t>	</a:t>
-            </a:r>
-            <a:r>
-              <a:rPr b="0" lang="de-DE" sz="1800" spc="-1" strike="noStrike">
-                <a:solidFill>
-                  <a:srgbClr val="000000"/>
-                </a:solidFill>
-                <a:latin typeface="Arial"/>
-                <a:ea typeface="Droid Sans Fallback"/>
-              </a:rPr>
-              <a:t>- sind von Führung ausgeschlossen</a:t>
-            </a:r>
-            <a:endParaRPr b="0" lang="de-DE" sz="1800" spc="-1" strike="noStrike">
-              <a:latin typeface="Arial"/>
-            </a:endParaRPr>
-          </a:p>
-          <a:p>
-            <a:pPr>
-              <a:lnSpc>
-                <a:spcPct val="100000"/>
-              </a:lnSpc>
-            </a:pPr>
-            <a:r>
-              <a:rPr b="0" lang="de-DE" sz="1800" spc="-1" strike="noStrike">
-                <a:solidFill>
-                  <a:srgbClr val="000000"/>
-                </a:solidFill>
-                <a:latin typeface="Arial"/>
-                <a:ea typeface="Droid Sans Fallback"/>
-              </a:rPr>
-              <a:t>	</a:t>
-            </a:r>
-            <a:r>
-              <a:rPr b="0" lang="de-DE" sz="1800" spc="-1" strike="noStrike">
-                <a:solidFill>
-                  <a:srgbClr val="000000"/>
-                </a:solidFill>
-                <a:latin typeface="Arial"/>
-                <a:ea typeface="Droid Sans Fallback"/>
-              </a:rPr>
-              <a:t>- Erteilung von Rechten möglich</a:t>
-            </a:r>
-            <a:endParaRPr b="0" lang="de-DE" sz="1800" spc="-1" strike="noStrike">
-              <a:latin typeface="Arial"/>
-            </a:endParaRPr>
-          </a:p>
-          <a:p>
-            <a:pPr>
-              <a:lnSpc>
-                <a:spcPct val="100000"/>
-              </a:lnSpc>
-            </a:pPr>
-            <a:r>
-              <a:rPr b="0" lang="de-DE" sz="1800" spc="-1" strike="noStrike">
-                <a:solidFill>
-                  <a:srgbClr val="000000"/>
-                </a:solidFill>
-                <a:latin typeface="Arial"/>
-                <a:ea typeface="Droid Sans Fallback"/>
-              </a:rPr>
-              <a:t>	</a:t>
-            </a:r>
-            <a:r>
-              <a:rPr b="0" lang="de-DE" sz="1800" spc="-1" strike="noStrike">
-                <a:solidFill>
-                  <a:srgbClr val="000000"/>
-                </a:solidFill>
-                <a:latin typeface="Arial"/>
-                <a:ea typeface="Droid Sans Fallback"/>
-              </a:rPr>
-              <a:t>- Kontrollbefugnis</a:t>
-            </a:r>
             <a:endParaRPr b="0" lang="de-DE" sz="1800" spc="-1" strike="noStrike">
               <a:latin typeface="Arial"/>
             </a:endParaRPr>
@@ -4567,14 +4862,14 @@
       </p:grpSpPr>
       <p:sp>
         <p:nvSpPr>
-          <p:cNvPr id="94" name="CustomShape 1"/>
+          <p:cNvPr id="100" name="CustomShape 1"/>
           <p:cNvSpPr/>
           <p:nvPr/>
         </p:nvSpPr>
         <p:spPr>
           <a:xfrm>
             <a:off x="874800" y="343080"/>
-            <a:ext cx="7962840" cy="582480"/>
+            <a:ext cx="7962480" cy="582120"/>
           </a:xfrm>
           <a:prstGeom prst="rect">
             <a:avLst/>
@@ -4593,14 +4888,14 @@
       </p:sp>
       <p:sp>
         <p:nvSpPr>
-          <p:cNvPr id="95" name="CustomShape 2"/>
+          <p:cNvPr id="101" name="CustomShape 2"/>
           <p:cNvSpPr/>
           <p:nvPr/>
         </p:nvSpPr>
         <p:spPr>
           <a:xfrm>
             <a:off x="874800" y="1381680"/>
-            <a:ext cx="3893760" cy="3279960"/>
+            <a:ext cx="3893400" cy="3279600"/>
           </a:xfrm>
           <a:prstGeom prst="rect">
             <a:avLst/>
@@ -4619,14 +4914,14 @@
       </p:sp>
       <p:sp>
         <p:nvSpPr>
-          <p:cNvPr id="96" name="CustomShape 3"/>
+          <p:cNvPr id="102" name="CustomShape 3"/>
           <p:cNvSpPr/>
           <p:nvPr/>
         </p:nvSpPr>
         <p:spPr>
           <a:xfrm>
             <a:off x="874800" y="990360"/>
-            <a:ext cx="3893760" cy="325440"/>
+            <a:ext cx="3893400" cy="325080"/>
           </a:xfrm>
           <a:prstGeom prst="rect">
             <a:avLst/>
@@ -4645,14 +4940,14 @@
       </p:sp>
       <p:sp>
         <p:nvSpPr>
-          <p:cNvPr id="97" name="CustomShape 4"/>
+          <p:cNvPr id="103" name="CustomShape 4"/>
           <p:cNvSpPr/>
           <p:nvPr/>
         </p:nvSpPr>
         <p:spPr>
           <a:xfrm>
             <a:off x="4943520" y="1382400"/>
-            <a:ext cx="3897360" cy="3279960"/>
+            <a:ext cx="3897000" cy="3279600"/>
           </a:xfrm>
           <a:prstGeom prst="rect">
             <a:avLst/>
@@ -4671,14 +4966,14 @@
       </p:sp>
       <p:sp>
         <p:nvSpPr>
-          <p:cNvPr id="98" name="CustomShape 5"/>
+          <p:cNvPr id="104" name="CustomShape 5"/>
           <p:cNvSpPr/>
           <p:nvPr/>
         </p:nvSpPr>
         <p:spPr>
           <a:xfrm>
             <a:off x="4943520" y="990360"/>
-            <a:ext cx="3897360" cy="325440"/>
+            <a:ext cx="3897000" cy="325080"/>
           </a:xfrm>
           <a:prstGeom prst="rect">
             <a:avLst/>
@@ -4697,14 +4992,14 @@
       </p:sp>
       <p:sp>
         <p:nvSpPr>
-          <p:cNvPr id="99" name="CustomShape 6"/>
+          <p:cNvPr id="105" name="CustomShape 6"/>
           <p:cNvSpPr/>
           <p:nvPr/>
         </p:nvSpPr>
         <p:spPr>
           <a:xfrm>
             <a:off x="874800" y="343080"/>
-            <a:ext cx="7962840" cy="582480"/>
+            <a:ext cx="7962480" cy="582120"/>
           </a:xfrm>
           <a:prstGeom prst="rect">
             <a:avLst/>
@@ -4738,7 +5033,7 @@
                 <a:latin typeface="Arial"/>
                 <a:ea typeface="DejaVu Sans"/>
               </a:rPr>
-              <a:t>Gewinnverteilung</a:t>
+              <a:t>Rechenbeispiel II</a:t>
             </a:r>
             <a:endParaRPr b="0" lang="de-DE" sz="2800" spc="-1" strike="noStrike">
               <a:latin typeface="Arial"/>
@@ -4748,14 +5043,14 @@
       </p:sp>
       <p:sp>
         <p:nvSpPr>
-          <p:cNvPr id="100" name="CustomShape 7"/>
+          <p:cNvPr id="106" name="CustomShape 7"/>
           <p:cNvSpPr/>
           <p:nvPr/>
         </p:nvSpPr>
         <p:spPr>
           <a:xfrm>
             <a:off x="822960" y="1188720"/>
-            <a:ext cx="7131240" cy="3160800"/>
+            <a:ext cx="7130880" cy="2703240"/>
           </a:xfrm>
           <a:prstGeom prst="rect">
             <a:avLst/>
@@ -4789,7 +5084,7 @@
                 <a:latin typeface="Arial"/>
                 <a:ea typeface="DejaVu Sans"/>
               </a:rPr>
-              <a:t>1. Nach dem Gesellschaftsvertrag</a:t>
+              <a:t>Verzinsung der Kapitaleinlagen</a:t>
             </a:r>
             <a:endParaRPr b="0" lang="de-DE" sz="1800" spc="-1" strike="noStrike">
               <a:latin typeface="Arial"/>
@@ -4819,8 +5114,18 @@
                 <a:latin typeface="Arial"/>
                 <a:ea typeface="DejaVu Sans"/>
               </a:rPr>
-              <a:t>	</a:t>
-            </a:r>
+              <a:t>4 % von 400.000 € = 16.000 €</a:t>
+            </a:r>
+            <a:endParaRPr b="0" lang="de-DE" sz="1800" spc="-1" strike="noStrike">
+              <a:latin typeface="Arial"/>
+            </a:endParaRPr>
+          </a:p>
+          <a:p>
+            <a:pPr>
+              <a:lnSpc>
+                <a:spcPct val="100000"/>
+              </a:lnSpc>
+            </a:pPr>
             <a:r>
               <a:rPr b="0" lang="de-DE" sz="1800" spc="-1" strike="noStrike">
                 <a:solidFill>
@@ -4829,8 +5134,18 @@
                 <a:latin typeface="Arial"/>
                 <a:ea typeface="DejaVu Sans"/>
               </a:rPr>
-              <a:t>- Gestaltung nach eigenem Interesse</a:t>
-            </a:r>
+              <a:t>4 % von 200.000 € = 8.000 €</a:t>
+            </a:r>
+            <a:endParaRPr b="0" lang="de-DE" sz="1800" spc="-1" strike="noStrike">
+              <a:latin typeface="Arial"/>
+            </a:endParaRPr>
+          </a:p>
+          <a:p>
+            <a:pPr>
+              <a:lnSpc>
+                <a:spcPct val="100000"/>
+              </a:lnSpc>
+            </a:pPr>
             <a:endParaRPr b="0" lang="de-DE" sz="1800" spc="-1" strike="noStrike">
               <a:latin typeface="Arial"/>
             </a:endParaRPr>
@@ -4849,8 +5164,58 @@
                 <a:latin typeface="Arial"/>
                 <a:ea typeface="DejaVu Sans"/>
               </a:rPr>
-              <a:t>	</a:t>
-            </a:r>
+              <a:t>--&gt; 200.000 € - 32.000 € - 8.000 € = 160.000 €</a:t>
+            </a:r>
+            <a:endParaRPr b="0" lang="de-DE" sz="1800" spc="-1" strike="noStrike">
+              <a:latin typeface="Arial"/>
+            </a:endParaRPr>
+          </a:p>
+          <a:p>
+            <a:pPr>
+              <a:lnSpc>
+                <a:spcPct val="100000"/>
+              </a:lnSpc>
+            </a:pPr>
+            <a:endParaRPr b="0" lang="de-DE" sz="1800" spc="-1" strike="noStrike">
+              <a:latin typeface="Arial"/>
+            </a:endParaRPr>
+          </a:p>
+          <a:p>
+            <a:pPr>
+              <a:lnSpc>
+                <a:spcPct val="100000"/>
+              </a:lnSpc>
+            </a:pPr>
+            <a:r>
+              <a:rPr b="1" lang="de-DE" sz="1800" spc="-1" strike="noStrike">
+                <a:solidFill>
+                  <a:srgbClr val="000000"/>
+                </a:solidFill>
+                <a:latin typeface="Arial"/>
+                <a:ea typeface="DejaVu Sans"/>
+              </a:rPr>
+              <a:t>Abzug der Gehälter</a:t>
+            </a:r>
+            <a:endParaRPr b="0" lang="de-DE" sz="1800" spc="-1" strike="noStrike">
+              <a:latin typeface="Arial"/>
+            </a:endParaRPr>
+          </a:p>
+          <a:p>
+            <a:pPr>
+              <a:lnSpc>
+                <a:spcPct val="100000"/>
+              </a:lnSpc>
+            </a:pPr>
+            <a:endParaRPr b="0" lang="de-DE" sz="1800" spc="-1" strike="noStrike">
+              <a:latin typeface="Arial"/>
+            </a:endParaRPr>
+          </a:p>
+          <a:p>
+            <a:pPr>
+              <a:lnSpc>
+                <a:spcPct val="100000"/>
+              </a:lnSpc>
+            </a:pPr>
             <a:r>
               <a:rPr b="0" lang="de-DE" sz="1800" spc="-1" strike="noStrike">
                 <a:solidFill>
@@ -4859,197 +5224,7 @@
                 <a:latin typeface="Arial"/>
                 <a:ea typeface="DejaVu Sans"/>
               </a:rPr>
-              <a:t>- Höhe der Kapitaleinlagen</a:t>
-            </a:r>
-            <a:endParaRPr b="0" lang="de-DE" sz="1800" spc="-1" strike="noStrike">
-              <a:latin typeface="Arial"/>
-            </a:endParaRPr>
-          </a:p>
-          <a:p>
-            <a:pPr>
-              <a:lnSpc>
-                <a:spcPct val="100000"/>
-              </a:lnSpc>
-            </a:pPr>
-            <a:r>
-              <a:rPr b="0" lang="de-DE" sz="1800" spc="-1" strike="noStrike">
-                <a:solidFill>
-                  <a:srgbClr val="000000"/>
-                </a:solidFill>
-                <a:latin typeface="Arial"/>
-                <a:ea typeface="DejaVu Sans"/>
-              </a:rPr>
-              <a:t>	</a:t>
-            </a:r>
-            <a:r>
-              <a:rPr b="0" lang="de-DE" sz="1800" spc="-1" strike="noStrike">
-                <a:solidFill>
-                  <a:srgbClr val="000000"/>
-                </a:solidFill>
-                <a:latin typeface="Arial"/>
-                <a:ea typeface="DejaVu Sans"/>
-              </a:rPr>
-              <a:t>- Pflicht: Beteiligung an der Gesellschaft</a:t>
-            </a:r>
-            <a:endParaRPr b="0" lang="de-DE" sz="1800" spc="-1" strike="noStrike">
-              <a:latin typeface="Arial"/>
-            </a:endParaRPr>
-          </a:p>
-          <a:p>
-            <a:pPr>
-              <a:lnSpc>
-                <a:spcPct val="100000"/>
-              </a:lnSpc>
-            </a:pPr>
-            <a:endParaRPr b="0" lang="de-DE" sz="1800" spc="-1" strike="noStrike">
-              <a:latin typeface="Arial"/>
-            </a:endParaRPr>
-          </a:p>
-          <a:p>
-            <a:pPr>
-              <a:lnSpc>
-                <a:spcPct val="100000"/>
-              </a:lnSpc>
-            </a:pPr>
-            <a:r>
-              <a:rPr b="1" lang="de-DE" sz="1800" spc="-1" strike="noStrike">
-                <a:solidFill>
-                  <a:srgbClr val="000000"/>
-                </a:solidFill>
-                <a:latin typeface="Arial"/>
-                <a:ea typeface="DejaVu Sans"/>
-              </a:rPr>
-              <a:t>2. Nach dem Handelsgesetzbuch</a:t>
-            </a:r>
-            <a:endParaRPr b="0" lang="de-DE" sz="1800" spc="-1" strike="noStrike">
-              <a:latin typeface="Arial"/>
-            </a:endParaRPr>
-          </a:p>
-          <a:p>
-            <a:pPr>
-              <a:lnSpc>
-                <a:spcPct val="100000"/>
-              </a:lnSpc>
-            </a:pPr>
-            <a:endParaRPr b="0" lang="de-DE" sz="1800" spc="-1" strike="noStrike">
-              <a:latin typeface="Arial"/>
-            </a:endParaRPr>
-          </a:p>
-          <a:p>
-            <a:pPr>
-              <a:lnSpc>
-                <a:spcPct val="100000"/>
-              </a:lnSpc>
-            </a:pPr>
-            <a:r>
-              <a:rPr b="0" lang="de-DE" sz="1800" spc="-1" strike="noStrike">
-                <a:solidFill>
-                  <a:srgbClr val="000000"/>
-                </a:solidFill>
-                <a:latin typeface="Arial"/>
-                <a:ea typeface="DejaVu Sans"/>
-              </a:rPr>
-              <a:t>	</a:t>
-            </a:r>
-            <a:r>
-              <a:rPr b="0" lang="de-DE" sz="1800" spc="-1" strike="noStrike">
-                <a:solidFill>
-                  <a:srgbClr val="000000"/>
-                </a:solidFill>
-                <a:latin typeface="Arial"/>
-                <a:ea typeface="DejaVu Sans"/>
-              </a:rPr>
-              <a:t>- angemessene Verteilung (Höhe Kapitaleinlage)</a:t>
-            </a:r>
-            <a:endParaRPr b="0" lang="de-DE" sz="1800" spc="-1" strike="noStrike">
-              <a:latin typeface="Arial"/>
-            </a:endParaRPr>
-          </a:p>
-          <a:p>
-            <a:pPr>
-              <a:lnSpc>
-                <a:spcPct val="100000"/>
-              </a:lnSpc>
-            </a:pPr>
-            <a:r>
-              <a:rPr b="0" lang="de-DE" sz="1800" spc="-1" strike="noStrike">
-                <a:solidFill>
-                  <a:srgbClr val="000000"/>
-                </a:solidFill>
-                <a:latin typeface="Arial"/>
-                <a:ea typeface="DejaVu Sans"/>
-              </a:rPr>
-              <a:t>	</a:t>
-            </a:r>
-            <a:r>
-              <a:rPr b="0" lang="de-DE" sz="1800" spc="-1" strike="noStrike">
-                <a:solidFill>
-                  <a:srgbClr val="000000"/>
-                </a:solidFill>
-                <a:latin typeface="Arial"/>
-                <a:ea typeface="DejaVu Sans"/>
-              </a:rPr>
-              <a:t>- festgelegter Gewinn: 4 % Verzinsung Kapitaleinlagen</a:t>
-            </a:r>
-            <a:endParaRPr b="0" lang="de-DE" sz="1800" spc="-1" strike="noStrike">
-              <a:latin typeface="Arial"/>
-            </a:endParaRPr>
-          </a:p>
-          <a:p>
-            <a:pPr>
-              <a:lnSpc>
-                <a:spcPct val="100000"/>
-              </a:lnSpc>
-            </a:pPr>
-            <a:r>
-              <a:rPr b="0" lang="de-DE" sz="1800" spc="-1" strike="noStrike">
-                <a:solidFill>
-                  <a:srgbClr val="000000"/>
-                </a:solidFill>
-                <a:latin typeface="Arial"/>
-                <a:ea typeface="DejaVu Sans"/>
-              </a:rPr>
-              <a:t>	</a:t>
-            </a:r>
-            <a:r>
-              <a:rPr b="0" lang="de-DE" sz="1800" spc="-1" strike="noStrike">
-                <a:solidFill>
-                  <a:srgbClr val="000000"/>
-                </a:solidFill>
-                <a:latin typeface="Arial"/>
-                <a:ea typeface="DejaVu Sans"/>
-              </a:rPr>
-              <a:t>- Zinssumme und Gehalt werden vom Gewinn abgezogen</a:t>
-            </a:r>
-            <a:endParaRPr b="0" lang="de-DE" sz="1800" spc="-1" strike="noStrike">
-              <a:latin typeface="Arial"/>
-            </a:endParaRPr>
-          </a:p>
-          <a:p>
-            <a:pPr>
-              <a:lnSpc>
-                <a:spcPct val="100000"/>
-              </a:lnSpc>
-            </a:pPr>
-            <a:r>
-              <a:rPr b="0" lang="de-DE" sz="1800" spc="-1" strike="noStrike">
-                <a:solidFill>
-                  <a:srgbClr val="000000"/>
-                </a:solidFill>
-                <a:latin typeface="Arial"/>
-                <a:ea typeface="DejaVu Sans"/>
-              </a:rPr>
-              <a:t>	</a:t>
-            </a:r>
-            <a:r>
-              <a:rPr b="0" lang="de-DE" sz="1800" spc="-1" strike="noStrike">
-                <a:solidFill>
-                  <a:srgbClr val="000000"/>
-                </a:solidFill>
-                <a:latin typeface="Arial"/>
-                <a:ea typeface="DejaVu Sans"/>
-              </a:rPr>
-              <a:t>- Restlicher Gewinn wird verteilt</a:t>
+              <a:t>160.000 € - 100.000 € = 60.000 €</a:t>
             </a:r>
             <a:endParaRPr b="0" lang="de-DE" sz="1800" spc="-1" strike="noStrike">
               <a:latin typeface="Arial"/>
@@ -5089,14 +5264,14 @@
       </p:grpSpPr>
       <p:sp>
         <p:nvSpPr>
-          <p:cNvPr id="101" name="CustomShape 1"/>
+          <p:cNvPr id="107" name="CustomShape 1"/>
           <p:cNvSpPr/>
           <p:nvPr/>
         </p:nvSpPr>
         <p:spPr>
           <a:xfrm>
             <a:off x="874800" y="343080"/>
-            <a:ext cx="7962840" cy="582480"/>
+            <a:ext cx="7962480" cy="582120"/>
           </a:xfrm>
           <a:prstGeom prst="rect">
             <a:avLst/>
@@ -5115,14 +5290,14 @@
       </p:sp>
       <p:sp>
         <p:nvSpPr>
-          <p:cNvPr id="102" name="CustomShape 2"/>
+          <p:cNvPr id="108" name="CustomShape 2"/>
           <p:cNvSpPr/>
           <p:nvPr/>
         </p:nvSpPr>
         <p:spPr>
           <a:xfrm>
             <a:off x="874800" y="1381680"/>
-            <a:ext cx="3893760" cy="3279960"/>
+            <a:ext cx="3893400" cy="3279600"/>
           </a:xfrm>
           <a:prstGeom prst="rect">
             <a:avLst/>
@@ -5141,14 +5316,14 @@
       </p:sp>
       <p:sp>
         <p:nvSpPr>
-          <p:cNvPr id="103" name="CustomShape 3"/>
+          <p:cNvPr id="109" name="CustomShape 3"/>
           <p:cNvSpPr/>
           <p:nvPr/>
         </p:nvSpPr>
         <p:spPr>
           <a:xfrm>
             <a:off x="874800" y="990360"/>
-            <a:ext cx="3893760" cy="325440"/>
+            <a:ext cx="3893400" cy="325080"/>
           </a:xfrm>
           <a:prstGeom prst="rect">
             <a:avLst/>
@@ -5167,14 +5342,14 @@
       </p:sp>
       <p:sp>
         <p:nvSpPr>
-          <p:cNvPr id="104" name="CustomShape 4"/>
+          <p:cNvPr id="110" name="CustomShape 4"/>
           <p:cNvSpPr/>
           <p:nvPr/>
         </p:nvSpPr>
         <p:spPr>
           <a:xfrm>
             <a:off x="4943520" y="1382400"/>
-            <a:ext cx="3897360" cy="3279960"/>
+            <a:ext cx="3897000" cy="3279600"/>
           </a:xfrm>
           <a:prstGeom prst="rect">
             <a:avLst/>
@@ -5193,14 +5368,14 @@
       </p:sp>
       <p:sp>
         <p:nvSpPr>
-          <p:cNvPr id="105" name="CustomShape 5"/>
+          <p:cNvPr id="111" name="CustomShape 5"/>
           <p:cNvSpPr/>
           <p:nvPr/>
         </p:nvSpPr>
         <p:spPr>
           <a:xfrm>
             <a:off x="4943520" y="990360"/>
-            <a:ext cx="3897360" cy="325440"/>
+            <a:ext cx="3897000" cy="325080"/>
           </a:xfrm>
           <a:prstGeom prst="rect">
             <a:avLst/>
@@ -5219,14 +5394,14 @@
       </p:sp>
       <p:sp>
         <p:nvSpPr>
-          <p:cNvPr id="106" name="CustomShape 6"/>
+          <p:cNvPr id="112" name="CustomShape 6"/>
           <p:cNvSpPr/>
           <p:nvPr/>
         </p:nvSpPr>
         <p:spPr>
           <a:xfrm>
             <a:off x="874800" y="343080"/>
-            <a:ext cx="7962840" cy="582480"/>
+            <a:ext cx="7962480" cy="582120"/>
           </a:xfrm>
           <a:prstGeom prst="rect">
             <a:avLst/>
@@ -5260,7 +5435,7 @@
                 <a:latin typeface="Arial"/>
                 <a:ea typeface="DejaVu Sans"/>
               </a:rPr>
-              <a:t>Rechenbeispiel</a:t>
+              <a:t>Rechenbeispiel III</a:t>
             </a:r>
             <a:endParaRPr b="0" lang="de-DE" sz="2800" spc="-1" strike="noStrike">
               <a:latin typeface="Arial"/>
@@ -5270,14 +5445,14 @@
       </p:sp>
       <p:sp>
         <p:nvSpPr>
-          <p:cNvPr id="107" name="CustomShape 7"/>
+          <p:cNvPr id="113" name="CustomShape 7"/>
           <p:cNvSpPr/>
           <p:nvPr/>
         </p:nvSpPr>
         <p:spPr>
           <a:xfrm>
             <a:off x="822960" y="1188720"/>
-            <a:ext cx="7131240" cy="3141360"/>
+            <a:ext cx="7130880" cy="2648520"/>
           </a:xfrm>
           <a:prstGeom prst="rect">
             <a:avLst/>
@@ -5304,6 +5479,36 @@
               </a:lnSpc>
             </a:pPr>
             <a:r>
+              <a:rPr b="1" lang="de-DE" sz="1800" spc="-1" strike="noStrike">
+                <a:solidFill>
+                  <a:srgbClr val="000000"/>
+                </a:solidFill>
+                <a:latin typeface="Arial"/>
+                <a:ea typeface="DejaVu Sans"/>
+              </a:rPr>
+              <a:t>Verteilung anhand der Kapitaleinlagen</a:t>
+            </a:r>
+            <a:endParaRPr b="0" lang="de-DE" sz="1800" spc="-1" strike="noStrike">
+              <a:latin typeface="Arial"/>
+            </a:endParaRPr>
+          </a:p>
+          <a:p>
+            <a:pPr>
+              <a:lnSpc>
+                <a:spcPct val="100000"/>
+              </a:lnSpc>
+            </a:pPr>
+            <a:endParaRPr b="0" lang="de-DE" sz="1800" spc="-1" strike="noStrike">
+              <a:latin typeface="Arial"/>
+            </a:endParaRPr>
+          </a:p>
+          <a:p>
+            <a:pPr>
+              <a:lnSpc>
+                <a:spcPct val="100000"/>
+              </a:lnSpc>
+            </a:pPr>
+            <a:r>
               <a:rPr b="0" lang="de-DE" sz="1800" spc="-1" strike="noStrike">
                 <a:solidFill>
                   <a:srgbClr val="000000"/>
@@ -5311,18 +5516,8 @@
                 <a:latin typeface="Arial"/>
                 <a:ea typeface="DejaVu Sans"/>
               </a:rPr>
-              <a:t>Gewinn: 200.000 €</a:t>
-            </a:r>
-            <a:endParaRPr b="0" lang="de-DE" sz="1800" spc="-1" strike="noStrike">
-              <a:latin typeface="Arial"/>
-            </a:endParaRPr>
-          </a:p>
-          <a:p>
-            <a:pPr>
-              <a:lnSpc>
-                <a:spcPct val="100000"/>
-              </a:lnSpc>
-            </a:pPr>
+              <a:t>60.000 € * 0,4 = 24.000 €</a:t>
+            </a:r>
             <a:endParaRPr b="0" lang="de-DE" sz="1800" spc="-1" strike="noStrike">
               <a:latin typeface="Arial"/>
             </a:endParaRPr>
@@ -5341,7 +5536,47 @@
                 <a:latin typeface="Arial"/>
                 <a:ea typeface="DejaVu Sans"/>
               </a:rPr>
-              <a:t>2 Komplementäre: je 400.000 € Kapitaleinlage, 50.000 € Gehalt</a:t>
+              <a:t>60.000 € * 0,2 = 12.000 €</a:t>
+            </a:r>
+            <a:endParaRPr b="0" lang="de-DE" sz="1800" spc="-1" strike="noStrike">
+              <a:latin typeface="Arial"/>
+            </a:endParaRPr>
+          </a:p>
+          <a:p>
+            <a:pPr>
+              <a:lnSpc>
+                <a:spcPct val="100000"/>
+              </a:lnSpc>
+            </a:pPr>
+            <a:endParaRPr b="0" lang="de-DE" sz="1800" spc="-1" strike="noStrike">
+              <a:latin typeface="Arial"/>
+            </a:endParaRPr>
+          </a:p>
+          <a:p>
+            <a:pPr>
+              <a:lnSpc>
+                <a:spcPct val="100000"/>
+              </a:lnSpc>
+            </a:pPr>
+            <a:endParaRPr b="0" lang="de-DE" sz="1800" spc="-1" strike="noStrike">
+              <a:latin typeface="Arial"/>
+            </a:endParaRPr>
+          </a:p>
+          <a:p>
+            <a:pPr>
+              <a:lnSpc>
+                <a:spcPct val="100000"/>
+              </a:lnSpc>
+            </a:pPr>
+            <a:r>
+              <a:rPr b="1" lang="de-DE" sz="1800" spc="-1" strike="noStrike">
+                <a:solidFill>
+                  <a:srgbClr val="000000"/>
+                </a:solidFill>
+                <a:latin typeface="Arial"/>
+                <a:ea typeface="DejaVu Sans"/>
+              </a:rPr>
+              <a:t>Persönlicher Gesamtgewinn</a:t>
             </a:r>
             <a:endParaRPr b="0" lang="de-DE" sz="1800" spc="-1" strike="noStrike">
               <a:latin typeface="Arial"/>
@@ -5371,7 +5606,7 @@
                 <a:latin typeface="Arial"/>
                 <a:ea typeface="DejaVu Sans"/>
               </a:rPr>
-              <a:t>1 Kommanditist: 100.000 € Kapitaleinlage</a:t>
+              <a:t>16.000 € + 50.000 € + 24.000 € = 90.000 €</a:t>
             </a:r>
             <a:endParaRPr b="0" lang="de-DE" sz="1800" spc="-1" strike="noStrike">
               <a:latin typeface="Arial"/>
@@ -5383,46 +5618,16 @@
                 <a:spcPct val="100000"/>
               </a:lnSpc>
             </a:pPr>
-            <a:endParaRPr b="0" lang="de-DE" sz="1800" spc="-1" strike="noStrike">
-              <a:latin typeface="Arial"/>
-            </a:endParaRPr>
-          </a:p>
-          <a:p>
-            <a:pPr>
-              <a:lnSpc>
-                <a:spcPct val="100000"/>
-              </a:lnSpc>
-            </a:pPr>
-            <a:endParaRPr b="0" lang="de-DE" sz="1800" spc="-1" strike="noStrike">
-              <a:latin typeface="Arial"/>
-            </a:endParaRPr>
-          </a:p>
-          <a:p>
-            <a:pPr>
-              <a:lnSpc>
-                <a:spcPct val="100000"/>
-              </a:lnSpc>
-            </a:pPr>
-            <a:endParaRPr b="0" lang="de-DE" sz="1800" spc="-1" strike="noStrike">
-              <a:latin typeface="Arial"/>
-            </a:endParaRPr>
-          </a:p>
-          <a:p>
-            <a:pPr>
-              <a:lnSpc>
-                <a:spcPct val="100000"/>
-              </a:lnSpc>
-            </a:pPr>
-            <a:endParaRPr b="0" lang="de-DE" sz="1800" spc="-1" strike="noStrike">
-              <a:latin typeface="Arial"/>
-            </a:endParaRPr>
-          </a:p>
-          <a:p>
-            <a:pPr>
-              <a:lnSpc>
-                <a:spcPct val="100000"/>
-              </a:lnSpc>
-            </a:pPr>
+            <a:r>
+              <a:rPr b="0" lang="de-DE" sz="1800" spc="-1" strike="noStrike">
+                <a:solidFill>
+                  <a:srgbClr val="000000"/>
+                </a:solidFill>
+                <a:latin typeface="Arial"/>
+                <a:ea typeface="DejaVu Sans"/>
+              </a:rPr>
+              <a:t>8.000 € + 12.000 € = 20.000 €</a:t>
+            </a:r>
             <a:endParaRPr b="0" lang="de-DE" sz="1800" spc="-1" strike="noStrike">
               <a:latin typeface="Arial"/>
             </a:endParaRPr>
@@ -5461,14 +5666,14 @@
       </p:grpSpPr>
       <p:sp>
         <p:nvSpPr>
-          <p:cNvPr id="108" name="CustomShape 1"/>
+          <p:cNvPr id="114" name="CustomShape 1"/>
           <p:cNvSpPr/>
           <p:nvPr/>
         </p:nvSpPr>
         <p:spPr>
           <a:xfrm>
             <a:off x="874800" y="343080"/>
-            <a:ext cx="7962840" cy="582480"/>
+            <a:ext cx="7962480" cy="582120"/>
           </a:xfrm>
           <a:prstGeom prst="rect">
             <a:avLst/>
@@ -5487,14 +5692,14 @@
       </p:sp>
       <p:sp>
         <p:nvSpPr>
-          <p:cNvPr id="109" name="CustomShape 2"/>
+          <p:cNvPr id="115" name="CustomShape 2"/>
           <p:cNvSpPr/>
           <p:nvPr/>
         </p:nvSpPr>
         <p:spPr>
           <a:xfrm>
             <a:off x="874800" y="1381680"/>
-            <a:ext cx="3893760" cy="3279960"/>
+            <a:ext cx="3893400" cy="3279600"/>
           </a:xfrm>
           <a:prstGeom prst="rect">
             <a:avLst/>
@@ -5513,14 +5718,14 @@
       </p:sp>
       <p:sp>
         <p:nvSpPr>
-          <p:cNvPr id="110" name="CustomShape 3"/>
+          <p:cNvPr id="116" name="CustomShape 3"/>
           <p:cNvSpPr/>
           <p:nvPr/>
         </p:nvSpPr>
         <p:spPr>
           <a:xfrm>
             <a:off x="874800" y="990360"/>
-            <a:ext cx="3893760" cy="325440"/>
+            <a:ext cx="3893400" cy="325080"/>
           </a:xfrm>
           <a:prstGeom prst="rect">
             <a:avLst/>
@@ -5539,14 +5744,14 @@
       </p:sp>
       <p:sp>
         <p:nvSpPr>
-          <p:cNvPr id="111" name="CustomShape 4"/>
+          <p:cNvPr id="117" name="CustomShape 4"/>
           <p:cNvSpPr/>
           <p:nvPr/>
         </p:nvSpPr>
         <p:spPr>
           <a:xfrm>
             <a:off x="4943520" y="1382400"/>
-            <a:ext cx="3897360" cy="3279960"/>
+            <a:ext cx="3897000" cy="3279600"/>
           </a:xfrm>
           <a:prstGeom prst="rect">
             <a:avLst/>
@@ -5565,14 +5770,14 @@
       </p:sp>
       <p:sp>
         <p:nvSpPr>
-          <p:cNvPr id="112" name="CustomShape 5"/>
+          <p:cNvPr id="118" name="CustomShape 5"/>
           <p:cNvSpPr/>
           <p:nvPr/>
         </p:nvSpPr>
         <p:spPr>
           <a:xfrm>
             <a:off x="4943520" y="990360"/>
-            <a:ext cx="3897360" cy="325440"/>
+            <a:ext cx="3897000" cy="325080"/>
           </a:xfrm>
           <a:prstGeom prst="rect">
             <a:avLst/>
@@ -5591,14 +5796,14 @@
       </p:sp>
       <p:sp>
         <p:nvSpPr>
-          <p:cNvPr id="113" name="CustomShape 6"/>
+          <p:cNvPr id="119" name="CustomShape 6"/>
           <p:cNvSpPr/>
           <p:nvPr/>
         </p:nvSpPr>
         <p:spPr>
           <a:xfrm>
             <a:off x="874800" y="343080"/>
-            <a:ext cx="7962840" cy="582480"/>
+            <a:ext cx="7962480" cy="582120"/>
           </a:xfrm>
           <a:prstGeom prst="rect">
             <a:avLst/>
@@ -5632,7 +5837,7 @@
                 <a:latin typeface="Arial"/>
                 <a:ea typeface="DejaVu Sans"/>
               </a:rPr>
-              <a:t>Rechenbeispiel II</a:t>
+              <a:t>Verlustverteilung</a:t>
             </a:r>
             <a:endParaRPr b="0" lang="de-DE" sz="2800" spc="-1" strike="noStrike">
               <a:latin typeface="Arial"/>
@@ -5642,818 +5847,14 @@
       </p:sp>
       <p:sp>
         <p:nvSpPr>
-          <p:cNvPr id="114" name="CustomShape 7"/>
+          <p:cNvPr id="120" name="CustomShape 7"/>
           <p:cNvSpPr/>
           <p:nvPr/>
         </p:nvSpPr>
         <p:spPr>
           <a:xfrm>
             <a:off x="822960" y="1188720"/>
-            <a:ext cx="7131240" cy="2703600"/>
-          </a:xfrm>
-          <a:prstGeom prst="rect">
-            <a:avLst/>
-          </a:prstGeom>
-          <a:noFill/>
-          <a:ln>
-            <a:noFill/>
-          </a:ln>
-        </p:spPr>
-        <p:style>
-          <a:lnRef idx="0"/>
-          <a:fillRef idx="0"/>
-          <a:effectRef idx="0"/>
-          <a:fontRef idx="minor"/>
-        </p:style>
-        <p:txBody>
-          <a:bodyPr lIns="90000" rIns="90000" tIns="45000" bIns="45000">
-            <a:noAutofit/>
-          </a:bodyPr>
-          <a:p>
-            <a:pPr>
-              <a:lnSpc>
-                <a:spcPct val="100000"/>
-              </a:lnSpc>
-            </a:pPr>
-            <a:r>
-              <a:rPr b="1" lang="de-DE" sz="1800" spc="-1" strike="noStrike">
-                <a:solidFill>
-                  <a:srgbClr val="000000"/>
-                </a:solidFill>
-                <a:latin typeface="Arial"/>
-                <a:ea typeface="DejaVu Sans"/>
-              </a:rPr>
-              <a:t>Verzinsung der Kapitaleinlagen</a:t>
-            </a:r>
-            <a:endParaRPr b="0" lang="de-DE" sz="1800" spc="-1" strike="noStrike">
-              <a:latin typeface="Arial"/>
-            </a:endParaRPr>
-          </a:p>
-          <a:p>
-            <a:pPr>
-              <a:lnSpc>
-                <a:spcPct val="100000"/>
-              </a:lnSpc>
-            </a:pPr>
-            <a:endParaRPr b="0" lang="de-DE" sz="1800" spc="-1" strike="noStrike">
-              <a:latin typeface="Arial"/>
-            </a:endParaRPr>
-          </a:p>
-          <a:p>
-            <a:pPr>
-              <a:lnSpc>
-                <a:spcPct val="100000"/>
-              </a:lnSpc>
-            </a:pPr>
-            <a:r>
-              <a:rPr b="0" lang="de-DE" sz="1800" spc="-1" strike="noStrike">
-                <a:solidFill>
-                  <a:srgbClr val="000000"/>
-                </a:solidFill>
-                <a:latin typeface="Arial"/>
-                <a:ea typeface="DejaVu Sans"/>
-              </a:rPr>
-              <a:t>4 % von 400.000 € = 16.000 €</a:t>
-            </a:r>
-            <a:endParaRPr b="0" lang="de-DE" sz="1800" spc="-1" strike="noStrike">
-              <a:latin typeface="Arial"/>
-            </a:endParaRPr>
-          </a:p>
-          <a:p>
-            <a:pPr>
-              <a:lnSpc>
-                <a:spcPct val="100000"/>
-              </a:lnSpc>
-            </a:pPr>
-            <a:r>
-              <a:rPr b="0" lang="de-DE" sz="1800" spc="-1" strike="noStrike">
-                <a:solidFill>
-                  <a:srgbClr val="000000"/>
-                </a:solidFill>
-                <a:latin typeface="Arial"/>
-                <a:ea typeface="DejaVu Sans"/>
-              </a:rPr>
-              <a:t>4 % von 200.000 € = 8.000 €</a:t>
-            </a:r>
-            <a:endParaRPr b="0" lang="de-DE" sz="1800" spc="-1" strike="noStrike">
-              <a:latin typeface="Arial"/>
-            </a:endParaRPr>
-          </a:p>
-          <a:p>
-            <a:pPr>
-              <a:lnSpc>
-                <a:spcPct val="100000"/>
-              </a:lnSpc>
-            </a:pPr>
-            <a:endParaRPr b="0" lang="de-DE" sz="1800" spc="-1" strike="noStrike">
-              <a:latin typeface="Arial"/>
-            </a:endParaRPr>
-          </a:p>
-          <a:p>
-            <a:pPr>
-              <a:lnSpc>
-                <a:spcPct val="100000"/>
-              </a:lnSpc>
-            </a:pPr>
-            <a:r>
-              <a:rPr b="0" lang="de-DE" sz="1800" spc="-1" strike="noStrike">
-                <a:solidFill>
-                  <a:srgbClr val="000000"/>
-                </a:solidFill>
-                <a:latin typeface="Arial"/>
-                <a:ea typeface="DejaVu Sans"/>
-              </a:rPr>
-              <a:t>--&gt; 200.000 € - 32.000 € - 8.000 € = 160.000 €</a:t>
-            </a:r>
-            <a:endParaRPr b="0" lang="de-DE" sz="1800" spc="-1" strike="noStrike">
-              <a:latin typeface="Arial"/>
-            </a:endParaRPr>
-          </a:p>
-          <a:p>
-            <a:pPr>
-              <a:lnSpc>
-                <a:spcPct val="100000"/>
-              </a:lnSpc>
-            </a:pPr>
-            <a:endParaRPr b="0" lang="de-DE" sz="1800" spc="-1" strike="noStrike">
-              <a:latin typeface="Arial"/>
-            </a:endParaRPr>
-          </a:p>
-          <a:p>
-            <a:pPr>
-              <a:lnSpc>
-                <a:spcPct val="100000"/>
-              </a:lnSpc>
-            </a:pPr>
-            <a:r>
-              <a:rPr b="1" lang="de-DE" sz="1800" spc="-1" strike="noStrike">
-                <a:solidFill>
-                  <a:srgbClr val="000000"/>
-                </a:solidFill>
-                <a:latin typeface="Arial"/>
-                <a:ea typeface="DejaVu Sans"/>
-              </a:rPr>
-              <a:t>Abzug der Gehälter</a:t>
-            </a:r>
-            <a:endParaRPr b="0" lang="de-DE" sz="1800" spc="-1" strike="noStrike">
-              <a:latin typeface="Arial"/>
-            </a:endParaRPr>
-          </a:p>
-          <a:p>
-            <a:pPr>
-              <a:lnSpc>
-                <a:spcPct val="100000"/>
-              </a:lnSpc>
-            </a:pPr>
-            <a:endParaRPr b="0" lang="de-DE" sz="1800" spc="-1" strike="noStrike">
-              <a:latin typeface="Arial"/>
-            </a:endParaRPr>
-          </a:p>
-          <a:p>
-            <a:pPr>
-              <a:lnSpc>
-                <a:spcPct val="100000"/>
-              </a:lnSpc>
-            </a:pPr>
-            <a:r>
-              <a:rPr b="0" lang="de-DE" sz="1800" spc="-1" strike="noStrike">
-                <a:solidFill>
-                  <a:srgbClr val="000000"/>
-                </a:solidFill>
-                <a:latin typeface="Arial"/>
-                <a:ea typeface="DejaVu Sans"/>
-              </a:rPr>
-              <a:t>160.000 € - 100.000 € = 60.000 €</a:t>
-            </a:r>
-            <a:endParaRPr b="0" lang="de-DE" sz="1800" spc="-1" strike="noStrike">
-              <a:latin typeface="Arial"/>
-            </a:endParaRPr>
-          </a:p>
-        </p:txBody>
-      </p:sp>
-    </p:spTree>
-  </p:cSld>
-  <mc:AlternateContent>
-    <mc:Choice Requires="p14">
-      <p:transition p14:dur="10"/>
-    </mc:Choice>
-    <mc:Fallback>
-      <p:transition/>
-    </mc:Fallback>
-  </mc:AlternateContent>
-</p:sld>
-</file>
-
-<file path=ppt/slides/slide7.xml><?xml version="1.0" encoding="utf-8"?>
-<p:sld xmlns:a="http://schemas.openxmlformats.org/drawingml/2006/main" xmlns:p="http://schemas.openxmlformats.org/presentationml/2006/main" xmlns:r="http://schemas.openxmlformats.org/officeDocument/2006/relationships" xmlns:p14="http://schemas.microsoft.com/office/powerpoint/2010/main" xmlns:p15="http://schemas.microsoft.com/office/powerpoint/2012/main" xmlns:mc="http://schemas.openxmlformats.org/markup-compatibility/2006">
-  <p:cSld>
-    <p:spTree>
-      <p:nvGrpSpPr>
-        <p:cNvPr id="1" name=""/>
-        <p:cNvGrpSpPr/>
-        <p:nvPr/>
-      </p:nvGrpSpPr>
-      <p:grpSpPr>
-        <a:xfrm>
-          <a:off x="0" y="0"/>
-          <a:ext cx="0" cy="0"/>
-          <a:chOff x="0" y="0"/>
-          <a:chExt cx="0" cy="0"/>
-        </a:xfrm>
-      </p:grpSpPr>
-      <p:sp>
-        <p:nvSpPr>
-          <p:cNvPr id="115" name="CustomShape 1"/>
-          <p:cNvSpPr/>
-          <p:nvPr/>
-        </p:nvSpPr>
-        <p:spPr>
-          <a:xfrm>
-            <a:off x="874800" y="343080"/>
-            <a:ext cx="7962840" cy="582480"/>
-          </a:xfrm>
-          <a:prstGeom prst="rect">
-            <a:avLst/>
-          </a:prstGeom>
-          <a:noFill/>
-          <a:ln>
-            <a:noFill/>
-          </a:ln>
-        </p:spPr>
-        <p:style>
-          <a:lnRef idx="0"/>
-          <a:fillRef idx="0"/>
-          <a:effectRef idx="0"/>
-          <a:fontRef idx="minor"/>
-        </p:style>
-      </p:sp>
-      <p:sp>
-        <p:nvSpPr>
-          <p:cNvPr id="116" name="CustomShape 2"/>
-          <p:cNvSpPr/>
-          <p:nvPr/>
-        </p:nvSpPr>
-        <p:spPr>
-          <a:xfrm>
-            <a:off x="874800" y="1381680"/>
-            <a:ext cx="3893760" cy="3279960"/>
-          </a:xfrm>
-          <a:prstGeom prst="rect">
-            <a:avLst/>
-          </a:prstGeom>
-          <a:noFill/>
-          <a:ln>
-            <a:noFill/>
-          </a:ln>
-        </p:spPr>
-        <p:style>
-          <a:lnRef idx="0"/>
-          <a:fillRef idx="0"/>
-          <a:effectRef idx="0"/>
-          <a:fontRef idx="minor"/>
-        </p:style>
-      </p:sp>
-      <p:sp>
-        <p:nvSpPr>
-          <p:cNvPr id="117" name="CustomShape 3"/>
-          <p:cNvSpPr/>
-          <p:nvPr/>
-        </p:nvSpPr>
-        <p:spPr>
-          <a:xfrm>
-            <a:off x="874800" y="990360"/>
-            <a:ext cx="3893760" cy="325440"/>
-          </a:xfrm>
-          <a:prstGeom prst="rect">
-            <a:avLst/>
-          </a:prstGeom>
-          <a:noFill/>
-          <a:ln>
-            <a:noFill/>
-          </a:ln>
-        </p:spPr>
-        <p:style>
-          <a:lnRef idx="0"/>
-          <a:fillRef idx="0"/>
-          <a:effectRef idx="0"/>
-          <a:fontRef idx="minor"/>
-        </p:style>
-      </p:sp>
-      <p:sp>
-        <p:nvSpPr>
-          <p:cNvPr id="118" name="CustomShape 4"/>
-          <p:cNvSpPr/>
-          <p:nvPr/>
-        </p:nvSpPr>
-        <p:spPr>
-          <a:xfrm>
-            <a:off x="4943520" y="1382400"/>
-            <a:ext cx="3897360" cy="3279960"/>
-          </a:xfrm>
-          <a:prstGeom prst="rect">
-            <a:avLst/>
-          </a:prstGeom>
-          <a:noFill/>
-          <a:ln>
-            <a:noFill/>
-          </a:ln>
-        </p:spPr>
-        <p:style>
-          <a:lnRef idx="0"/>
-          <a:fillRef idx="0"/>
-          <a:effectRef idx="0"/>
-          <a:fontRef idx="minor"/>
-        </p:style>
-      </p:sp>
-      <p:sp>
-        <p:nvSpPr>
-          <p:cNvPr id="119" name="CustomShape 5"/>
-          <p:cNvSpPr/>
-          <p:nvPr/>
-        </p:nvSpPr>
-        <p:spPr>
-          <a:xfrm>
-            <a:off x="4943520" y="990360"/>
-            <a:ext cx="3897360" cy="325440"/>
-          </a:xfrm>
-          <a:prstGeom prst="rect">
-            <a:avLst/>
-          </a:prstGeom>
-          <a:noFill/>
-          <a:ln>
-            <a:noFill/>
-          </a:ln>
-        </p:spPr>
-        <p:style>
-          <a:lnRef idx="0"/>
-          <a:fillRef idx="0"/>
-          <a:effectRef idx="0"/>
-          <a:fontRef idx="minor"/>
-        </p:style>
-      </p:sp>
-      <p:sp>
-        <p:nvSpPr>
-          <p:cNvPr id="120" name="CustomShape 6"/>
-          <p:cNvSpPr/>
-          <p:nvPr/>
-        </p:nvSpPr>
-        <p:spPr>
-          <a:xfrm>
-            <a:off x="874800" y="343080"/>
-            <a:ext cx="7962840" cy="582480"/>
-          </a:xfrm>
-          <a:prstGeom prst="rect">
-            <a:avLst/>
-          </a:prstGeom>
-          <a:noFill/>
-          <a:ln>
-            <a:noFill/>
-          </a:ln>
-        </p:spPr>
-        <p:style>
-          <a:lnRef idx="0"/>
-          <a:fillRef idx="0"/>
-          <a:effectRef idx="0"/>
-          <a:fontRef idx="minor"/>
-        </p:style>
-        <p:txBody>
-          <a:bodyPr lIns="90000" rIns="90000" tIns="45000" bIns="45000" anchor="ctr">
-            <a:noAutofit/>
-          </a:bodyPr>
-          <a:p>
-            <a:pPr>
-              <a:lnSpc>
-                <a:spcPts val="2520"/>
-              </a:lnSpc>
-            </a:pPr>
-            <a:r>
-              <a:rPr b="1" lang="de-DE" sz="2800" spc="-1" strike="noStrike">
-                <a:solidFill>
-                  <a:srgbClr val="003259"/>
-                </a:solidFill>
-                <a:latin typeface="Arial"/>
-                <a:ea typeface="DejaVu Sans"/>
-              </a:rPr>
-              <a:t>Rechenbeispiel III</a:t>
-            </a:r>
-            <a:endParaRPr b="0" lang="de-DE" sz="2800" spc="-1" strike="noStrike">
-              <a:latin typeface="Arial"/>
-            </a:endParaRPr>
-          </a:p>
-        </p:txBody>
-      </p:sp>
-      <p:sp>
-        <p:nvSpPr>
-          <p:cNvPr id="121" name="CustomShape 7"/>
-          <p:cNvSpPr/>
-          <p:nvPr/>
-        </p:nvSpPr>
-        <p:spPr>
-          <a:xfrm>
-            <a:off x="822960" y="1188720"/>
-            <a:ext cx="7131240" cy="2648880"/>
-          </a:xfrm>
-          <a:prstGeom prst="rect">
-            <a:avLst/>
-          </a:prstGeom>
-          <a:noFill/>
-          <a:ln>
-            <a:noFill/>
-          </a:ln>
-        </p:spPr>
-        <p:style>
-          <a:lnRef idx="0"/>
-          <a:fillRef idx="0"/>
-          <a:effectRef idx="0"/>
-          <a:fontRef idx="minor"/>
-        </p:style>
-        <p:txBody>
-          <a:bodyPr lIns="90000" rIns="90000" tIns="45000" bIns="45000">
-            <a:noAutofit/>
-          </a:bodyPr>
-          <a:p>
-            <a:pPr>
-              <a:lnSpc>
-                <a:spcPct val="100000"/>
-              </a:lnSpc>
-            </a:pPr>
-            <a:r>
-              <a:rPr b="1" lang="de-DE" sz="1800" spc="-1" strike="noStrike">
-                <a:solidFill>
-                  <a:srgbClr val="000000"/>
-                </a:solidFill>
-                <a:latin typeface="Arial"/>
-                <a:ea typeface="DejaVu Sans"/>
-              </a:rPr>
-              <a:t>Verteilung anhand der Kapitaleinlagen</a:t>
-            </a:r>
-            <a:endParaRPr b="0" lang="de-DE" sz="1800" spc="-1" strike="noStrike">
-              <a:latin typeface="Arial"/>
-            </a:endParaRPr>
-          </a:p>
-          <a:p>
-            <a:pPr>
-              <a:lnSpc>
-                <a:spcPct val="100000"/>
-              </a:lnSpc>
-            </a:pPr>
-            <a:endParaRPr b="0" lang="de-DE" sz="1800" spc="-1" strike="noStrike">
-              <a:latin typeface="Arial"/>
-            </a:endParaRPr>
-          </a:p>
-          <a:p>
-            <a:pPr>
-              <a:lnSpc>
-                <a:spcPct val="100000"/>
-              </a:lnSpc>
-            </a:pPr>
-            <a:r>
-              <a:rPr b="0" lang="de-DE" sz="1800" spc="-1" strike="noStrike">
-                <a:solidFill>
-                  <a:srgbClr val="000000"/>
-                </a:solidFill>
-                <a:latin typeface="Arial"/>
-                <a:ea typeface="DejaVu Sans"/>
-              </a:rPr>
-              <a:t>60.000 € * 0,4 = 24.000 €</a:t>
-            </a:r>
-            <a:endParaRPr b="0" lang="de-DE" sz="1800" spc="-1" strike="noStrike">
-              <a:latin typeface="Arial"/>
-            </a:endParaRPr>
-          </a:p>
-          <a:p>
-            <a:pPr>
-              <a:lnSpc>
-                <a:spcPct val="100000"/>
-              </a:lnSpc>
-            </a:pPr>
-            <a:r>
-              <a:rPr b="0" lang="de-DE" sz="1800" spc="-1" strike="noStrike">
-                <a:solidFill>
-                  <a:srgbClr val="000000"/>
-                </a:solidFill>
-                <a:latin typeface="Arial"/>
-                <a:ea typeface="DejaVu Sans"/>
-              </a:rPr>
-              <a:t>60.000 € * 0,2 = 12.000 €</a:t>
-            </a:r>
-            <a:endParaRPr b="0" lang="de-DE" sz="1800" spc="-1" strike="noStrike">
-              <a:latin typeface="Arial"/>
-            </a:endParaRPr>
-          </a:p>
-          <a:p>
-            <a:pPr>
-              <a:lnSpc>
-                <a:spcPct val="100000"/>
-              </a:lnSpc>
-            </a:pPr>
-            <a:endParaRPr b="0" lang="de-DE" sz="1800" spc="-1" strike="noStrike">
-              <a:latin typeface="Arial"/>
-            </a:endParaRPr>
-          </a:p>
-          <a:p>
-            <a:pPr>
-              <a:lnSpc>
-                <a:spcPct val="100000"/>
-              </a:lnSpc>
-            </a:pPr>
-            <a:endParaRPr b="0" lang="de-DE" sz="1800" spc="-1" strike="noStrike">
-              <a:latin typeface="Arial"/>
-            </a:endParaRPr>
-          </a:p>
-          <a:p>
-            <a:pPr>
-              <a:lnSpc>
-                <a:spcPct val="100000"/>
-              </a:lnSpc>
-            </a:pPr>
-            <a:r>
-              <a:rPr b="1" lang="de-DE" sz="1800" spc="-1" strike="noStrike">
-                <a:solidFill>
-                  <a:srgbClr val="000000"/>
-                </a:solidFill>
-                <a:latin typeface="Arial"/>
-                <a:ea typeface="DejaVu Sans"/>
-              </a:rPr>
-              <a:t>Persönlicher Gesamtgewinn</a:t>
-            </a:r>
-            <a:endParaRPr b="0" lang="de-DE" sz="1800" spc="-1" strike="noStrike">
-              <a:latin typeface="Arial"/>
-            </a:endParaRPr>
-          </a:p>
-          <a:p>
-            <a:pPr>
-              <a:lnSpc>
-                <a:spcPct val="100000"/>
-              </a:lnSpc>
-            </a:pPr>
-            <a:endParaRPr b="0" lang="de-DE" sz="1800" spc="-1" strike="noStrike">
-              <a:latin typeface="Arial"/>
-            </a:endParaRPr>
-          </a:p>
-          <a:p>
-            <a:pPr>
-              <a:lnSpc>
-                <a:spcPct val="100000"/>
-              </a:lnSpc>
-            </a:pPr>
-            <a:r>
-              <a:rPr b="0" lang="de-DE" sz="1800" spc="-1" strike="noStrike">
-                <a:solidFill>
-                  <a:srgbClr val="000000"/>
-                </a:solidFill>
-                <a:latin typeface="Arial"/>
-                <a:ea typeface="DejaVu Sans"/>
-              </a:rPr>
-              <a:t>16.000 € + 50.000 € + 24.000 € = 90.000 €</a:t>
-            </a:r>
-            <a:endParaRPr b="0" lang="de-DE" sz="1800" spc="-1" strike="noStrike">
-              <a:latin typeface="Arial"/>
-            </a:endParaRPr>
-          </a:p>
-          <a:p>
-            <a:pPr>
-              <a:lnSpc>
-                <a:spcPct val="100000"/>
-              </a:lnSpc>
-            </a:pPr>
-            <a:r>
-              <a:rPr b="0" lang="de-DE" sz="1800" spc="-1" strike="noStrike">
-                <a:solidFill>
-                  <a:srgbClr val="000000"/>
-                </a:solidFill>
-                <a:latin typeface="Arial"/>
-                <a:ea typeface="DejaVu Sans"/>
-              </a:rPr>
-              <a:t>8.000 € + 12.000 € = 20.000 €</a:t>
-            </a:r>
-            <a:endParaRPr b="0" lang="de-DE" sz="1800" spc="-1" strike="noStrike">
-              <a:latin typeface="Arial"/>
-            </a:endParaRPr>
-          </a:p>
-        </p:txBody>
-      </p:sp>
-    </p:spTree>
-  </p:cSld>
-  <mc:AlternateContent>
-    <mc:Choice Requires="p14">
-      <p:transition p14:dur="10"/>
-    </mc:Choice>
-    <mc:Fallback>
-      <p:transition/>
-    </mc:Fallback>
-  </mc:AlternateContent>
-</p:sld>
-</file>
-
-<file path=ppt/slides/slide8.xml><?xml version="1.0" encoding="utf-8"?>
-<p:sld xmlns:a="http://schemas.openxmlformats.org/drawingml/2006/main" xmlns:p="http://schemas.openxmlformats.org/presentationml/2006/main" xmlns:r="http://schemas.openxmlformats.org/officeDocument/2006/relationships" xmlns:p14="http://schemas.microsoft.com/office/powerpoint/2010/main" xmlns:p15="http://schemas.microsoft.com/office/powerpoint/2012/main" xmlns:mc="http://schemas.openxmlformats.org/markup-compatibility/2006">
-  <p:cSld>
-    <p:spTree>
-      <p:nvGrpSpPr>
-        <p:cNvPr id="1" name=""/>
-        <p:cNvGrpSpPr/>
-        <p:nvPr/>
-      </p:nvGrpSpPr>
-      <p:grpSpPr>
-        <a:xfrm>
-          <a:off x="0" y="0"/>
-          <a:ext cx="0" cy="0"/>
-          <a:chOff x="0" y="0"/>
-          <a:chExt cx="0" cy="0"/>
-        </a:xfrm>
-      </p:grpSpPr>
-      <p:sp>
-        <p:nvSpPr>
-          <p:cNvPr id="122" name="CustomShape 1"/>
-          <p:cNvSpPr/>
-          <p:nvPr/>
-        </p:nvSpPr>
-        <p:spPr>
-          <a:xfrm>
-            <a:off x="874800" y="343080"/>
-            <a:ext cx="7962840" cy="582480"/>
-          </a:xfrm>
-          <a:prstGeom prst="rect">
-            <a:avLst/>
-          </a:prstGeom>
-          <a:noFill/>
-          <a:ln>
-            <a:noFill/>
-          </a:ln>
-        </p:spPr>
-        <p:style>
-          <a:lnRef idx="0"/>
-          <a:fillRef idx="0"/>
-          <a:effectRef idx="0"/>
-          <a:fontRef idx="minor"/>
-        </p:style>
-      </p:sp>
-      <p:sp>
-        <p:nvSpPr>
-          <p:cNvPr id="123" name="CustomShape 2"/>
-          <p:cNvSpPr/>
-          <p:nvPr/>
-        </p:nvSpPr>
-        <p:spPr>
-          <a:xfrm>
-            <a:off x="874800" y="1381680"/>
-            <a:ext cx="3893760" cy="3279960"/>
-          </a:xfrm>
-          <a:prstGeom prst="rect">
-            <a:avLst/>
-          </a:prstGeom>
-          <a:noFill/>
-          <a:ln>
-            <a:noFill/>
-          </a:ln>
-        </p:spPr>
-        <p:style>
-          <a:lnRef idx="0"/>
-          <a:fillRef idx="0"/>
-          <a:effectRef idx="0"/>
-          <a:fontRef idx="minor"/>
-        </p:style>
-      </p:sp>
-      <p:sp>
-        <p:nvSpPr>
-          <p:cNvPr id="124" name="CustomShape 3"/>
-          <p:cNvSpPr/>
-          <p:nvPr/>
-        </p:nvSpPr>
-        <p:spPr>
-          <a:xfrm>
-            <a:off x="874800" y="990360"/>
-            <a:ext cx="3893760" cy="325440"/>
-          </a:xfrm>
-          <a:prstGeom prst="rect">
-            <a:avLst/>
-          </a:prstGeom>
-          <a:noFill/>
-          <a:ln>
-            <a:noFill/>
-          </a:ln>
-        </p:spPr>
-        <p:style>
-          <a:lnRef idx="0"/>
-          <a:fillRef idx="0"/>
-          <a:effectRef idx="0"/>
-          <a:fontRef idx="minor"/>
-        </p:style>
-      </p:sp>
-      <p:sp>
-        <p:nvSpPr>
-          <p:cNvPr id="125" name="CustomShape 4"/>
-          <p:cNvSpPr/>
-          <p:nvPr/>
-        </p:nvSpPr>
-        <p:spPr>
-          <a:xfrm>
-            <a:off x="4943520" y="1382400"/>
-            <a:ext cx="3897360" cy="3279960"/>
-          </a:xfrm>
-          <a:prstGeom prst="rect">
-            <a:avLst/>
-          </a:prstGeom>
-          <a:noFill/>
-          <a:ln>
-            <a:noFill/>
-          </a:ln>
-        </p:spPr>
-        <p:style>
-          <a:lnRef idx="0"/>
-          <a:fillRef idx="0"/>
-          <a:effectRef idx="0"/>
-          <a:fontRef idx="minor"/>
-        </p:style>
-      </p:sp>
-      <p:sp>
-        <p:nvSpPr>
-          <p:cNvPr id="126" name="CustomShape 5"/>
-          <p:cNvSpPr/>
-          <p:nvPr/>
-        </p:nvSpPr>
-        <p:spPr>
-          <a:xfrm>
-            <a:off x="4943520" y="990360"/>
-            <a:ext cx="3897360" cy="325440"/>
-          </a:xfrm>
-          <a:prstGeom prst="rect">
-            <a:avLst/>
-          </a:prstGeom>
-          <a:noFill/>
-          <a:ln>
-            <a:noFill/>
-          </a:ln>
-        </p:spPr>
-        <p:style>
-          <a:lnRef idx="0"/>
-          <a:fillRef idx="0"/>
-          <a:effectRef idx="0"/>
-          <a:fontRef idx="minor"/>
-        </p:style>
-      </p:sp>
-      <p:sp>
-        <p:nvSpPr>
-          <p:cNvPr id="127" name="CustomShape 6"/>
-          <p:cNvSpPr/>
-          <p:nvPr/>
-        </p:nvSpPr>
-        <p:spPr>
-          <a:xfrm>
-            <a:off x="874800" y="343080"/>
-            <a:ext cx="7962840" cy="582480"/>
-          </a:xfrm>
-          <a:prstGeom prst="rect">
-            <a:avLst/>
-          </a:prstGeom>
-          <a:noFill/>
-          <a:ln>
-            <a:noFill/>
-          </a:ln>
-        </p:spPr>
-        <p:style>
-          <a:lnRef idx="0"/>
-          <a:fillRef idx="0"/>
-          <a:effectRef idx="0"/>
-          <a:fontRef idx="minor"/>
-        </p:style>
-        <p:txBody>
-          <a:bodyPr lIns="90000" rIns="90000" tIns="45000" bIns="45000" anchor="ctr">
-            <a:noAutofit/>
-          </a:bodyPr>
-          <a:p>
-            <a:pPr>
-              <a:lnSpc>
-                <a:spcPts val="2520"/>
-              </a:lnSpc>
-            </a:pPr>
-            <a:r>
-              <a:rPr b="1" lang="de-DE" sz="2800" spc="-1" strike="noStrike">
-                <a:solidFill>
-                  <a:srgbClr val="003259"/>
-                </a:solidFill>
-                <a:latin typeface="Arial"/>
-                <a:ea typeface="DejaVu Sans"/>
-              </a:rPr>
-              <a:t>Verlustverteilung</a:t>
-            </a:r>
-            <a:endParaRPr b="0" lang="de-DE" sz="2800" spc="-1" strike="noStrike">
-              <a:latin typeface="Arial"/>
-            </a:endParaRPr>
-          </a:p>
-        </p:txBody>
-      </p:sp>
-      <p:sp>
-        <p:nvSpPr>
-          <p:cNvPr id="128" name="CustomShape 7"/>
-          <p:cNvSpPr/>
-          <p:nvPr/>
-        </p:nvSpPr>
-        <p:spPr>
-          <a:xfrm>
-            <a:off x="822960" y="1188720"/>
-            <a:ext cx="7131240" cy="1881000"/>
+            <a:ext cx="7130880" cy="1880640"/>
           </a:xfrm>
           <a:prstGeom prst="rect">
             <a:avLst/>

</xml_diff>

<commit_message>
Minor changes due to Michael's push/revert
</commit_message>
<xml_diff>
--- a/Referat_BWP_KG_dom.pptx
+++ b/Referat_BWP_KG_dom.pptx
@@ -2763,7 +2763,7 @@
         <p:spPr>
           <a:xfrm>
             <a:off x="0" y="4824360"/>
-            <a:ext cx="9140400" cy="315360"/>
+            <a:ext cx="9140040" cy="315000"/>
           </a:xfrm>
           <a:prstGeom prst="rect">
             <a:avLst/>
@@ -2799,7 +2799,7 @@
         <p:spPr>
           <a:xfrm>
             <a:off x="8714160" y="4897080"/>
-            <a:ext cx="188280" cy="188280"/>
+            <a:ext cx="187920" cy="187920"/>
           </a:xfrm>
           <a:prstGeom prst="ellipse">
             <a:avLst/>
@@ -2835,7 +2835,7 @@
                 <a:spcPct val="100000"/>
               </a:lnSpc>
             </a:pPr>
-            <a:fld id="{24F1BFA3-B4CD-41C9-B282-1FBF9FAD6419}" type="slidenum">
+            <a:fld id="{72154FD1-EAE8-400C-8CAF-8427451968D6}" type="slidenum">
               <a:rPr b="0" lang="de-DE" sz="680" spc="-1" strike="noStrike">
                 <a:solidFill>
                   <a:srgbClr val="02d35f"/>
@@ -2843,7 +2843,7 @@
                 <a:latin typeface="Arial"/>
                 <a:ea typeface="DejaVu Sans"/>
               </a:rPr>
-              <a:t>&lt;number&gt;</a:t>
+              <a:t>1</a:t>
             </a:fld>
             <a:endParaRPr b="0" lang="de-DE" sz="680" spc="-1" strike="noStrike">
               <a:latin typeface="Arial"/>
@@ -2864,7 +2864,7 @@
         <p:spPr>
           <a:xfrm>
             <a:off x="0" y="0"/>
-            <a:ext cx="9140400" cy="5139720"/>
+            <a:ext cx="9140040" cy="5139360"/>
           </a:xfrm>
           <a:prstGeom prst="rect">
             <a:avLst/>
@@ -2887,7 +2887,7 @@
         <p:spPr>
           <a:xfrm>
             <a:off x="7395120" y="486360"/>
-            <a:ext cx="873720" cy="529560"/>
+            <a:ext cx="873360" cy="529200"/>
           </a:xfrm>
           <a:prstGeom prst="rect">
             <a:avLst/>
@@ -3166,7 +3166,7 @@
         <p:spPr>
           <a:xfrm>
             <a:off x="0" y="4824360"/>
-            <a:ext cx="9140400" cy="315360"/>
+            <a:ext cx="9140040" cy="315000"/>
           </a:xfrm>
           <a:prstGeom prst="rect">
             <a:avLst/>
@@ -3227,7 +3227,7 @@
         <p:spPr>
           <a:xfrm>
             <a:off x="8714160" y="4897080"/>
-            <a:ext cx="188280" cy="188280"/>
+            <a:ext cx="187920" cy="187920"/>
           </a:xfrm>
           <a:prstGeom prst="ellipse">
             <a:avLst/>
@@ -3263,7 +3263,7 @@
                 <a:spcPct val="100000"/>
               </a:lnSpc>
             </a:pPr>
-            <a:fld id="{5B045F53-C8C9-4FD5-BC91-DE033E7D9733}" type="slidenum">
+            <a:fld id="{D967AFCC-5D65-4600-B45B-DC5B42DB911C}" type="slidenum">
               <a:rPr b="0" lang="de-DE" sz="680" spc="-1" strike="noStrike">
                 <a:solidFill>
                   <a:srgbClr val="02d35f"/>
@@ -3271,7 +3271,7 @@
                 <a:latin typeface="Arial"/>
                 <a:ea typeface="DejaVu Sans"/>
               </a:rPr>
-              <a:t>&lt;number&gt;</a:t>
+              <a:t>1</a:t>
             </a:fld>
             <a:endParaRPr b="0" lang="de-DE" sz="680" spc="-1" strike="noStrike">
               <a:latin typeface="Arial"/>
@@ -3541,7 +3541,7 @@
         <p:spPr>
           <a:xfrm>
             <a:off x="874800" y="343080"/>
-            <a:ext cx="7962480" cy="582120"/>
+            <a:ext cx="7962120" cy="581760"/>
           </a:xfrm>
           <a:prstGeom prst="rect">
             <a:avLst/>
@@ -3567,7 +3567,7 @@
         <p:spPr>
           <a:xfrm>
             <a:off x="874800" y="1428480"/>
-            <a:ext cx="7962480" cy="3180960"/>
+            <a:ext cx="7962120" cy="3180600"/>
           </a:xfrm>
           <a:prstGeom prst="rect">
             <a:avLst/>
@@ -3593,7 +3593,7 @@
         <p:spPr>
           <a:xfrm>
             <a:off x="874800" y="343080"/>
-            <a:ext cx="7962480" cy="582120"/>
+            <a:ext cx="7962120" cy="581760"/>
           </a:xfrm>
           <a:prstGeom prst="rect">
             <a:avLst/>
@@ -3644,7 +3644,7 @@
         <p:spPr>
           <a:xfrm>
             <a:off x="822960" y="1188720"/>
-            <a:ext cx="7130880" cy="3580920"/>
+            <a:ext cx="7130520" cy="3580560"/>
           </a:xfrm>
           <a:prstGeom prst="rect">
             <a:avLst/>
@@ -3671,7 +3671,7 @@
               </a:lnSpc>
             </a:pPr>
             <a:r>
-              <a:rPr b="0" lang="de-DE" sz="1800" spc="-1" strike="noStrike">
+              <a:rPr b="1" lang="de-DE" sz="1800" spc="-1" strike="noStrike">
                 <a:solidFill>
                   <a:srgbClr val="000000"/>
                 </a:solidFill>
@@ -3689,16 +3689,9 @@
               <a:lnSpc>
                 <a:spcPct val="100000"/>
               </a:lnSpc>
-            </a:pPr>
-            <a:endParaRPr b="0" lang="de-DE" sz="1800" spc="-1" strike="noStrike">
-              <a:latin typeface="Arial"/>
-            </a:endParaRPr>
-          </a:p>
-          <a:p>
-            <a:pPr>
-              <a:lnSpc>
-                <a:spcPct val="100000"/>
-              </a:lnSpc>
+              <a:spcBef>
+                <a:spcPts val="1134"/>
+              </a:spcBef>
             </a:pPr>
             <a:r>
               <a:rPr b="0" lang="de-DE" sz="1800" spc="-1" strike="noStrike">
@@ -3729,6 +3722,9 @@
               <a:lnSpc>
                 <a:spcPct val="100000"/>
               </a:lnSpc>
+              <a:spcBef>
+                <a:spcPts val="1134"/>
+              </a:spcBef>
             </a:pPr>
             <a:r>
               <a:rPr b="0" lang="de-DE" sz="1800" spc="-1" strike="noStrike">
@@ -3769,6 +3765,9 @@
               <a:lnSpc>
                 <a:spcPct val="100000"/>
               </a:lnSpc>
+              <a:spcBef>
+                <a:spcPts val="1134"/>
+              </a:spcBef>
             </a:pPr>
             <a:r>
               <a:rPr b="0" lang="de-DE" sz="1800" spc="-1" strike="noStrike">
@@ -3811,7 +3810,7 @@
               </a:lnSpc>
             </a:pPr>
             <a:r>
-              <a:rPr b="0" lang="de-DE" sz="1800" spc="-1" strike="noStrike">
+              <a:rPr b="1" lang="de-DE" sz="1800" spc="-1" strike="noStrike">
                 <a:solidFill>
                   <a:srgbClr val="000000"/>
                 </a:solidFill>
@@ -3829,16 +3828,9 @@
               <a:lnSpc>
                 <a:spcPct val="100000"/>
               </a:lnSpc>
-            </a:pPr>
-            <a:endParaRPr b="0" lang="de-DE" sz="1800" spc="-1" strike="noStrike">
-              <a:latin typeface="Arial"/>
-            </a:endParaRPr>
-          </a:p>
-          <a:p>
-            <a:pPr>
-              <a:lnSpc>
-                <a:spcPct val="100000"/>
-              </a:lnSpc>
+              <a:spcBef>
+                <a:spcPts val="1134"/>
+              </a:spcBef>
             </a:pPr>
             <a:r>
               <a:rPr b="0" lang="de-DE" sz="1800" spc="-1" strike="noStrike">
@@ -3869,6 +3861,9 @@
               <a:lnSpc>
                 <a:spcPct val="100000"/>
               </a:lnSpc>
+              <a:spcBef>
+                <a:spcPts val="1134"/>
+              </a:spcBef>
             </a:pPr>
             <a:r>
               <a:rPr b="0" lang="de-DE" sz="1800" spc="-1" strike="noStrike">
@@ -3899,6 +3894,9 @@
               <a:lnSpc>
                 <a:spcPct val="100000"/>
               </a:lnSpc>
+              <a:spcBef>
+                <a:spcPts val="1134"/>
+              </a:spcBef>
             </a:pPr>
             <a:r>
               <a:rPr b="0" lang="de-DE" sz="1800" spc="-1" strike="noStrike">
@@ -3929,6 +3927,9 @@
               <a:lnSpc>
                 <a:spcPct val="100000"/>
               </a:lnSpc>
+              <a:spcBef>
+                <a:spcPts val="567"/>
+              </a:spcBef>
             </a:pPr>
             <a:endParaRPr b="0" lang="de-DE" sz="1800" spc="-1" strike="noStrike">
               <a:latin typeface="Arial"/>
@@ -3946,6 +3947,320 @@
       <p:transition/>
     </mc:Fallback>
   </mc:AlternateContent>
+  <p:timing>
+    <p:tnLst>
+      <p:par>
+        <p:cTn id="1" dur="indefinite" restart="never" nodeType="tmRoot">
+          <p:childTnLst>
+            <p:seq>
+              <p:cTn id="2" dur="indefinite" nodeType="mainSeq">
+                <p:childTnLst>
+                  <p:par>
+                    <p:cTn id="3" fill="hold">
+                      <p:stCondLst>
+                        <p:cond delay="indefinite"/>
+                      </p:stCondLst>
+                      <p:childTnLst>
+                        <p:par>
+                          <p:cTn id="4" fill="hold">
+                            <p:stCondLst>
+                              <p:cond delay="0"/>
+                            </p:stCondLst>
+                            <p:childTnLst>
+                              <p:par>
+                                <p:cTn id="5" nodeType="clickEffect" fill="hold" presetClass="entr" presetID="1">
+                                  <p:stCondLst>
+                                    <p:cond delay="0"/>
+                                  </p:stCondLst>
+                                  <p:childTnLst>
+                                    <p:set>
+                                      <p:cBhvr>
+                                        <p:cTn id="6" dur="1" fill="hold">
+                                          <p:stCondLst>
+                                            <p:cond delay="0"/>
+                                          </p:stCondLst>
+                                        </p:cTn>
+                                        <p:tgtEl>
+                                          <p:spTgt spid="85">
+                                            <p:txEl>
+                                              <p:pRg st="0" end="0"/>
+                                            </p:txEl>
+                                          </p:spTgt>
+                                        </p:tgtEl>
+                                        <p:attrNameLst>
+                                          <p:attrName>style.visibility</p:attrName>
+                                        </p:attrNameLst>
+                                      </p:cBhvr>
+                                      <p:to>
+                                        <p:strVal val="visible"/>
+                                      </p:to>
+                                    </p:set>
+                                  </p:childTnLst>
+                                </p:cTn>
+                              </p:par>
+                              <p:par>
+                                <p:cTn id="7" nodeType="withEffect" fill="hold" presetClass="entr" presetID="1">
+                                  <p:stCondLst>
+                                    <p:cond delay="0"/>
+                                  </p:stCondLst>
+                                  <p:childTnLst>
+                                    <p:set>
+                                      <p:cBhvr>
+                                        <p:cTn id="8" dur="1" fill="hold">
+                                          <p:stCondLst>
+                                            <p:cond delay="0"/>
+                                          </p:stCondLst>
+                                        </p:cTn>
+                                        <p:tgtEl>
+                                          <p:spTgt spid="85">
+                                            <p:txEl>
+                                              <p:pRg st="1" end="1"/>
+                                            </p:txEl>
+                                          </p:spTgt>
+                                        </p:tgtEl>
+                                        <p:attrNameLst>
+                                          <p:attrName>style.visibility</p:attrName>
+                                        </p:attrNameLst>
+                                      </p:cBhvr>
+                                      <p:to>
+                                        <p:strVal val="visible"/>
+                                      </p:to>
+                                    </p:set>
+                                  </p:childTnLst>
+                                </p:cTn>
+                              </p:par>
+                              <p:par>
+                                <p:cTn id="9" nodeType="withEffect" fill="hold" presetClass="entr" presetID="1">
+                                  <p:stCondLst>
+                                    <p:cond delay="0"/>
+                                  </p:stCondLst>
+                                  <p:childTnLst>
+                                    <p:set>
+                                      <p:cBhvr>
+                                        <p:cTn id="10" dur="1" fill="hold">
+                                          <p:stCondLst>
+                                            <p:cond delay="0"/>
+                                          </p:stCondLst>
+                                        </p:cTn>
+                                        <p:tgtEl>
+                                          <p:spTgt spid="85">
+                                            <p:txEl>
+                                              <p:pRg st="2" end="2"/>
+                                            </p:txEl>
+                                          </p:spTgt>
+                                        </p:tgtEl>
+                                        <p:attrNameLst>
+                                          <p:attrName>style.visibility</p:attrName>
+                                        </p:attrNameLst>
+                                      </p:cBhvr>
+                                      <p:to>
+                                        <p:strVal val="visible"/>
+                                      </p:to>
+                                    </p:set>
+                                  </p:childTnLst>
+                                </p:cTn>
+                              </p:par>
+                              <p:par>
+                                <p:cTn id="11" nodeType="withEffect" fill="hold" presetClass="entr" presetID="1">
+                                  <p:stCondLst>
+                                    <p:cond delay="0"/>
+                                  </p:stCondLst>
+                                  <p:childTnLst>
+                                    <p:set>
+                                      <p:cBhvr>
+                                        <p:cTn id="12" dur="1" fill="hold">
+                                          <p:stCondLst>
+                                            <p:cond delay="0"/>
+                                          </p:stCondLst>
+                                        </p:cTn>
+                                        <p:tgtEl>
+                                          <p:spTgt spid="85">
+                                            <p:txEl>
+                                              <p:pRg st="3" end="3"/>
+                                            </p:txEl>
+                                          </p:spTgt>
+                                        </p:tgtEl>
+                                        <p:attrNameLst>
+                                          <p:attrName>style.visibility</p:attrName>
+                                        </p:attrNameLst>
+                                      </p:cBhvr>
+                                      <p:to>
+                                        <p:strVal val="visible"/>
+                                      </p:to>
+                                    </p:set>
+                                  </p:childTnLst>
+                                </p:cTn>
+                              </p:par>
+                            </p:childTnLst>
+                          </p:cTn>
+                        </p:par>
+                      </p:childTnLst>
+                    </p:cTn>
+                  </p:par>
+                  <p:par>
+                    <p:cTn id="13" fill="hold">
+                      <p:stCondLst>
+                        <p:cond delay="indefinite"/>
+                      </p:stCondLst>
+                      <p:childTnLst>
+                        <p:par>
+                          <p:cTn id="14" fill="hold">
+                            <p:stCondLst>
+                              <p:cond delay="0"/>
+                            </p:stCondLst>
+                            <p:childTnLst>
+                              <p:par>
+                                <p:cTn id="15" nodeType="clickEffect" fill="hold" presetClass="entr" presetID="1">
+                                  <p:stCondLst>
+                                    <p:cond delay="0"/>
+                                  </p:stCondLst>
+                                  <p:childTnLst>
+                                    <p:set>
+                                      <p:cBhvr>
+                                        <p:cTn id="16" dur="1" fill="hold">
+                                          <p:stCondLst>
+                                            <p:cond delay="0"/>
+                                          </p:stCondLst>
+                                        </p:cTn>
+                                        <p:tgtEl>
+                                          <p:spTgt spid="85">
+                                            <p:txEl>
+                                              <p:pRg st="5" end="5"/>
+                                            </p:txEl>
+                                          </p:spTgt>
+                                        </p:tgtEl>
+                                        <p:attrNameLst>
+                                          <p:attrName>style.visibility</p:attrName>
+                                        </p:attrNameLst>
+                                      </p:cBhvr>
+                                      <p:to>
+                                        <p:strVal val="visible"/>
+                                      </p:to>
+                                    </p:set>
+                                  </p:childTnLst>
+                                </p:cTn>
+                              </p:par>
+                              <p:par>
+                                <p:cTn id="17" nodeType="withEffect" fill="hold" presetClass="entr" presetID="1">
+                                  <p:stCondLst>
+                                    <p:cond delay="0"/>
+                                  </p:stCondLst>
+                                  <p:childTnLst>
+                                    <p:set>
+                                      <p:cBhvr>
+                                        <p:cTn id="18" dur="1" fill="hold">
+                                          <p:stCondLst>
+                                            <p:cond delay="0"/>
+                                          </p:stCondLst>
+                                        </p:cTn>
+                                        <p:tgtEl>
+                                          <p:spTgt spid="85">
+                                            <p:txEl>
+                                              <p:pRg st="6" end="6"/>
+                                            </p:txEl>
+                                          </p:spTgt>
+                                        </p:tgtEl>
+                                        <p:attrNameLst>
+                                          <p:attrName>style.visibility</p:attrName>
+                                        </p:attrNameLst>
+                                      </p:cBhvr>
+                                      <p:to>
+                                        <p:strVal val="visible"/>
+                                      </p:to>
+                                    </p:set>
+                                  </p:childTnLst>
+                                </p:cTn>
+                              </p:par>
+                              <p:par>
+                                <p:cTn id="19" nodeType="withEffect" fill="hold" presetClass="entr" presetID="1">
+                                  <p:stCondLst>
+                                    <p:cond delay="0"/>
+                                  </p:stCondLst>
+                                  <p:childTnLst>
+                                    <p:set>
+                                      <p:cBhvr>
+                                        <p:cTn id="20" dur="1" fill="hold">
+                                          <p:stCondLst>
+                                            <p:cond delay="0"/>
+                                          </p:stCondLst>
+                                        </p:cTn>
+                                        <p:tgtEl>
+                                          <p:spTgt spid="85">
+                                            <p:txEl>
+                                              <p:pRg st="7" end="7"/>
+                                            </p:txEl>
+                                          </p:spTgt>
+                                        </p:tgtEl>
+                                        <p:attrNameLst>
+                                          <p:attrName>style.visibility</p:attrName>
+                                        </p:attrNameLst>
+                                      </p:cBhvr>
+                                      <p:to>
+                                        <p:strVal val="visible"/>
+                                      </p:to>
+                                    </p:set>
+                                  </p:childTnLst>
+                                </p:cTn>
+                              </p:par>
+                              <p:par>
+                                <p:cTn id="21" nodeType="withEffect" fill="hold" presetClass="entr" presetID="1">
+                                  <p:stCondLst>
+                                    <p:cond delay="0"/>
+                                  </p:stCondLst>
+                                  <p:childTnLst>
+                                    <p:set>
+                                      <p:cBhvr>
+                                        <p:cTn id="22" dur="1" fill="hold">
+                                          <p:stCondLst>
+                                            <p:cond delay="0"/>
+                                          </p:stCondLst>
+                                        </p:cTn>
+                                        <p:tgtEl>
+                                          <p:spTgt spid="85">
+                                            <p:txEl>
+                                              <p:pRg st="8" end="8"/>
+                                            </p:txEl>
+                                          </p:spTgt>
+                                        </p:tgtEl>
+                                        <p:attrNameLst>
+                                          <p:attrName>style.visibility</p:attrName>
+                                        </p:attrNameLst>
+                                      </p:cBhvr>
+                                      <p:to>
+                                        <p:strVal val="visible"/>
+                                      </p:to>
+                                    </p:set>
+                                  </p:childTnLst>
+                                </p:cTn>
+                              </p:par>
+                            </p:childTnLst>
+                          </p:cTn>
+                        </p:par>
+                      </p:childTnLst>
+                    </p:cTn>
+                  </p:par>
+                </p:childTnLst>
+              </p:cTn>
+              <p:prevCondLst>
+                <p:cond evt="onPrev">
+                  <p:tgtEl>
+                    <p:sldTgt/>
+                  </p:tgtEl>
+                </p:cond>
+              </p:prevCondLst>
+              <p:nextCondLst>
+                <p:cond evt="onNext">
+                  <p:tgtEl>
+                    <p:sldTgt/>
+                  </p:tgtEl>
+                </p:cond>
+              </p:nextCondLst>
+            </p:seq>
+          </p:childTnLst>
+        </p:cTn>
+      </p:par>
+    </p:tnLst>
+  </p:timing>
 </p:sld>
 </file>
 
@@ -3975,7 +4290,7 @@
         <p:spPr>
           <a:xfrm>
             <a:off x="874800" y="343080"/>
-            <a:ext cx="7962480" cy="582120"/>
+            <a:ext cx="7962120" cy="581760"/>
           </a:xfrm>
           <a:prstGeom prst="rect">
             <a:avLst/>
@@ -4001,7 +4316,7 @@
         <p:spPr>
           <a:xfrm>
             <a:off x="874800" y="1381680"/>
-            <a:ext cx="3893400" cy="3279600"/>
+            <a:ext cx="3893040" cy="3279240"/>
           </a:xfrm>
           <a:prstGeom prst="rect">
             <a:avLst/>
@@ -4027,7 +4342,7 @@
         <p:spPr>
           <a:xfrm>
             <a:off x="874800" y="990360"/>
-            <a:ext cx="3893400" cy="325080"/>
+            <a:ext cx="3893040" cy="324720"/>
           </a:xfrm>
           <a:prstGeom prst="rect">
             <a:avLst/>
@@ -4053,7 +4368,7 @@
         <p:spPr>
           <a:xfrm>
             <a:off x="4943520" y="1382400"/>
-            <a:ext cx="3897000" cy="3279600"/>
+            <a:ext cx="3896640" cy="3279240"/>
           </a:xfrm>
           <a:prstGeom prst="rect">
             <a:avLst/>
@@ -4079,7 +4394,7 @@
         <p:spPr>
           <a:xfrm>
             <a:off x="4943520" y="990360"/>
-            <a:ext cx="3897000" cy="325080"/>
+            <a:ext cx="3896640" cy="324720"/>
           </a:xfrm>
           <a:prstGeom prst="rect">
             <a:avLst/>
@@ -4105,7 +4420,7 @@
         <p:spPr>
           <a:xfrm>
             <a:off x="874800" y="343080"/>
-            <a:ext cx="7962480" cy="582120"/>
+            <a:ext cx="7962120" cy="581760"/>
           </a:xfrm>
           <a:prstGeom prst="rect">
             <a:avLst/>
@@ -4156,7 +4471,7 @@
         <p:spPr>
           <a:xfrm>
             <a:off x="822960" y="1188720"/>
-            <a:ext cx="7130880" cy="3160440"/>
+            <a:ext cx="7130520" cy="3160080"/>
           </a:xfrm>
           <a:prstGeom prst="rect">
             <a:avLst/>
@@ -4201,16 +4516,9 @@
               <a:lnSpc>
                 <a:spcPct val="100000"/>
               </a:lnSpc>
-            </a:pPr>
-            <a:endParaRPr b="0" lang="de-DE" sz="1800" spc="-1" strike="noStrike">
-              <a:latin typeface="Arial"/>
-            </a:endParaRPr>
-          </a:p>
-          <a:p>
-            <a:pPr>
-              <a:lnSpc>
-                <a:spcPct val="100000"/>
-              </a:lnSpc>
+              <a:spcBef>
+                <a:spcPts val="1134"/>
+              </a:spcBef>
             </a:pPr>
             <a:r>
               <a:rPr b="0" lang="de-DE" sz="1800" spc="-1" strike="noStrike">
@@ -4241,6 +4549,9 @@
               <a:lnSpc>
                 <a:spcPct val="100000"/>
               </a:lnSpc>
+              <a:spcBef>
+                <a:spcPts val="1134"/>
+              </a:spcBef>
             </a:pPr>
             <a:r>
               <a:rPr b="0" lang="de-DE" sz="1800" spc="-1" strike="noStrike">
@@ -4271,6 +4582,9 @@
               <a:lnSpc>
                 <a:spcPct val="100000"/>
               </a:lnSpc>
+              <a:spcBef>
+                <a:spcPts val="1134"/>
+              </a:spcBef>
             </a:pPr>
             <a:r>
               <a:rPr b="0" lang="de-DE" sz="1800" spc="-1" strike="noStrike">
@@ -4301,16 +4615,9 @@
               <a:lnSpc>
                 <a:spcPct val="100000"/>
               </a:lnSpc>
-            </a:pPr>
-            <a:endParaRPr b="0" lang="de-DE" sz="1800" spc="-1" strike="noStrike">
-              <a:latin typeface="Arial"/>
-            </a:endParaRPr>
-          </a:p>
-          <a:p>
-            <a:pPr>
-              <a:lnSpc>
-                <a:spcPct val="100000"/>
-              </a:lnSpc>
+              <a:spcBef>
+                <a:spcPts val="2551"/>
+              </a:spcBef>
             </a:pPr>
             <a:r>
               <a:rPr b="1" lang="de-DE" sz="1800" spc="-1" strike="noStrike">
@@ -4331,16 +4638,9 @@
               <a:lnSpc>
                 <a:spcPct val="100000"/>
               </a:lnSpc>
-            </a:pPr>
-            <a:endParaRPr b="0" lang="de-DE" sz="1800" spc="-1" strike="noStrike">
-              <a:latin typeface="Arial"/>
-            </a:endParaRPr>
-          </a:p>
-          <a:p>
-            <a:pPr>
-              <a:lnSpc>
-                <a:spcPct val="100000"/>
-              </a:lnSpc>
+              <a:spcBef>
+                <a:spcPts val="1134"/>
+              </a:spcBef>
             </a:pPr>
             <a:r>
               <a:rPr b="0" lang="de-DE" sz="1800" spc="-1" strike="noStrike">
@@ -4371,6 +4671,9 @@
               <a:lnSpc>
                 <a:spcPct val="100000"/>
               </a:lnSpc>
+              <a:spcBef>
+                <a:spcPts val="1134"/>
+              </a:spcBef>
             </a:pPr>
             <a:r>
               <a:rPr b="0" lang="de-DE" sz="1800" spc="-1" strike="noStrike">
@@ -4401,6 +4704,9 @@
               <a:lnSpc>
                 <a:spcPct val="100000"/>
               </a:lnSpc>
+              <a:spcBef>
+                <a:spcPts val="1134"/>
+              </a:spcBef>
             </a:pPr>
             <a:r>
               <a:rPr b="0" lang="de-DE" sz="1800" spc="-1" strike="noStrike">
@@ -4420,37 +4726,7 @@
                 <a:latin typeface="Arial"/>
                 <a:ea typeface="DejaVu Sans"/>
               </a:rPr>
-              <a:t>- Zinssumme und Gehalt werden vom Gewinn abgezogen</a:t>
-            </a:r>
-            <a:endParaRPr b="0" lang="de-DE" sz="1800" spc="-1" strike="noStrike">
-              <a:latin typeface="Arial"/>
-            </a:endParaRPr>
-          </a:p>
-          <a:p>
-            <a:pPr>
-              <a:lnSpc>
-                <a:spcPct val="100000"/>
-              </a:lnSpc>
-            </a:pPr>
-            <a:r>
-              <a:rPr b="0" lang="de-DE" sz="1800" spc="-1" strike="noStrike">
-                <a:solidFill>
-                  <a:srgbClr val="000000"/>
-                </a:solidFill>
-                <a:latin typeface="Arial"/>
-                <a:ea typeface="DejaVu Sans"/>
-              </a:rPr>
-              <a:t>	</a:t>
-            </a:r>
-            <a:r>
-              <a:rPr b="0" lang="de-DE" sz="1800" spc="-1" strike="noStrike">
-                <a:solidFill>
-                  <a:srgbClr val="000000"/>
-                </a:solidFill>
-                <a:latin typeface="Arial"/>
-                <a:ea typeface="DejaVu Sans"/>
-              </a:rPr>
-              <a:t>- Restlicher Gewinn wird verteilt</a:t>
+              <a:t>- Gewinn = Gewinn - Zinssumme - Gehalt</a:t>
             </a:r>
             <a:endParaRPr b="0" lang="de-DE" sz="1800" spc="-1" strike="noStrike">
               <a:latin typeface="Arial"/>
@@ -4468,6 +4744,320 @@
       <p:transition/>
     </mc:Fallback>
   </mc:AlternateContent>
+  <p:timing>
+    <p:tnLst>
+      <p:par>
+        <p:cTn id="23" dur="indefinite" restart="never" nodeType="tmRoot">
+          <p:childTnLst>
+            <p:seq>
+              <p:cTn id="24" dur="indefinite" nodeType="mainSeq">
+                <p:childTnLst>
+                  <p:par>
+                    <p:cTn id="25" fill="hold">
+                      <p:stCondLst>
+                        <p:cond delay="indefinite"/>
+                      </p:stCondLst>
+                      <p:childTnLst>
+                        <p:par>
+                          <p:cTn id="26" fill="hold">
+                            <p:stCondLst>
+                              <p:cond delay="0"/>
+                            </p:stCondLst>
+                            <p:childTnLst>
+                              <p:par>
+                                <p:cTn id="27" nodeType="clickEffect" fill="hold" presetClass="entr" presetID="1">
+                                  <p:stCondLst>
+                                    <p:cond delay="0"/>
+                                  </p:stCondLst>
+                                  <p:childTnLst>
+                                    <p:set>
+                                      <p:cBhvr>
+                                        <p:cTn id="28" dur="1" fill="hold">
+                                          <p:stCondLst>
+                                            <p:cond delay="0"/>
+                                          </p:stCondLst>
+                                        </p:cTn>
+                                        <p:tgtEl>
+                                          <p:spTgt spid="92">
+                                            <p:txEl>
+                                              <p:pRg st="0" end="0"/>
+                                            </p:txEl>
+                                          </p:spTgt>
+                                        </p:tgtEl>
+                                        <p:attrNameLst>
+                                          <p:attrName>style.visibility</p:attrName>
+                                        </p:attrNameLst>
+                                      </p:cBhvr>
+                                      <p:to>
+                                        <p:strVal val="visible"/>
+                                      </p:to>
+                                    </p:set>
+                                  </p:childTnLst>
+                                </p:cTn>
+                              </p:par>
+                              <p:par>
+                                <p:cTn id="29" nodeType="withEffect" fill="hold" presetClass="entr" presetID="1">
+                                  <p:stCondLst>
+                                    <p:cond delay="0"/>
+                                  </p:stCondLst>
+                                  <p:childTnLst>
+                                    <p:set>
+                                      <p:cBhvr>
+                                        <p:cTn id="30" dur="1" fill="hold">
+                                          <p:stCondLst>
+                                            <p:cond delay="0"/>
+                                          </p:stCondLst>
+                                        </p:cTn>
+                                        <p:tgtEl>
+                                          <p:spTgt spid="92">
+                                            <p:txEl>
+                                              <p:pRg st="1" end="1"/>
+                                            </p:txEl>
+                                          </p:spTgt>
+                                        </p:tgtEl>
+                                        <p:attrNameLst>
+                                          <p:attrName>style.visibility</p:attrName>
+                                        </p:attrNameLst>
+                                      </p:cBhvr>
+                                      <p:to>
+                                        <p:strVal val="visible"/>
+                                      </p:to>
+                                    </p:set>
+                                  </p:childTnLst>
+                                </p:cTn>
+                              </p:par>
+                              <p:par>
+                                <p:cTn id="31" nodeType="withEffect" fill="hold" presetClass="entr" presetID="1">
+                                  <p:stCondLst>
+                                    <p:cond delay="0"/>
+                                  </p:stCondLst>
+                                  <p:childTnLst>
+                                    <p:set>
+                                      <p:cBhvr>
+                                        <p:cTn id="32" dur="1" fill="hold">
+                                          <p:stCondLst>
+                                            <p:cond delay="0"/>
+                                          </p:stCondLst>
+                                        </p:cTn>
+                                        <p:tgtEl>
+                                          <p:spTgt spid="92">
+                                            <p:txEl>
+                                              <p:pRg st="2" end="2"/>
+                                            </p:txEl>
+                                          </p:spTgt>
+                                        </p:tgtEl>
+                                        <p:attrNameLst>
+                                          <p:attrName>style.visibility</p:attrName>
+                                        </p:attrNameLst>
+                                      </p:cBhvr>
+                                      <p:to>
+                                        <p:strVal val="visible"/>
+                                      </p:to>
+                                    </p:set>
+                                  </p:childTnLst>
+                                </p:cTn>
+                              </p:par>
+                              <p:par>
+                                <p:cTn id="33" nodeType="withEffect" fill="hold" presetClass="entr" presetID="1">
+                                  <p:stCondLst>
+                                    <p:cond delay="0"/>
+                                  </p:stCondLst>
+                                  <p:childTnLst>
+                                    <p:set>
+                                      <p:cBhvr>
+                                        <p:cTn id="34" dur="1" fill="hold">
+                                          <p:stCondLst>
+                                            <p:cond delay="0"/>
+                                          </p:stCondLst>
+                                        </p:cTn>
+                                        <p:tgtEl>
+                                          <p:spTgt spid="92">
+                                            <p:txEl>
+                                              <p:pRg st="3" end="3"/>
+                                            </p:txEl>
+                                          </p:spTgt>
+                                        </p:tgtEl>
+                                        <p:attrNameLst>
+                                          <p:attrName>style.visibility</p:attrName>
+                                        </p:attrNameLst>
+                                      </p:cBhvr>
+                                      <p:to>
+                                        <p:strVal val="visible"/>
+                                      </p:to>
+                                    </p:set>
+                                  </p:childTnLst>
+                                </p:cTn>
+                              </p:par>
+                            </p:childTnLst>
+                          </p:cTn>
+                        </p:par>
+                      </p:childTnLst>
+                    </p:cTn>
+                  </p:par>
+                  <p:par>
+                    <p:cTn id="35" fill="hold">
+                      <p:stCondLst>
+                        <p:cond delay="indefinite"/>
+                      </p:stCondLst>
+                      <p:childTnLst>
+                        <p:par>
+                          <p:cTn id="36" fill="hold">
+                            <p:stCondLst>
+                              <p:cond delay="0"/>
+                            </p:stCondLst>
+                            <p:childTnLst>
+                              <p:par>
+                                <p:cTn id="37" nodeType="clickEffect" fill="hold" presetClass="entr" presetID="1">
+                                  <p:stCondLst>
+                                    <p:cond delay="0"/>
+                                  </p:stCondLst>
+                                  <p:childTnLst>
+                                    <p:set>
+                                      <p:cBhvr>
+                                        <p:cTn id="38" dur="1" fill="hold">
+                                          <p:stCondLst>
+                                            <p:cond delay="0"/>
+                                          </p:stCondLst>
+                                        </p:cTn>
+                                        <p:tgtEl>
+                                          <p:spTgt spid="92">
+                                            <p:txEl>
+                                              <p:pRg st="4" end="4"/>
+                                            </p:txEl>
+                                          </p:spTgt>
+                                        </p:tgtEl>
+                                        <p:attrNameLst>
+                                          <p:attrName>style.visibility</p:attrName>
+                                        </p:attrNameLst>
+                                      </p:cBhvr>
+                                      <p:to>
+                                        <p:strVal val="visible"/>
+                                      </p:to>
+                                    </p:set>
+                                  </p:childTnLst>
+                                </p:cTn>
+                              </p:par>
+                              <p:par>
+                                <p:cTn id="39" nodeType="withEffect" fill="hold" presetClass="entr" presetID="1">
+                                  <p:stCondLst>
+                                    <p:cond delay="0"/>
+                                  </p:stCondLst>
+                                  <p:childTnLst>
+                                    <p:set>
+                                      <p:cBhvr>
+                                        <p:cTn id="40" dur="1" fill="hold">
+                                          <p:stCondLst>
+                                            <p:cond delay="0"/>
+                                          </p:stCondLst>
+                                        </p:cTn>
+                                        <p:tgtEl>
+                                          <p:spTgt spid="92">
+                                            <p:txEl>
+                                              <p:pRg st="5" end="5"/>
+                                            </p:txEl>
+                                          </p:spTgt>
+                                        </p:tgtEl>
+                                        <p:attrNameLst>
+                                          <p:attrName>style.visibility</p:attrName>
+                                        </p:attrNameLst>
+                                      </p:cBhvr>
+                                      <p:to>
+                                        <p:strVal val="visible"/>
+                                      </p:to>
+                                    </p:set>
+                                  </p:childTnLst>
+                                </p:cTn>
+                              </p:par>
+                              <p:par>
+                                <p:cTn id="41" nodeType="withEffect" fill="hold" presetClass="entr" presetID="1">
+                                  <p:stCondLst>
+                                    <p:cond delay="0"/>
+                                  </p:stCondLst>
+                                  <p:childTnLst>
+                                    <p:set>
+                                      <p:cBhvr>
+                                        <p:cTn id="42" dur="1" fill="hold">
+                                          <p:stCondLst>
+                                            <p:cond delay="0"/>
+                                          </p:stCondLst>
+                                        </p:cTn>
+                                        <p:tgtEl>
+                                          <p:spTgt spid="92">
+                                            <p:txEl>
+                                              <p:pRg st="6" end="6"/>
+                                            </p:txEl>
+                                          </p:spTgt>
+                                        </p:tgtEl>
+                                        <p:attrNameLst>
+                                          <p:attrName>style.visibility</p:attrName>
+                                        </p:attrNameLst>
+                                      </p:cBhvr>
+                                      <p:to>
+                                        <p:strVal val="visible"/>
+                                      </p:to>
+                                    </p:set>
+                                  </p:childTnLst>
+                                </p:cTn>
+                              </p:par>
+                              <p:par>
+                                <p:cTn id="43" nodeType="withEffect" fill="hold" presetClass="entr" presetID="1">
+                                  <p:stCondLst>
+                                    <p:cond delay="0"/>
+                                  </p:stCondLst>
+                                  <p:childTnLst>
+                                    <p:set>
+                                      <p:cBhvr>
+                                        <p:cTn id="44" dur="1" fill="hold">
+                                          <p:stCondLst>
+                                            <p:cond delay="0"/>
+                                          </p:stCondLst>
+                                        </p:cTn>
+                                        <p:tgtEl>
+                                          <p:spTgt spid="92">
+                                            <p:txEl>
+                                              <p:pRg st="7" end="7"/>
+                                            </p:txEl>
+                                          </p:spTgt>
+                                        </p:tgtEl>
+                                        <p:attrNameLst>
+                                          <p:attrName>style.visibility</p:attrName>
+                                        </p:attrNameLst>
+                                      </p:cBhvr>
+                                      <p:to>
+                                        <p:strVal val="visible"/>
+                                      </p:to>
+                                    </p:set>
+                                  </p:childTnLst>
+                                </p:cTn>
+                              </p:par>
+                            </p:childTnLst>
+                          </p:cTn>
+                        </p:par>
+                      </p:childTnLst>
+                    </p:cTn>
+                  </p:par>
+                </p:childTnLst>
+              </p:cTn>
+              <p:prevCondLst>
+                <p:cond evt="onPrev">
+                  <p:tgtEl>
+                    <p:sldTgt/>
+                  </p:tgtEl>
+                </p:cond>
+              </p:prevCondLst>
+              <p:nextCondLst>
+                <p:cond evt="onNext">
+                  <p:tgtEl>
+                    <p:sldTgt/>
+                  </p:tgtEl>
+                </p:cond>
+              </p:nextCondLst>
+            </p:seq>
+          </p:childTnLst>
+        </p:cTn>
+      </p:par>
+    </p:tnLst>
+  </p:timing>
 </p:sld>
 </file>
 
@@ -4497,7 +5087,7 @@
         <p:spPr>
           <a:xfrm>
             <a:off x="874800" y="343080"/>
-            <a:ext cx="7962480" cy="582120"/>
+            <a:ext cx="7962120" cy="581760"/>
           </a:xfrm>
           <a:prstGeom prst="rect">
             <a:avLst/>
@@ -4523,7 +5113,7 @@
         <p:spPr>
           <a:xfrm>
             <a:off x="874800" y="1381680"/>
-            <a:ext cx="3893400" cy="3279600"/>
+            <a:ext cx="3893040" cy="3279240"/>
           </a:xfrm>
           <a:prstGeom prst="rect">
             <a:avLst/>
@@ -4549,7 +5139,7 @@
         <p:spPr>
           <a:xfrm>
             <a:off x="874800" y="990360"/>
-            <a:ext cx="3893400" cy="325080"/>
+            <a:ext cx="3893040" cy="324720"/>
           </a:xfrm>
           <a:prstGeom prst="rect">
             <a:avLst/>
@@ -4575,7 +5165,7 @@
         <p:spPr>
           <a:xfrm>
             <a:off x="4943520" y="1382400"/>
-            <a:ext cx="3897000" cy="3279600"/>
+            <a:ext cx="3896640" cy="3279240"/>
           </a:xfrm>
           <a:prstGeom prst="rect">
             <a:avLst/>
@@ -4601,7 +5191,7 @@
         <p:spPr>
           <a:xfrm>
             <a:off x="4943520" y="990360"/>
-            <a:ext cx="3897000" cy="325080"/>
+            <a:ext cx="3896640" cy="324720"/>
           </a:xfrm>
           <a:prstGeom prst="rect">
             <a:avLst/>
@@ -4627,7 +5217,7 @@
         <p:spPr>
           <a:xfrm>
             <a:off x="874800" y="343080"/>
-            <a:ext cx="7962480" cy="582120"/>
+            <a:ext cx="7962120" cy="581760"/>
           </a:xfrm>
           <a:prstGeom prst="rect">
             <a:avLst/>
@@ -4678,7 +5268,7 @@
         <p:spPr>
           <a:xfrm>
             <a:off x="822960" y="1188720"/>
-            <a:ext cx="7130880" cy="3141000"/>
+            <a:ext cx="7130520" cy="3140640"/>
           </a:xfrm>
           <a:prstGeom prst="rect">
             <a:avLst/>
@@ -4705,16 +5295,16 @@
               </a:lnSpc>
             </a:pPr>
             <a:r>
-              <a:rPr b="0" lang="de-DE" sz="1800" spc="-1" strike="noStrike">
+              <a:rPr b="1" lang="de-DE" sz="2000" spc="-1" strike="noStrike">
                 <a:solidFill>
                   <a:srgbClr val="000000"/>
                 </a:solidFill>
                 <a:latin typeface="Arial"/>
                 <a:ea typeface="DejaVu Sans"/>
               </a:rPr>
-              <a:t>Gewinn: 200.000 €</a:t>
+              <a:t>Annahme</a:t>
             </a:r>
-            <a:endParaRPr b="0" lang="de-DE" sz="1800" spc="-1" strike="noStrike">
+            <a:endParaRPr b="0" lang="de-DE" sz="2000" spc="-1" strike="noStrike">
               <a:latin typeface="Arial"/>
             </a:endParaRPr>
           </a:p>
@@ -4723,8 +5313,21 @@
               <a:lnSpc>
                 <a:spcPct val="100000"/>
               </a:lnSpc>
-            </a:pPr>
-            <a:endParaRPr b="0" lang="de-DE" sz="1800" spc="-1" strike="noStrike">
+              <a:spcBef>
+                <a:spcPts val="1417"/>
+              </a:spcBef>
+            </a:pPr>
+            <a:r>
+              <a:rPr b="0" lang="de-DE" sz="2000" spc="-1" strike="noStrike">
+                <a:solidFill>
+                  <a:srgbClr val="000000"/>
+                </a:solidFill>
+                <a:latin typeface="Arial"/>
+                <a:ea typeface="DejaVu Sans"/>
+              </a:rPr>
+              <a:t>- Gewinn: 200.000 €</a:t>
+            </a:r>
+            <a:endParaRPr b="0" lang="de-DE" sz="2000" spc="-1" strike="noStrike">
               <a:latin typeface="Arial"/>
             </a:endParaRPr>
           </a:p>
@@ -4733,18 +5336,11 @@
               <a:lnSpc>
                 <a:spcPct val="100000"/>
               </a:lnSpc>
-            </a:pPr>
-            <a:r>
-              <a:rPr b="0" lang="de-DE" sz="1800" spc="-1" strike="noStrike">
-                <a:solidFill>
-                  <a:srgbClr val="000000"/>
-                </a:solidFill>
-                <a:latin typeface="Arial"/>
-                <a:ea typeface="DejaVu Sans"/>
-              </a:rPr>
-              <a:t>2 Komplementäre: je 400.000 € Kapitaleinlage, 50.000 € Gehalt</a:t>
-            </a:r>
-            <a:endParaRPr b="0" lang="de-DE" sz="1800" spc="-1" strike="noStrike">
+              <a:spcBef>
+                <a:spcPts val="283"/>
+              </a:spcBef>
+            </a:pPr>
+            <a:endParaRPr b="0" lang="de-DE" sz="2000" spc="-1" strike="noStrike">
               <a:latin typeface="Arial"/>
             </a:endParaRPr>
           </a:p>
@@ -4753,8 +5349,21 @@
               <a:lnSpc>
                 <a:spcPct val="100000"/>
               </a:lnSpc>
-            </a:pPr>
-            <a:endParaRPr b="0" lang="de-DE" sz="1800" spc="-1" strike="noStrike">
+              <a:spcBef>
+                <a:spcPts val="283"/>
+              </a:spcBef>
+            </a:pPr>
+            <a:r>
+              <a:rPr b="0" lang="de-DE" sz="2000" spc="-1" strike="noStrike">
+                <a:solidFill>
+                  <a:srgbClr val="000000"/>
+                </a:solidFill>
+                <a:latin typeface="Arial"/>
+                <a:ea typeface="DejaVu Sans"/>
+              </a:rPr>
+              <a:t>- 2 Komplementäre (KT)</a:t>
+            </a:r>
+            <a:endParaRPr b="0" lang="de-DE" sz="2000" spc="-1" strike="noStrike">
               <a:latin typeface="Arial"/>
             </a:endParaRPr>
           </a:p>
@@ -4763,18 +5372,31 @@
               <a:lnSpc>
                 <a:spcPct val="100000"/>
               </a:lnSpc>
+              <a:spcBef>
+                <a:spcPts val="567"/>
+              </a:spcBef>
             </a:pPr>
             <a:r>
-              <a:rPr b="0" lang="de-DE" sz="1800" spc="-1" strike="noStrike">
+              <a:rPr b="0" lang="de-DE" sz="2000" spc="-1" strike="noStrike">
                 <a:solidFill>
                   <a:srgbClr val="000000"/>
                 </a:solidFill>
                 <a:latin typeface="Arial"/>
                 <a:ea typeface="DejaVu Sans"/>
               </a:rPr>
-              <a:t>1 Kommanditist: 100.000 € Kapitaleinlage</a:t>
+              <a:t>	</a:t>
             </a:r>
-            <a:endParaRPr b="0" lang="de-DE" sz="1800" spc="-1" strike="noStrike">
+            <a:r>
+              <a:rPr b="0" lang="de-DE" sz="2000" spc="-1" strike="noStrike">
+                <a:solidFill>
+                  <a:srgbClr val="000000"/>
+                </a:solidFill>
+                <a:latin typeface="Arial"/>
+                <a:ea typeface="DejaVu Sans"/>
+              </a:rPr>
+              <a:t>je 400.000 € Kapitaleinlage</a:t>
+            </a:r>
+            <a:endParaRPr b="0" lang="de-DE" sz="2000" spc="-1" strike="noStrike">
               <a:latin typeface="Arial"/>
             </a:endParaRPr>
           </a:p>
@@ -4783,8 +5405,31 @@
               <a:lnSpc>
                 <a:spcPct val="100000"/>
               </a:lnSpc>
-            </a:pPr>
-            <a:endParaRPr b="0" lang="de-DE" sz="1800" spc="-1" strike="noStrike">
+              <a:spcBef>
+                <a:spcPts val="567"/>
+              </a:spcBef>
+            </a:pPr>
+            <a:r>
+              <a:rPr b="0" lang="de-DE" sz="2000" spc="-1" strike="noStrike">
+                <a:solidFill>
+                  <a:srgbClr val="000000"/>
+                </a:solidFill>
+                <a:latin typeface="Arial"/>
+                <a:ea typeface="DejaVu Sans"/>
+              </a:rPr>
+              <a:t>	</a:t>
+            </a:r>
+            <a:r>
+              <a:rPr b="0" lang="de-DE" sz="2000" spc="-1" strike="noStrike">
+                <a:solidFill>
+                  <a:srgbClr val="000000"/>
+                </a:solidFill>
+                <a:latin typeface="Arial"/>
+                <a:ea typeface="DejaVu Sans"/>
+              </a:rPr>
+              <a:t>je 50.000 € Gehalt</a:t>
+            </a:r>
+            <a:endParaRPr b="0" lang="de-DE" sz="2000" spc="-1" strike="noStrike">
               <a:latin typeface="Arial"/>
             </a:endParaRPr>
           </a:p>
@@ -4793,8 +5438,11 @@
               <a:lnSpc>
                 <a:spcPct val="100000"/>
               </a:lnSpc>
-            </a:pPr>
-            <a:endParaRPr b="0" lang="de-DE" sz="1800" spc="-1" strike="noStrike">
+              <a:spcBef>
+                <a:spcPts val="567"/>
+              </a:spcBef>
+            </a:pPr>
+            <a:endParaRPr b="0" lang="de-DE" sz="2000" spc="-1" strike="noStrike">
               <a:latin typeface="Arial"/>
             </a:endParaRPr>
           </a:p>
@@ -4803,8 +5451,21 @@
               <a:lnSpc>
                 <a:spcPct val="100000"/>
               </a:lnSpc>
-            </a:pPr>
-            <a:endParaRPr b="0" lang="de-DE" sz="1800" spc="-1" strike="noStrike">
+              <a:spcBef>
+                <a:spcPts val="283"/>
+              </a:spcBef>
+            </a:pPr>
+            <a:r>
+              <a:rPr b="0" lang="de-DE" sz="2000" spc="-1" strike="noStrike">
+                <a:solidFill>
+                  <a:srgbClr val="000000"/>
+                </a:solidFill>
+                <a:latin typeface="Arial"/>
+                <a:ea typeface="DejaVu Sans"/>
+              </a:rPr>
+              <a:t>- 1 Kommanditist (KD)</a:t>
+            </a:r>
+            <a:endParaRPr b="0" lang="de-DE" sz="2000" spc="-1" strike="noStrike">
               <a:latin typeface="Arial"/>
             </a:endParaRPr>
           </a:p>
@@ -4813,8 +5474,31 @@
               <a:lnSpc>
                 <a:spcPct val="100000"/>
               </a:lnSpc>
-            </a:pPr>
-            <a:endParaRPr b="0" lang="de-DE" sz="1800" spc="-1" strike="noStrike">
+              <a:spcBef>
+                <a:spcPts val="283"/>
+              </a:spcBef>
+            </a:pPr>
+            <a:r>
+              <a:rPr b="0" lang="de-DE" sz="2000" spc="-1" strike="noStrike">
+                <a:solidFill>
+                  <a:srgbClr val="000000"/>
+                </a:solidFill>
+                <a:latin typeface="Arial"/>
+                <a:ea typeface="DejaVu Sans"/>
+              </a:rPr>
+              <a:t>	</a:t>
+            </a:r>
+            <a:r>
+              <a:rPr b="0" lang="de-DE" sz="2000" spc="-1" strike="noStrike">
+                <a:solidFill>
+                  <a:srgbClr val="000000"/>
+                </a:solidFill>
+                <a:latin typeface="Arial"/>
+                <a:ea typeface="DejaVu Sans"/>
+              </a:rPr>
+              <a:t>200.000 € Kapitaleinlage</a:t>
+            </a:r>
+            <a:endParaRPr b="0" lang="de-DE" sz="2000" spc="-1" strike="noStrike">
               <a:latin typeface="Arial"/>
             </a:endParaRPr>
           </a:p>
@@ -4824,7 +5508,47 @@
                 <a:spcPct val="100000"/>
               </a:lnSpc>
             </a:pPr>
-            <a:endParaRPr b="0" lang="de-DE" sz="1800" spc="-1" strike="noStrike">
+            <a:endParaRPr b="0" lang="de-DE" sz="2000" spc="-1" strike="noStrike">
+              <a:latin typeface="Arial"/>
+            </a:endParaRPr>
+          </a:p>
+          <a:p>
+            <a:pPr>
+              <a:lnSpc>
+                <a:spcPct val="100000"/>
+              </a:lnSpc>
+            </a:pPr>
+            <a:endParaRPr b="0" lang="de-DE" sz="2000" spc="-1" strike="noStrike">
+              <a:latin typeface="Arial"/>
+            </a:endParaRPr>
+          </a:p>
+          <a:p>
+            <a:pPr>
+              <a:lnSpc>
+                <a:spcPct val="100000"/>
+              </a:lnSpc>
+            </a:pPr>
+            <a:endParaRPr b="0" lang="de-DE" sz="2000" spc="-1" strike="noStrike">
+              <a:latin typeface="Arial"/>
+            </a:endParaRPr>
+          </a:p>
+          <a:p>
+            <a:pPr>
+              <a:lnSpc>
+                <a:spcPct val="100000"/>
+              </a:lnSpc>
+            </a:pPr>
+            <a:endParaRPr b="0" lang="de-DE" sz="2000" spc="-1" strike="noStrike">
+              <a:latin typeface="Arial"/>
+            </a:endParaRPr>
+          </a:p>
+          <a:p>
+            <a:pPr>
+              <a:lnSpc>
+                <a:spcPct val="100000"/>
+              </a:lnSpc>
+            </a:pPr>
+            <a:endParaRPr b="0" lang="de-DE" sz="2000" spc="-1" strike="noStrike">
               <a:latin typeface="Arial"/>
             </a:endParaRPr>
           </a:p>
@@ -4840,6 +5564,276 @@
       <p:transition/>
     </mc:Fallback>
   </mc:AlternateContent>
+  <p:timing>
+    <p:tnLst>
+      <p:par>
+        <p:cTn id="45" dur="indefinite" restart="never" nodeType="tmRoot">
+          <p:childTnLst>
+            <p:seq>
+              <p:cTn id="46" dur="indefinite" nodeType="mainSeq">
+                <p:childTnLst>
+                  <p:par>
+                    <p:cTn id="47" fill="hold">
+                      <p:stCondLst>
+                        <p:cond delay="indefinite"/>
+                      </p:stCondLst>
+                      <p:childTnLst>
+                        <p:par>
+                          <p:cTn id="48" fill="hold">
+                            <p:stCondLst>
+                              <p:cond delay="0"/>
+                            </p:stCondLst>
+                            <p:childTnLst>
+                              <p:par>
+                                <p:cTn id="49" nodeType="clickEffect" fill="hold" presetClass="entr" presetID="1">
+                                  <p:stCondLst>
+                                    <p:cond delay="0"/>
+                                  </p:stCondLst>
+                                  <p:childTnLst>
+                                    <p:set>
+                                      <p:cBhvr>
+                                        <p:cTn id="50" dur="1" fill="hold">
+                                          <p:stCondLst>
+                                            <p:cond delay="0"/>
+                                          </p:stCondLst>
+                                        </p:cTn>
+                                        <p:tgtEl>
+                                          <p:spTgt spid="99">
+                                            <p:txEl>
+                                              <p:pRg st="1" end="1"/>
+                                            </p:txEl>
+                                          </p:spTgt>
+                                        </p:tgtEl>
+                                        <p:attrNameLst>
+                                          <p:attrName>style.visibility</p:attrName>
+                                        </p:attrNameLst>
+                                      </p:cBhvr>
+                                      <p:to>
+                                        <p:strVal val="visible"/>
+                                      </p:to>
+                                    </p:set>
+                                  </p:childTnLst>
+                                </p:cTn>
+                              </p:par>
+                            </p:childTnLst>
+                          </p:cTn>
+                        </p:par>
+                      </p:childTnLst>
+                    </p:cTn>
+                  </p:par>
+                  <p:par>
+                    <p:cTn id="51" fill="hold">
+                      <p:stCondLst>
+                        <p:cond delay="indefinite"/>
+                      </p:stCondLst>
+                      <p:childTnLst>
+                        <p:par>
+                          <p:cTn id="52" fill="hold">
+                            <p:stCondLst>
+                              <p:cond delay="0"/>
+                            </p:stCondLst>
+                            <p:childTnLst>
+                              <p:par>
+                                <p:cTn id="53" nodeType="clickEffect" fill="hold" presetClass="entr" presetID="1">
+                                  <p:stCondLst>
+                                    <p:cond delay="0"/>
+                                  </p:stCondLst>
+                                  <p:childTnLst>
+                                    <p:set>
+                                      <p:cBhvr>
+                                        <p:cTn id="54" dur="1" fill="hold">
+                                          <p:stCondLst>
+                                            <p:cond delay="0"/>
+                                          </p:stCondLst>
+                                        </p:cTn>
+                                        <p:tgtEl>
+                                          <p:spTgt spid="99">
+                                            <p:txEl>
+                                              <p:pRg st="3" end="3"/>
+                                            </p:txEl>
+                                          </p:spTgt>
+                                        </p:tgtEl>
+                                        <p:attrNameLst>
+                                          <p:attrName>style.visibility</p:attrName>
+                                        </p:attrNameLst>
+                                      </p:cBhvr>
+                                      <p:to>
+                                        <p:strVal val="visible"/>
+                                      </p:to>
+                                    </p:set>
+                                  </p:childTnLst>
+                                </p:cTn>
+                              </p:par>
+                              <p:par>
+                                <p:cTn id="55" nodeType="withEffect" fill="hold" presetClass="entr" presetID="1">
+                                  <p:stCondLst>
+                                    <p:cond delay="0"/>
+                                  </p:stCondLst>
+                                  <p:childTnLst>
+                                    <p:set>
+                                      <p:cBhvr>
+                                        <p:cTn id="56" dur="1" fill="hold">
+                                          <p:stCondLst>
+                                            <p:cond delay="0"/>
+                                          </p:stCondLst>
+                                        </p:cTn>
+                                        <p:tgtEl>
+                                          <p:spTgt spid="99">
+                                            <p:txEl>
+                                              <p:pRg st="4" end="4"/>
+                                            </p:txEl>
+                                          </p:spTgt>
+                                        </p:tgtEl>
+                                        <p:attrNameLst>
+                                          <p:attrName>style.visibility</p:attrName>
+                                        </p:attrNameLst>
+                                      </p:cBhvr>
+                                      <p:to>
+                                        <p:strVal val="visible"/>
+                                      </p:to>
+                                    </p:set>
+                                  </p:childTnLst>
+                                </p:cTn>
+                              </p:par>
+                              <p:par>
+                                <p:cTn id="57" nodeType="withEffect" fill="hold" presetClass="entr" presetID="1">
+                                  <p:stCondLst>
+                                    <p:cond delay="0"/>
+                                  </p:stCondLst>
+                                  <p:childTnLst>
+                                    <p:set>
+                                      <p:cBhvr>
+                                        <p:cTn id="58" dur="1" fill="hold">
+                                          <p:stCondLst>
+                                            <p:cond delay="0"/>
+                                          </p:stCondLst>
+                                        </p:cTn>
+                                        <p:tgtEl>
+                                          <p:spTgt spid="99">
+                                            <p:txEl>
+                                              <p:pRg st="5" end="5"/>
+                                            </p:txEl>
+                                          </p:spTgt>
+                                        </p:tgtEl>
+                                        <p:attrNameLst>
+                                          <p:attrName>style.visibility</p:attrName>
+                                        </p:attrNameLst>
+                                      </p:cBhvr>
+                                      <p:to>
+                                        <p:strVal val="visible"/>
+                                      </p:to>
+                                    </p:set>
+                                  </p:childTnLst>
+                                </p:cTn>
+                              </p:par>
+                            </p:childTnLst>
+                          </p:cTn>
+                        </p:par>
+                      </p:childTnLst>
+                    </p:cTn>
+                  </p:par>
+                  <p:par>
+                    <p:cTn id="59" fill="hold">
+                      <p:stCondLst>
+                        <p:cond delay="indefinite"/>
+                      </p:stCondLst>
+                      <p:childTnLst>
+                        <p:par>
+                          <p:cTn id="60" fill="hold">
+                            <p:stCondLst>
+                              <p:cond delay="0"/>
+                            </p:stCondLst>
+                            <p:childTnLst>
+                              <p:par>
+                                <p:cTn id="61" nodeType="clickEffect" fill="hold" presetClass="entr" presetID="1">
+                                  <p:stCondLst>
+                                    <p:cond delay="0"/>
+                                  </p:stCondLst>
+                                  <p:childTnLst>
+                                    <p:set>
+                                      <p:cBhvr>
+                                        <p:cTn id="62" dur="1" fill="hold">
+                                          <p:stCondLst>
+                                            <p:cond delay="0"/>
+                                          </p:stCondLst>
+                                        </p:cTn>
+                                        <p:tgtEl>
+                                          <p:spTgt spid="99">
+                                            <p:txEl>
+                                              <p:pRg st="7" end="7"/>
+                                            </p:txEl>
+                                          </p:spTgt>
+                                        </p:tgtEl>
+                                        <p:attrNameLst>
+                                          <p:attrName>style.visibility</p:attrName>
+                                        </p:attrNameLst>
+                                      </p:cBhvr>
+                                      <p:to>
+                                        <p:strVal val="visible"/>
+                                      </p:to>
+                                    </p:set>
+                                  </p:childTnLst>
+                                </p:cTn>
+                              </p:par>
+                              <p:par>
+                                <p:cTn id="63" nodeType="withEffect" fill="hold" presetClass="entr" presetID="1">
+                                  <p:stCondLst>
+                                    <p:cond delay="0"/>
+                                  </p:stCondLst>
+                                  <p:childTnLst>
+                                    <p:set>
+                                      <p:cBhvr>
+                                        <p:cTn id="64" dur="1" fill="hold">
+                                          <p:stCondLst>
+                                            <p:cond delay="0"/>
+                                          </p:stCondLst>
+                                        </p:cTn>
+                                        <p:tgtEl>
+                                          <p:spTgt spid="99">
+                                            <p:txEl>
+                                              <p:pRg st="8" end="8"/>
+                                            </p:txEl>
+                                          </p:spTgt>
+                                        </p:tgtEl>
+                                        <p:attrNameLst>
+                                          <p:attrName>style.visibility</p:attrName>
+                                        </p:attrNameLst>
+                                      </p:cBhvr>
+                                      <p:to>
+                                        <p:strVal val="visible"/>
+                                      </p:to>
+                                    </p:set>
+                                  </p:childTnLst>
+                                </p:cTn>
+                              </p:par>
+                            </p:childTnLst>
+                          </p:cTn>
+                        </p:par>
+                      </p:childTnLst>
+                    </p:cTn>
+                  </p:par>
+                </p:childTnLst>
+              </p:cTn>
+              <p:prevCondLst>
+                <p:cond evt="onPrev">
+                  <p:tgtEl>
+                    <p:sldTgt/>
+                  </p:tgtEl>
+                </p:cond>
+              </p:prevCondLst>
+              <p:nextCondLst>
+                <p:cond evt="onNext">
+                  <p:tgtEl>
+                    <p:sldTgt/>
+                  </p:tgtEl>
+                </p:cond>
+              </p:nextCondLst>
+            </p:seq>
+          </p:childTnLst>
+        </p:cTn>
+      </p:par>
+    </p:tnLst>
+  </p:timing>
 </p:sld>
 </file>
 
@@ -4869,7 +5863,7 @@
         <p:spPr>
           <a:xfrm>
             <a:off x="874800" y="343080"/>
-            <a:ext cx="7962480" cy="582120"/>
+            <a:ext cx="7962120" cy="581760"/>
           </a:xfrm>
           <a:prstGeom prst="rect">
             <a:avLst/>
@@ -4895,7 +5889,7 @@
         <p:spPr>
           <a:xfrm>
             <a:off x="874800" y="1381680"/>
-            <a:ext cx="3893400" cy="3279600"/>
+            <a:ext cx="3893040" cy="3279240"/>
           </a:xfrm>
           <a:prstGeom prst="rect">
             <a:avLst/>
@@ -4921,7 +5915,7 @@
         <p:spPr>
           <a:xfrm>
             <a:off x="874800" y="990360"/>
-            <a:ext cx="3893400" cy="325080"/>
+            <a:ext cx="3893040" cy="324720"/>
           </a:xfrm>
           <a:prstGeom prst="rect">
             <a:avLst/>
@@ -4947,7 +5941,7 @@
         <p:spPr>
           <a:xfrm>
             <a:off x="4943520" y="1382400"/>
-            <a:ext cx="3897000" cy="3279600"/>
+            <a:ext cx="3896640" cy="3279240"/>
           </a:xfrm>
           <a:prstGeom prst="rect">
             <a:avLst/>
@@ -4973,7 +5967,7 @@
         <p:spPr>
           <a:xfrm>
             <a:off x="4943520" y="990360"/>
-            <a:ext cx="3897000" cy="325080"/>
+            <a:ext cx="3896640" cy="324720"/>
           </a:xfrm>
           <a:prstGeom prst="rect">
             <a:avLst/>
@@ -4999,7 +5993,7 @@
         <p:spPr>
           <a:xfrm>
             <a:off x="874800" y="343080"/>
-            <a:ext cx="7962480" cy="582120"/>
+            <a:ext cx="7962120" cy="581760"/>
           </a:xfrm>
           <a:prstGeom prst="rect">
             <a:avLst/>
@@ -5050,7 +6044,7 @@
         <p:spPr>
           <a:xfrm>
             <a:off x="822960" y="1188720"/>
-            <a:ext cx="7130880" cy="2703240"/>
+            <a:ext cx="7130520" cy="2702880"/>
           </a:xfrm>
           <a:prstGeom prst="rect">
             <a:avLst/>
@@ -5077,7 +6071,7 @@
               </a:lnSpc>
             </a:pPr>
             <a:r>
-              <a:rPr b="1" lang="de-DE" sz="1800" spc="-1" strike="noStrike">
+              <a:rPr b="1" lang="de-DE" sz="2000" spc="-1" strike="noStrike">
                 <a:solidFill>
                   <a:srgbClr val="000000"/>
                 </a:solidFill>
@@ -5086,7 +6080,7 @@
               </a:rPr>
               <a:t>Verzinsung der Kapitaleinlagen</a:t>
             </a:r>
-            <a:endParaRPr b="0" lang="de-DE" sz="1800" spc="-1" strike="noStrike">
+            <a:endParaRPr b="0" lang="de-DE" sz="2000" spc="-1" strike="noStrike">
               <a:latin typeface="Arial"/>
             </a:endParaRPr>
           </a:p>
@@ -5096,7 +6090,7 @@
                 <a:spcPct val="100000"/>
               </a:lnSpc>
             </a:pPr>
-            <a:endParaRPr b="0" lang="de-DE" sz="1800" spc="-1" strike="noStrike">
+            <a:endParaRPr b="0" lang="de-DE" sz="2000" spc="-1" strike="noStrike">
               <a:latin typeface="Arial"/>
             </a:endParaRPr>
           </a:p>
@@ -5105,18 +6099,21 @@
               <a:lnSpc>
                 <a:spcPct val="100000"/>
               </a:lnSpc>
+              <a:spcBef>
+                <a:spcPts val="567"/>
+              </a:spcBef>
             </a:pPr>
             <a:r>
-              <a:rPr b="0" lang="de-DE" sz="1800" spc="-1" strike="noStrike">
+              <a:rPr b="0" lang="de-DE" sz="2000" spc="-1" strike="noStrike">
                 <a:solidFill>
                   <a:srgbClr val="000000"/>
                 </a:solidFill>
                 <a:latin typeface="Arial"/>
                 <a:ea typeface="DejaVu Sans"/>
               </a:rPr>
-              <a:t>4 % von 400.000 € = 16.000 €</a:t>
+              <a:t>KT: 4 % von 400.000 € = 16.000 €</a:t>
             </a:r>
-            <a:endParaRPr b="0" lang="de-DE" sz="1800" spc="-1" strike="noStrike">
+            <a:endParaRPr b="0" lang="de-DE" sz="2000" spc="-1" strike="noStrike">
               <a:latin typeface="Arial"/>
             </a:endParaRPr>
           </a:p>
@@ -5125,18 +6122,21 @@
               <a:lnSpc>
                 <a:spcPct val="100000"/>
               </a:lnSpc>
+              <a:spcBef>
+                <a:spcPts val="567"/>
+              </a:spcBef>
             </a:pPr>
             <a:r>
-              <a:rPr b="0" lang="de-DE" sz="1800" spc="-1" strike="noStrike">
+              <a:rPr b="0" lang="de-DE" sz="2000" spc="-1" strike="noStrike">
                 <a:solidFill>
                   <a:srgbClr val="000000"/>
                 </a:solidFill>
                 <a:latin typeface="Arial"/>
                 <a:ea typeface="DejaVu Sans"/>
               </a:rPr>
-              <a:t>4 % von 200.000 € = 8.000 €</a:t>
+              <a:t>KD: 4 % von 200.000 € = 8.000 €</a:t>
             </a:r>
-            <a:endParaRPr b="0" lang="de-DE" sz="1800" spc="-1" strike="noStrike">
+            <a:endParaRPr b="0" lang="de-DE" sz="2000" spc="-1" strike="noStrike">
               <a:latin typeface="Arial"/>
             </a:endParaRPr>
           </a:p>
@@ -5146,7 +6146,7 @@
                 <a:spcPct val="100000"/>
               </a:lnSpc>
             </a:pPr>
-            <a:endParaRPr b="0" lang="de-DE" sz="1800" spc="-1" strike="noStrike">
+            <a:endParaRPr b="0" lang="de-DE" sz="2000" spc="-1" strike="noStrike">
               <a:latin typeface="Arial"/>
             </a:endParaRPr>
           </a:p>
@@ -5157,16 +6157,26 @@
               </a:lnSpc>
             </a:pPr>
             <a:r>
-              <a:rPr b="0" lang="de-DE" sz="1800" spc="-1" strike="noStrike">
+              <a:rPr b="0" lang="de-DE" sz="2000" spc="-1" strike="noStrike">
                 <a:solidFill>
                   <a:srgbClr val="000000"/>
                 </a:solidFill>
                 <a:latin typeface="Arial"/>
                 <a:ea typeface="DejaVu Sans"/>
               </a:rPr>
-              <a:t>--&gt; 200.000 € - 32.000 € - 8.000 € = 160.000 €</a:t>
+              <a:t>        </a:t>
             </a:r>
-            <a:endParaRPr b="0" lang="de-DE" sz="1800" spc="-1" strike="noStrike">
+            <a:r>
+              <a:rPr b="0" lang="de-DE" sz="2000" spc="-1" strike="noStrike">
+                <a:solidFill>
+                  <a:srgbClr val="000000"/>
+                </a:solidFill>
+                <a:latin typeface="Arial"/>
+                <a:ea typeface="DejaVu Sans"/>
+              </a:rPr>
+              <a:t>200.000 € - 32.000 € - 8.000 € = 160.000 €</a:t>
+            </a:r>
+            <a:endParaRPr b="0" lang="de-DE" sz="2000" spc="-1" strike="noStrike">
               <a:latin typeface="Arial"/>
             </a:endParaRPr>
           </a:p>
@@ -5176,7 +6186,7 @@
                 <a:spcPct val="100000"/>
               </a:lnSpc>
             </a:pPr>
-            <a:endParaRPr b="0" lang="de-DE" sz="1800" spc="-1" strike="noStrike">
+            <a:endParaRPr b="0" lang="de-DE" sz="2000" spc="-1" strike="noStrike">
               <a:latin typeface="Arial"/>
             </a:endParaRPr>
           </a:p>
@@ -5187,16 +6197,16 @@
               </a:lnSpc>
             </a:pPr>
             <a:r>
-              <a:rPr b="1" lang="de-DE" sz="1800" spc="-1" strike="noStrike">
+              <a:rPr b="1" lang="de-DE" sz="2000" spc="-1" strike="noStrike">
                 <a:solidFill>
                   <a:srgbClr val="000000"/>
                 </a:solidFill>
                 <a:latin typeface="Arial"/>
                 <a:ea typeface="DejaVu Sans"/>
               </a:rPr>
-              <a:t>Abzug der Gehälter</a:t>
+              <a:t>Abzug der Gehälter (KT)</a:t>
             </a:r>
-            <a:endParaRPr b="0" lang="de-DE" sz="1800" spc="-1" strike="noStrike">
+            <a:endParaRPr b="0" lang="de-DE" sz="2000" spc="-1" strike="noStrike">
               <a:latin typeface="Arial"/>
             </a:endParaRPr>
           </a:p>
@@ -5206,7 +6216,7 @@
                 <a:spcPct val="100000"/>
               </a:lnSpc>
             </a:pPr>
-            <a:endParaRPr b="0" lang="de-DE" sz="1800" spc="-1" strike="noStrike">
+            <a:endParaRPr b="0" lang="de-DE" sz="2000" spc="-1" strike="noStrike">
               <a:latin typeface="Arial"/>
             </a:endParaRPr>
           </a:p>
@@ -5217,7 +6227,7 @@
               </a:lnSpc>
             </a:pPr>
             <a:r>
-              <a:rPr b="0" lang="de-DE" sz="1800" spc="-1" strike="noStrike">
+              <a:rPr b="0" lang="de-DE" sz="2000" spc="-1" strike="noStrike">
                 <a:solidFill>
                   <a:srgbClr val="000000"/>
                 </a:solidFill>
@@ -5226,11 +6236,72 @@
               </a:rPr>
               <a:t>160.000 € - 100.000 € = 60.000 €</a:t>
             </a:r>
-            <a:endParaRPr b="0" lang="de-DE" sz="1800" spc="-1" strike="noStrike">
-              <a:latin typeface="Arial"/>
-            </a:endParaRPr>
-          </a:p>
-        </p:txBody>
+            <a:endParaRPr b="0" lang="de-DE" sz="2000" spc="-1" strike="noStrike">
+              <a:latin typeface="Arial"/>
+            </a:endParaRPr>
+          </a:p>
+        </p:txBody>
+      </p:sp>
+      <p:sp>
+        <p:nvSpPr>
+          <p:cNvPr id="107" name="CustomShape 8"/>
+          <p:cNvSpPr/>
+          <p:nvPr/>
+        </p:nvSpPr>
+        <p:spPr>
+          <a:xfrm>
+            <a:off x="930960" y="2952000"/>
+            <a:ext cx="400320" cy="215640"/>
+          </a:xfrm>
+          <a:custGeom>
+            <a:avLst/>
+            <a:gdLst/>
+            <a:ahLst/>
+            <a:rect l="l" t="t" r="r" b="b"/>
+            <a:pathLst>
+              <a:path w="1116" h="402">
+                <a:moveTo>
+                  <a:pt x="0" y="100"/>
+                </a:moveTo>
+                <a:lnTo>
+                  <a:pt x="836" y="100"/>
+                </a:lnTo>
+                <a:lnTo>
+                  <a:pt x="836" y="0"/>
+                </a:lnTo>
+                <a:lnTo>
+                  <a:pt x="1115" y="200"/>
+                </a:lnTo>
+                <a:lnTo>
+                  <a:pt x="836" y="401"/>
+                </a:lnTo>
+                <a:lnTo>
+                  <a:pt x="836" y="300"/>
+                </a:lnTo>
+                <a:lnTo>
+                  <a:pt x="0" y="300"/>
+                </a:lnTo>
+                <a:lnTo>
+                  <a:pt x="0" y="100"/>
+                </a:lnTo>
+              </a:path>
+            </a:pathLst>
+          </a:custGeom>
+          <a:solidFill>
+            <a:srgbClr val="02d35f"/>
+          </a:solidFill>
+          <a:ln>
+            <a:solidFill>
+              <a:srgbClr val="3465a4"/>
+            </a:solidFill>
+          </a:ln>
+        </p:spPr>
+        <p:style>
+          <a:lnRef idx="0"/>
+          <a:fillRef idx="0"/>
+          <a:effectRef idx="0"/>
+          <a:fontRef idx="minor"/>
+        </p:style>
       </p:sp>
     </p:spTree>
   </p:cSld>
@@ -5242,6 +6313,321 @@
       <p:transition/>
     </mc:Fallback>
   </mc:AlternateContent>
+  <p:timing>
+    <p:tnLst>
+      <p:par>
+        <p:cTn id="65" dur="indefinite" restart="never" nodeType="tmRoot">
+          <p:childTnLst>
+            <p:seq>
+              <p:cTn id="66" dur="indefinite" nodeType="mainSeq">
+                <p:childTnLst>
+                  <p:par>
+                    <p:cTn id="67" fill="hold">
+                      <p:stCondLst>
+                        <p:cond delay="indefinite"/>
+                      </p:stCondLst>
+                      <p:childTnLst>
+                        <p:par>
+                          <p:cTn id="68" fill="hold">
+                            <p:stCondLst>
+                              <p:cond delay="0"/>
+                            </p:stCondLst>
+                            <p:childTnLst>
+                              <p:par>
+                                <p:cTn id="69" nodeType="clickEffect" fill="hold" presetClass="entr" presetID="1">
+                                  <p:stCondLst>
+                                    <p:cond delay="0"/>
+                                  </p:stCondLst>
+                                  <p:childTnLst>
+                                    <p:set>
+                                      <p:cBhvr>
+                                        <p:cTn id="70" dur="1" fill="hold">
+                                          <p:stCondLst>
+                                            <p:cond delay="0"/>
+                                          </p:stCondLst>
+                                        </p:cTn>
+                                        <p:tgtEl>
+                                          <p:spTgt spid="106">
+                                            <p:txEl>
+                                              <p:pRg st="0" end="0"/>
+                                            </p:txEl>
+                                          </p:spTgt>
+                                        </p:tgtEl>
+                                        <p:attrNameLst>
+                                          <p:attrName>style.visibility</p:attrName>
+                                        </p:attrNameLst>
+                                      </p:cBhvr>
+                                      <p:to>
+                                        <p:strVal val="visible"/>
+                                      </p:to>
+                                    </p:set>
+                                  </p:childTnLst>
+                                </p:cTn>
+                              </p:par>
+                              <p:par>
+                                <p:cTn id="71" nodeType="withEffect" fill="hold" presetClass="entr" presetID="1">
+                                  <p:stCondLst>
+                                    <p:cond delay="0"/>
+                                  </p:stCondLst>
+                                  <p:childTnLst>
+                                    <p:set>
+                                      <p:cBhvr>
+                                        <p:cTn id="72" dur="1" fill="hold">
+                                          <p:stCondLst>
+                                            <p:cond delay="0"/>
+                                          </p:stCondLst>
+                                        </p:cTn>
+                                        <p:tgtEl>
+                                          <p:spTgt spid="106">
+                                            <p:txEl>
+                                              <p:pRg st="2" end="2"/>
+                                            </p:txEl>
+                                          </p:spTgt>
+                                        </p:tgtEl>
+                                        <p:attrNameLst>
+                                          <p:attrName>style.visibility</p:attrName>
+                                        </p:attrNameLst>
+                                      </p:cBhvr>
+                                      <p:to>
+                                        <p:strVal val="visible"/>
+                                      </p:to>
+                                    </p:set>
+                                  </p:childTnLst>
+                                </p:cTn>
+                              </p:par>
+                              <p:par>
+                                <p:cTn id="73" nodeType="withEffect" fill="hold" presetClass="entr" presetID="1">
+                                  <p:stCondLst>
+                                    <p:cond delay="0"/>
+                                  </p:stCondLst>
+                                  <p:childTnLst>
+                                    <p:set>
+                                      <p:cBhvr>
+                                        <p:cTn id="74" dur="1" fill="hold">
+                                          <p:stCondLst>
+                                            <p:cond delay="0"/>
+                                          </p:stCondLst>
+                                        </p:cTn>
+                                        <p:tgtEl>
+                                          <p:spTgt spid="106">
+                                            <p:txEl>
+                                              <p:pRg st="3" end="3"/>
+                                            </p:txEl>
+                                          </p:spTgt>
+                                        </p:tgtEl>
+                                        <p:attrNameLst>
+                                          <p:attrName>style.visibility</p:attrName>
+                                        </p:attrNameLst>
+                                      </p:cBhvr>
+                                      <p:to>
+                                        <p:strVal val="visible"/>
+                                      </p:to>
+                                    </p:set>
+                                  </p:childTnLst>
+                                </p:cTn>
+                              </p:par>
+                            </p:childTnLst>
+                          </p:cTn>
+                        </p:par>
+                      </p:childTnLst>
+                    </p:cTn>
+                  </p:par>
+                  <p:par>
+                    <p:cTn id="75" fill="hold">
+                      <p:stCondLst>
+                        <p:cond delay="indefinite"/>
+                      </p:stCondLst>
+                      <p:childTnLst>
+                        <p:par>
+                          <p:cTn id="76" fill="hold">
+                            <p:stCondLst>
+                              <p:cond delay="0"/>
+                            </p:stCondLst>
+                            <p:childTnLst>
+                              <p:par>
+                                <p:cTn id="77" nodeType="clickEffect" fill="hold" presetClass="entr" presetID="1">
+                                  <p:stCondLst>
+                                    <p:cond delay="0"/>
+                                  </p:stCondLst>
+                                  <p:childTnLst>
+                                    <p:set>
+                                      <p:cBhvr>
+                                        <p:cTn id="78" dur="1" fill="hold">
+                                          <p:stCondLst>
+                                            <p:cond delay="0"/>
+                                          </p:stCondLst>
+                                        </p:cTn>
+                                        <p:tgtEl>
+                                          <p:spTgt spid="107"/>
+                                        </p:tgtEl>
+                                        <p:attrNameLst>
+                                          <p:attrName>style.visibility</p:attrName>
+                                        </p:attrNameLst>
+                                      </p:cBhvr>
+                                      <p:to>
+                                        <p:strVal val="visible"/>
+                                      </p:to>
+                                    </p:set>
+                                  </p:childTnLst>
+                                </p:cTn>
+                              </p:par>
+                            </p:childTnLst>
+                          </p:cTn>
+                        </p:par>
+                      </p:childTnLst>
+                    </p:cTn>
+                  </p:par>
+                  <p:par>
+                    <p:cTn id="79" fill="hold">
+                      <p:stCondLst>
+                        <p:cond delay="indefinite"/>
+                      </p:stCondLst>
+                      <p:childTnLst>
+                        <p:par>
+                          <p:cTn id="80" fill="hold">
+                            <p:stCondLst>
+                              <p:cond delay="0"/>
+                            </p:stCondLst>
+                            <p:childTnLst>
+                              <p:par>
+                                <p:cTn id="81" nodeType="clickEffect" fill="hold" presetClass="entr" presetID="1">
+                                  <p:stCondLst>
+                                    <p:cond delay="0"/>
+                                  </p:stCondLst>
+                                  <p:childTnLst>
+                                    <p:set>
+                                      <p:cBhvr>
+                                        <p:cTn id="82" dur="1" fill="hold">
+                                          <p:stCondLst>
+                                            <p:cond delay="0"/>
+                                          </p:stCondLst>
+                                        </p:cTn>
+                                        <p:tgtEl>
+                                          <p:spTgt spid="106">
+                                            <p:txEl>
+                                              <p:pRg st="5" end="5"/>
+                                            </p:txEl>
+                                          </p:spTgt>
+                                        </p:tgtEl>
+                                        <p:attrNameLst>
+                                          <p:attrName>style.visibility</p:attrName>
+                                        </p:attrNameLst>
+                                      </p:cBhvr>
+                                      <p:to>
+                                        <p:strVal val="visible"/>
+                                      </p:to>
+                                    </p:set>
+                                  </p:childTnLst>
+                                </p:cTn>
+                              </p:par>
+                            </p:childTnLst>
+                          </p:cTn>
+                        </p:par>
+                      </p:childTnLst>
+                    </p:cTn>
+                  </p:par>
+                  <p:par>
+                    <p:cTn id="83" fill="hold">
+                      <p:stCondLst>
+                        <p:cond delay="indefinite"/>
+                      </p:stCondLst>
+                      <p:childTnLst>
+                        <p:par>
+                          <p:cTn id="84" fill="hold">
+                            <p:stCondLst>
+                              <p:cond delay="0"/>
+                            </p:stCondLst>
+                            <p:childTnLst>
+                              <p:par>
+                                <p:cTn id="85" nodeType="clickEffect" fill="hold" presetClass="entr" presetID="1">
+                                  <p:stCondLst>
+                                    <p:cond delay="0"/>
+                                  </p:stCondLst>
+                                  <p:childTnLst>
+                                    <p:set>
+                                      <p:cBhvr>
+                                        <p:cTn id="86" dur="1" fill="hold">
+                                          <p:stCondLst>
+                                            <p:cond delay="0"/>
+                                          </p:stCondLst>
+                                        </p:cTn>
+                                        <p:tgtEl>
+                                          <p:spTgt spid="106">
+                                            <p:txEl>
+                                              <p:pRg st="7" end="7"/>
+                                            </p:txEl>
+                                          </p:spTgt>
+                                        </p:tgtEl>
+                                        <p:attrNameLst>
+                                          <p:attrName>style.visibility</p:attrName>
+                                        </p:attrNameLst>
+                                      </p:cBhvr>
+                                      <p:to>
+                                        <p:strVal val="visible"/>
+                                      </p:to>
+                                    </p:set>
+                                  </p:childTnLst>
+                                </p:cTn>
+                              </p:par>
+                              <p:par>
+                                <p:cTn id="87" nodeType="withEffect" fill="hold" presetClass="entr" presetID="1">
+                                  <p:stCondLst>
+                                    <p:cond delay="0"/>
+                                  </p:stCondLst>
+                                  <p:childTnLst>
+                                    <p:set>
+                                      <p:cBhvr>
+                                        <p:cTn id="88" dur="1" fill="hold">
+                                          <p:stCondLst>
+                                            <p:cond delay="0"/>
+                                          </p:stCondLst>
+                                        </p:cTn>
+                                        <p:tgtEl>
+                                          <p:spTgt spid="106">
+                                            <p:txEl>
+                                              <p:pRg st="9" end="9"/>
+                                            </p:txEl>
+                                          </p:spTgt>
+                                        </p:tgtEl>
+                                        <p:attrNameLst>
+                                          <p:attrName>style.visibility</p:attrName>
+                                        </p:attrNameLst>
+                                      </p:cBhvr>
+                                      <p:to>
+                                        <p:strVal val="visible"/>
+                                      </p:to>
+                                    </p:set>
+                                  </p:childTnLst>
+                                </p:cTn>
+                              </p:par>
+                            </p:childTnLst>
+                          </p:cTn>
+                        </p:par>
+                      </p:childTnLst>
+                    </p:cTn>
+                  </p:par>
+                </p:childTnLst>
+              </p:cTn>
+              <p:prevCondLst>
+                <p:cond evt="onPrev">
+                  <p:tgtEl>
+                    <p:sldTgt/>
+                  </p:tgtEl>
+                </p:cond>
+              </p:prevCondLst>
+              <p:nextCondLst>
+                <p:cond evt="onNext">
+                  <p:tgtEl>
+                    <p:sldTgt/>
+                  </p:tgtEl>
+                </p:cond>
+              </p:nextCondLst>
+            </p:seq>
+          </p:childTnLst>
+        </p:cTn>
+      </p:par>
+    </p:tnLst>
+  </p:timing>
 </p:sld>
 </file>
 
@@ -5264,14 +6650,14 @@
       </p:grpSpPr>
       <p:sp>
         <p:nvSpPr>
-          <p:cNvPr id="107" name="CustomShape 1"/>
+          <p:cNvPr id="108" name="CustomShape 1"/>
           <p:cNvSpPr/>
           <p:nvPr/>
         </p:nvSpPr>
         <p:spPr>
           <a:xfrm>
             <a:off x="874800" y="343080"/>
-            <a:ext cx="7962480" cy="582120"/>
+            <a:ext cx="7962120" cy="581760"/>
           </a:xfrm>
           <a:prstGeom prst="rect">
             <a:avLst/>
@@ -5290,14 +6676,14 @@
       </p:sp>
       <p:sp>
         <p:nvSpPr>
-          <p:cNvPr id="108" name="CustomShape 2"/>
+          <p:cNvPr id="109" name="CustomShape 2"/>
           <p:cNvSpPr/>
           <p:nvPr/>
         </p:nvSpPr>
         <p:spPr>
           <a:xfrm>
             <a:off x="874800" y="1381680"/>
-            <a:ext cx="3893400" cy="3279600"/>
+            <a:ext cx="3893040" cy="3279240"/>
           </a:xfrm>
           <a:prstGeom prst="rect">
             <a:avLst/>
@@ -5316,14 +6702,14 @@
       </p:sp>
       <p:sp>
         <p:nvSpPr>
-          <p:cNvPr id="109" name="CustomShape 3"/>
+          <p:cNvPr id="110" name="CustomShape 3"/>
           <p:cNvSpPr/>
           <p:nvPr/>
         </p:nvSpPr>
         <p:spPr>
           <a:xfrm>
             <a:off x="874800" y="990360"/>
-            <a:ext cx="3893400" cy="325080"/>
+            <a:ext cx="3893040" cy="324720"/>
           </a:xfrm>
           <a:prstGeom prst="rect">
             <a:avLst/>
@@ -5342,14 +6728,14 @@
       </p:sp>
       <p:sp>
         <p:nvSpPr>
-          <p:cNvPr id="110" name="CustomShape 4"/>
+          <p:cNvPr id="111" name="CustomShape 4"/>
           <p:cNvSpPr/>
           <p:nvPr/>
         </p:nvSpPr>
         <p:spPr>
           <a:xfrm>
             <a:off x="4943520" y="1382400"/>
-            <a:ext cx="3897000" cy="3279600"/>
+            <a:ext cx="3896640" cy="3279240"/>
           </a:xfrm>
           <a:prstGeom prst="rect">
             <a:avLst/>
@@ -5368,14 +6754,14 @@
       </p:sp>
       <p:sp>
         <p:nvSpPr>
-          <p:cNvPr id="111" name="CustomShape 5"/>
+          <p:cNvPr id="112" name="CustomShape 5"/>
           <p:cNvSpPr/>
           <p:nvPr/>
         </p:nvSpPr>
         <p:spPr>
           <a:xfrm>
             <a:off x="4943520" y="990360"/>
-            <a:ext cx="3897000" cy="325080"/>
+            <a:ext cx="3896640" cy="324720"/>
           </a:xfrm>
           <a:prstGeom prst="rect">
             <a:avLst/>
@@ -5394,14 +6780,14 @@
       </p:sp>
       <p:sp>
         <p:nvSpPr>
-          <p:cNvPr id="112" name="CustomShape 6"/>
+          <p:cNvPr id="113" name="CustomShape 6"/>
           <p:cNvSpPr/>
           <p:nvPr/>
         </p:nvSpPr>
         <p:spPr>
           <a:xfrm>
             <a:off x="874800" y="343080"/>
-            <a:ext cx="7962480" cy="582120"/>
+            <a:ext cx="7962120" cy="581760"/>
           </a:xfrm>
           <a:prstGeom prst="rect">
             <a:avLst/>
@@ -5445,14 +6831,14 @@
       </p:sp>
       <p:sp>
         <p:nvSpPr>
-          <p:cNvPr id="113" name="CustomShape 7"/>
+          <p:cNvPr id="114" name="CustomShape 7"/>
           <p:cNvSpPr/>
           <p:nvPr/>
         </p:nvSpPr>
         <p:spPr>
           <a:xfrm>
             <a:off x="822960" y="1188720"/>
-            <a:ext cx="7130880" cy="2648520"/>
+            <a:ext cx="7130520" cy="2648160"/>
           </a:xfrm>
           <a:prstGeom prst="rect">
             <a:avLst/>
@@ -5507,18 +6893,21 @@
               <a:lnSpc>
                 <a:spcPct val="100000"/>
               </a:lnSpc>
+              <a:spcBef>
+                <a:spcPts val="567"/>
+              </a:spcBef>
             </a:pPr>
             <a:r>
-              <a:rPr b="0" lang="de-DE" sz="1800" spc="-1" strike="noStrike">
+              <a:rPr b="0" lang="de-DE" sz="2000" spc="-1" strike="noStrike">
                 <a:solidFill>
                   <a:srgbClr val="000000"/>
                 </a:solidFill>
                 <a:latin typeface="Arial"/>
                 <a:ea typeface="DejaVu Sans"/>
               </a:rPr>
-              <a:t>60.000 € * 0,4 = 24.000 €</a:t>
+              <a:t>KT: 60.000 € * 0,4 = 24.000 €</a:t>
             </a:r>
-            <a:endParaRPr b="0" lang="de-DE" sz="1800" spc="-1" strike="noStrike">
+            <a:endParaRPr b="0" lang="de-DE" sz="2000" spc="-1" strike="noStrike">
               <a:latin typeface="Arial"/>
             </a:endParaRPr>
           </a:p>
@@ -5527,18 +6916,21 @@
               <a:lnSpc>
                 <a:spcPct val="100000"/>
               </a:lnSpc>
+              <a:spcBef>
+                <a:spcPts val="567"/>
+              </a:spcBef>
             </a:pPr>
             <a:r>
-              <a:rPr b="0" lang="de-DE" sz="1800" spc="-1" strike="noStrike">
+              <a:rPr b="0" lang="de-DE" sz="2000" spc="-1" strike="noStrike">
                 <a:solidFill>
                   <a:srgbClr val="000000"/>
                 </a:solidFill>
                 <a:latin typeface="Arial"/>
                 <a:ea typeface="DejaVu Sans"/>
               </a:rPr>
-              <a:t>60.000 € * 0,2 = 12.000 €</a:t>
+              <a:t>KD: 60.000 € * 0,2 = 12.000 €</a:t>
             </a:r>
-            <a:endParaRPr b="0" lang="de-DE" sz="1800" spc="-1" strike="noStrike">
+            <a:endParaRPr b="0" lang="de-DE" sz="2000" spc="-1" strike="noStrike">
               <a:latin typeface="Arial"/>
             </a:endParaRPr>
           </a:p>
@@ -5548,7 +6940,7 @@
                 <a:spcPct val="100000"/>
               </a:lnSpc>
             </a:pPr>
-            <a:endParaRPr b="0" lang="de-DE" sz="1800" spc="-1" strike="noStrike">
+            <a:endParaRPr b="0" lang="de-DE" sz="2000" spc="-1" strike="noStrike">
               <a:latin typeface="Arial"/>
             </a:endParaRPr>
           </a:p>
@@ -5558,7 +6950,7 @@
                 <a:spcPct val="100000"/>
               </a:lnSpc>
             </a:pPr>
-            <a:endParaRPr b="0" lang="de-DE" sz="1800" spc="-1" strike="noStrike">
+            <a:endParaRPr b="0" lang="de-DE" sz="2000" spc="-1" strike="noStrike">
               <a:latin typeface="Arial"/>
             </a:endParaRPr>
           </a:p>
@@ -5597,18 +6989,21 @@
               <a:lnSpc>
                 <a:spcPct val="100000"/>
               </a:lnSpc>
+              <a:spcBef>
+                <a:spcPts val="567"/>
+              </a:spcBef>
             </a:pPr>
             <a:r>
-              <a:rPr b="0" lang="de-DE" sz="1800" spc="-1" strike="noStrike">
+              <a:rPr b="0" lang="de-DE" sz="2000" spc="-1" strike="noStrike">
                 <a:solidFill>
                   <a:srgbClr val="000000"/>
                 </a:solidFill>
                 <a:latin typeface="Arial"/>
                 <a:ea typeface="DejaVu Sans"/>
               </a:rPr>
-              <a:t>16.000 € + 50.000 € + 24.000 € = 90.000 €</a:t>
+              <a:t>KT: 16.000 € + 50.000 € + 24.000 € = 90.000 €</a:t>
             </a:r>
-            <a:endParaRPr b="0" lang="de-DE" sz="1800" spc="-1" strike="noStrike">
+            <a:endParaRPr b="0" lang="de-DE" sz="2000" spc="-1" strike="noStrike">
               <a:latin typeface="Arial"/>
             </a:endParaRPr>
           </a:p>
@@ -5617,18 +7012,21 @@
               <a:lnSpc>
                 <a:spcPct val="100000"/>
               </a:lnSpc>
+              <a:spcBef>
+                <a:spcPts val="567"/>
+              </a:spcBef>
             </a:pPr>
             <a:r>
-              <a:rPr b="0" lang="de-DE" sz="1800" spc="-1" strike="noStrike">
+              <a:rPr b="0" lang="de-DE" sz="2000" spc="-1" strike="noStrike">
                 <a:solidFill>
                   <a:srgbClr val="000000"/>
                 </a:solidFill>
                 <a:latin typeface="Arial"/>
                 <a:ea typeface="DejaVu Sans"/>
               </a:rPr>
-              <a:t>8.000 € + 12.000 € = 20.000 €</a:t>
+              <a:t>KD: 8.000 € + 12.000 € = 20.000 €</a:t>
             </a:r>
-            <a:endParaRPr b="0" lang="de-DE" sz="1800" spc="-1" strike="noStrike">
+            <a:endParaRPr b="0" lang="de-DE" sz="2000" spc="-1" strike="noStrike">
               <a:latin typeface="Arial"/>
             </a:endParaRPr>
           </a:p>
@@ -5644,6 +7042,258 @@
       <p:transition/>
     </mc:Fallback>
   </mc:AlternateContent>
+  <p:timing>
+    <p:tnLst>
+      <p:par>
+        <p:cTn id="89" dur="indefinite" restart="never" nodeType="tmRoot">
+          <p:childTnLst>
+            <p:seq>
+              <p:cTn id="90" dur="indefinite" nodeType="mainSeq">
+                <p:childTnLst>
+                  <p:par>
+                    <p:cTn id="91" fill="hold">
+                      <p:stCondLst>
+                        <p:cond delay="indefinite"/>
+                      </p:stCondLst>
+                      <p:childTnLst>
+                        <p:par>
+                          <p:cTn id="92" fill="hold">
+                            <p:stCondLst>
+                              <p:cond delay="0"/>
+                            </p:stCondLst>
+                            <p:childTnLst>
+                              <p:par>
+                                <p:cTn id="93" nodeType="clickEffect" fill="hold" presetClass="entr" presetID="1">
+                                  <p:stCondLst>
+                                    <p:cond delay="0"/>
+                                  </p:stCondLst>
+                                  <p:childTnLst>
+                                    <p:set>
+                                      <p:cBhvr>
+                                        <p:cTn id="94" dur="1" fill="hold">
+                                          <p:stCondLst>
+                                            <p:cond delay="0"/>
+                                          </p:stCondLst>
+                                        </p:cTn>
+                                        <p:tgtEl>
+                                          <p:spTgt spid="114">
+                                            <p:txEl>
+                                              <p:pRg st="0" end="0"/>
+                                            </p:txEl>
+                                          </p:spTgt>
+                                        </p:tgtEl>
+                                        <p:attrNameLst>
+                                          <p:attrName>style.visibility</p:attrName>
+                                        </p:attrNameLst>
+                                      </p:cBhvr>
+                                      <p:to>
+                                        <p:strVal val="visible"/>
+                                      </p:to>
+                                    </p:set>
+                                  </p:childTnLst>
+                                </p:cTn>
+                              </p:par>
+                              <p:par>
+                                <p:cTn id="95" nodeType="withEffect" fill="hold" presetClass="entr" presetID="1">
+                                  <p:stCondLst>
+                                    <p:cond delay="0"/>
+                                  </p:stCondLst>
+                                  <p:childTnLst>
+                                    <p:set>
+                                      <p:cBhvr>
+                                        <p:cTn id="96" dur="1" fill="hold">
+                                          <p:stCondLst>
+                                            <p:cond delay="0"/>
+                                          </p:stCondLst>
+                                        </p:cTn>
+                                        <p:tgtEl>
+                                          <p:spTgt spid="114">
+                                            <p:txEl>
+                                              <p:pRg st="2" end="2"/>
+                                            </p:txEl>
+                                          </p:spTgt>
+                                        </p:tgtEl>
+                                        <p:attrNameLst>
+                                          <p:attrName>style.visibility</p:attrName>
+                                        </p:attrNameLst>
+                                      </p:cBhvr>
+                                      <p:to>
+                                        <p:strVal val="visible"/>
+                                      </p:to>
+                                    </p:set>
+                                  </p:childTnLst>
+                                </p:cTn>
+                              </p:par>
+                              <p:par>
+                                <p:cTn id="97" nodeType="withEffect" fill="hold" presetClass="entr" presetID="1">
+                                  <p:stCondLst>
+                                    <p:cond delay="0"/>
+                                  </p:stCondLst>
+                                  <p:childTnLst>
+                                    <p:set>
+                                      <p:cBhvr>
+                                        <p:cTn id="98" dur="1" fill="hold">
+                                          <p:stCondLst>
+                                            <p:cond delay="0"/>
+                                          </p:stCondLst>
+                                        </p:cTn>
+                                        <p:tgtEl>
+                                          <p:spTgt spid="114">
+                                            <p:txEl>
+                                              <p:pRg st="3" end="3"/>
+                                            </p:txEl>
+                                          </p:spTgt>
+                                        </p:tgtEl>
+                                        <p:attrNameLst>
+                                          <p:attrName>style.visibility</p:attrName>
+                                        </p:attrNameLst>
+                                      </p:cBhvr>
+                                      <p:to>
+                                        <p:strVal val="visible"/>
+                                      </p:to>
+                                    </p:set>
+                                  </p:childTnLst>
+                                </p:cTn>
+                              </p:par>
+                            </p:childTnLst>
+                          </p:cTn>
+                        </p:par>
+                      </p:childTnLst>
+                    </p:cTn>
+                  </p:par>
+                  <p:par>
+                    <p:cTn id="99" fill="hold">
+                      <p:stCondLst>
+                        <p:cond delay="indefinite"/>
+                      </p:stCondLst>
+                      <p:childTnLst>
+                        <p:par>
+                          <p:cTn id="100" fill="hold">
+                            <p:stCondLst>
+                              <p:cond delay="0"/>
+                            </p:stCondLst>
+                            <p:childTnLst>
+                              <p:par>
+                                <p:cTn id="101" nodeType="clickEffect" fill="hold" presetClass="entr" presetID="1">
+                                  <p:stCondLst>
+                                    <p:cond delay="0"/>
+                                  </p:stCondLst>
+                                  <p:childTnLst>
+                                    <p:set>
+                                      <p:cBhvr>
+                                        <p:cTn id="102" dur="1" fill="hold">
+                                          <p:stCondLst>
+                                            <p:cond delay="0"/>
+                                          </p:stCondLst>
+                                        </p:cTn>
+                                        <p:tgtEl>
+                                          <p:spTgt spid="114">
+                                            <p:txEl>
+                                              <p:pRg st="6" end="6"/>
+                                            </p:txEl>
+                                          </p:spTgt>
+                                        </p:tgtEl>
+                                        <p:attrNameLst>
+                                          <p:attrName>style.visibility</p:attrName>
+                                        </p:attrNameLst>
+                                      </p:cBhvr>
+                                      <p:to>
+                                        <p:strVal val="visible"/>
+                                      </p:to>
+                                    </p:set>
+                                  </p:childTnLst>
+                                </p:cTn>
+                              </p:par>
+                              <p:par>
+                                <p:cTn id="103" nodeType="withEffect" fill="hold" presetClass="entr" presetID="1">
+                                  <p:stCondLst>
+                                    <p:cond delay="0"/>
+                                  </p:stCondLst>
+                                  <p:childTnLst>
+                                    <p:set>
+                                      <p:cBhvr>
+                                        <p:cTn id="104" dur="1" fill="hold">
+                                          <p:stCondLst>
+                                            <p:cond delay="0"/>
+                                          </p:stCondLst>
+                                        </p:cTn>
+                                        <p:tgtEl>
+                                          <p:spTgt spid="114">
+                                            <p:txEl>
+                                              <p:pRg st="8" end="8"/>
+                                            </p:txEl>
+                                          </p:spTgt>
+                                        </p:tgtEl>
+                                        <p:attrNameLst>
+                                          <p:attrName>style.visibility</p:attrName>
+                                        </p:attrNameLst>
+                                      </p:cBhvr>
+                                      <p:to>
+                                        <p:strVal val="visible"/>
+                                      </p:to>
+                                    </p:set>
+                                  </p:childTnLst>
+                                </p:cTn>
+                              </p:par>
+                              <p:par>
+                                <p:cTn id="105" nodeType="withEffect" fill="hold" presetClass="entr" presetID="1">
+                                  <p:stCondLst>
+                                    <p:cond delay="0"/>
+                                  </p:stCondLst>
+                                  <p:childTnLst>
+                                    <p:set>
+                                      <p:cBhvr>
+                                        <p:cTn id="106" dur="1" fill="hold">
+                                          <p:stCondLst>
+                                            <p:cond delay="0"/>
+                                          </p:stCondLst>
+                                        </p:cTn>
+                                        <p:tgtEl>
+                                          <p:spTgt spid="114">
+                                            <p:txEl>
+                                              <p:pRg st="9" end="9"/>
+                                            </p:txEl>
+                                          </p:spTgt>
+                                        </p:tgtEl>
+                                        <p:attrNameLst>
+                                          <p:attrName>style.visibility</p:attrName>
+                                        </p:attrNameLst>
+                                      </p:cBhvr>
+                                      <p:to>
+                                        <p:strVal val="visible"/>
+                                      </p:to>
+                                    </p:set>
+                                  </p:childTnLst>
+                                </p:cTn>
+                              </p:par>
+                            </p:childTnLst>
+                          </p:cTn>
+                        </p:par>
+                      </p:childTnLst>
+                    </p:cTn>
+                  </p:par>
+                </p:childTnLst>
+              </p:cTn>
+              <p:prevCondLst>
+                <p:cond evt="onPrev">
+                  <p:tgtEl>
+                    <p:sldTgt/>
+                  </p:tgtEl>
+                </p:cond>
+              </p:prevCondLst>
+              <p:nextCondLst>
+                <p:cond evt="onNext">
+                  <p:tgtEl>
+                    <p:sldTgt/>
+                  </p:tgtEl>
+                </p:cond>
+              </p:nextCondLst>
+            </p:seq>
+          </p:childTnLst>
+        </p:cTn>
+      </p:par>
+    </p:tnLst>
+  </p:timing>
 </p:sld>
 </file>
 
@@ -5666,14 +7316,14 @@
       </p:grpSpPr>
       <p:sp>
         <p:nvSpPr>
-          <p:cNvPr id="114" name="CustomShape 1"/>
+          <p:cNvPr id="115" name="CustomShape 1"/>
           <p:cNvSpPr/>
           <p:nvPr/>
         </p:nvSpPr>
         <p:spPr>
           <a:xfrm>
             <a:off x="874800" y="343080"/>
-            <a:ext cx="7962480" cy="582120"/>
+            <a:ext cx="7962120" cy="581760"/>
           </a:xfrm>
           <a:prstGeom prst="rect">
             <a:avLst/>
@@ -5692,14 +7342,14 @@
       </p:sp>
       <p:sp>
         <p:nvSpPr>
-          <p:cNvPr id="115" name="CustomShape 2"/>
+          <p:cNvPr id="116" name="CustomShape 2"/>
           <p:cNvSpPr/>
           <p:nvPr/>
         </p:nvSpPr>
         <p:spPr>
           <a:xfrm>
             <a:off x="874800" y="1381680"/>
-            <a:ext cx="3893400" cy="3279600"/>
+            <a:ext cx="3893040" cy="3279240"/>
           </a:xfrm>
           <a:prstGeom prst="rect">
             <a:avLst/>
@@ -5718,14 +7368,14 @@
       </p:sp>
       <p:sp>
         <p:nvSpPr>
-          <p:cNvPr id="116" name="CustomShape 3"/>
+          <p:cNvPr id="117" name="CustomShape 3"/>
           <p:cNvSpPr/>
           <p:nvPr/>
         </p:nvSpPr>
         <p:spPr>
           <a:xfrm>
             <a:off x="874800" y="990360"/>
-            <a:ext cx="3893400" cy="325080"/>
+            <a:ext cx="3893040" cy="324720"/>
           </a:xfrm>
           <a:prstGeom prst="rect">
             <a:avLst/>
@@ -5744,14 +7394,14 @@
       </p:sp>
       <p:sp>
         <p:nvSpPr>
-          <p:cNvPr id="117" name="CustomShape 4"/>
+          <p:cNvPr id="118" name="CustomShape 4"/>
           <p:cNvSpPr/>
           <p:nvPr/>
         </p:nvSpPr>
         <p:spPr>
           <a:xfrm>
             <a:off x="4943520" y="1382400"/>
-            <a:ext cx="3897000" cy="3279600"/>
+            <a:ext cx="3896640" cy="3279240"/>
           </a:xfrm>
           <a:prstGeom prst="rect">
             <a:avLst/>
@@ -5770,14 +7420,14 @@
       </p:sp>
       <p:sp>
         <p:nvSpPr>
-          <p:cNvPr id="118" name="CustomShape 5"/>
+          <p:cNvPr id="119" name="CustomShape 5"/>
           <p:cNvSpPr/>
           <p:nvPr/>
         </p:nvSpPr>
         <p:spPr>
           <a:xfrm>
             <a:off x="4943520" y="990360"/>
-            <a:ext cx="3897000" cy="325080"/>
+            <a:ext cx="3896640" cy="324720"/>
           </a:xfrm>
           <a:prstGeom prst="rect">
             <a:avLst/>
@@ -5796,14 +7446,14 @@
       </p:sp>
       <p:sp>
         <p:nvSpPr>
-          <p:cNvPr id="119" name="CustomShape 6"/>
+          <p:cNvPr id="120" name="CustomShape 6"/>
           <p:cNvSpPr/>
           <p:nvPr/>
         </p:nvSpPr>
         <p:spPr>
           <a:xfrm>
             <a:off x="874800" y="343080"/>
-            <a:ext cx="7962480" cy="582120"/>
+            <a:ext cx="7962120" cy="581760"/>
           </a:xfrm>
           <a:prstGeom prst="rect">
             <a:avLst/>
@@ -5847,14 +7497,14 @@
       </p:sp>
       <p:sp>
         <p:nvSpPr>
-          <p:cNvPr id="120" name="CustomShape 7"/>
+          <p:cNvPr id="121" name="CustomShape 7"/>
           <p:cNvSpPr/>
           <p:nvPr/>
         </p:nvSpPr>
         <p:spPr>
           <a:xfrm>
             <a:off x="822960" y="1188720"/>
-            <a:ext cx="7130880" cy="1880640"/>
+            <a:ext cx="7130520" cy="1880280"/>
           </a:xfrm>
           <a:prstGeom prst="rect">
             <a:avLst/>
@@ -5918,7 +7568,7 @@
                 <a:latin typeface="Arial"/>
                 <a:ea typeface="DejaVu Sans"/>
               </a:rPr>
-              <a:t>- Kommanditisten haften maximal mit Höhe ihrer Kapitaleinlagen</a:t>
+              <a:t>- Komplementäre haften unbeschränkt</a:t>
             </a:r>
             <a:endParaRPr b="0" lang="de-DE" sz="1800" spc="-1" strike="noStrike">
               <a:latin typeface="Arial"/>
@@ -5948,7 +7598,7 @@
                 <a:latin typeface="Arial"/>
                 <a:ea typeface="DejaVu Sans"/>
               </a:rPr>
-              <a:t>- Komplementäre haften unbeschränkt</a:t>
+              <a:t>- Weitere Verluste → Verrechnung mit Gewinnen</a:t>
             </a:r>
             <a:endParaRPr b="0" lang="de-DE" sz="1800" spc="-1" strike="noStrike">
               <a:latin typeface="Arial"/>
@@ -5970,6 +7620,248 @@
                 <a:spcPct val="100000"/>
               </a:lnSpc>
             </a:pPr>
+            <a:r>
+              <a:rPr b="0" lang="de-DE" sz="1800" spc="-1" strike="noStrike">
+                <a:solidFill>
+                  <a:srgbClr val="000000"/>
+                </a:solidFill>
+                <a:latin typeface="Arial"/>
+                <a:ea typeface="DejaVu Sans"/>
+              </a:rPr>
+              <a:t>- Kommanditisten haften maximal mit Höhe ihrer Kapitaleinlagen</a:t>
+            </a:r>
+            <a:endParaRPr b="0" lang="de-DE" sz="1800" spc="-1" strike="noStrike">
+              <a:latin typeface="Arial"/>
+            </a:endParaRPr>
+          </a:p>
+          <a:p>
+            <a:pPr>
+              <a:lnSpc>
+                <a:spcPct val="100000"/>
+              </a:lnSpc>
+            </a:pPr>
+            <a:endParaRPr b="0" lang="de-DE" sz="1800" spc="-1" strike="noStrike">
+              <a:latin typeface="Arial"/>
+            </a:endParaRPr>
+          </a:p>
+          <a:p>
+            <a:pPr>
+              <a:lnSpc>
+                <a:spcPct val="100000"/>
+              </a:lnSpc>
+            </a:pPr>
+            <a:endParaRPr b="0" lang="de-DE" sz="1800" spc="-1" strike="noStrike">
+              <a:latin typeface="Arial"/>
+            </a:endParaRPr>
+          </a:p>
+          <a:p>
+            <a:pPr>
+              <a:lnSpc>
+                <a:spcPct val="100000"/>
+              </a:lnSpc>
+            </a:pPr>
+            <a:endParaRPr b="0" lang="de-DE" sz="1800" spc="-1" strike="noStrike">
+              <a:latin typeface="Arial"/>
+            </a:endParaRPr>
+          </a:p>
+          <a:p>
+            <a:pPr>
+              <a:lnSpc>
+                <a:spcPct val="100000"/>
+              </a:lnSpc>
+            </a:pPr>
+            <a:endParaRPr b="0" lang="de-DE" sz="1800" spc="-1" strike="noStrike">
+              <a:latin typeface="Arial"/>
+            </a:endParaRPr>
+          </a:p>
+          <a:p>
+            <a:pPr>
+              <a:lnSpc>
+                <a:spcPct val="100000"/>
+              </a:lnSpc>
+            </a:pPr>
+            <a:r>
+              <a:rPr b="0" lang="de-DE" sz="1800" spc="-1" strike="noStrike">
+                <a:solidFill>
+                  <a:srgbClr val="000000"/>
+                </a:solidFill>
+                <a:latin typeface="Arial"/>
+                <a:ea typeface="DejaVu Sans"/>
+              </a:rPr>
+              <a:t>          </a:t>
+            </a:r>
+            <a:endParaRPr b="0" lang="de-DE" sz="1800" spc="-1" strike="noStrike">
+              <a:latin typeface="Arial"/>
+            </a:endParaRPr>
+          </a:p>
+          <a:p>
+            <a:pPr>
+              <a:lnSpc>
+                <a:spcPct val="100000"/>
+              </a:lnSpc>
+            </a:pPr>
+            <a:r>
+              <a:rPr b="0" lang="de-DE" sz="1800" spc="-1" strike="noStrike">
+                <a:solidFill>
+                  <a:srgbClr val="000000"/>
+                </a:solidFill>
+                <a:latin typeface="Arial"/>
+                <a:ea typeface="DejaVu Sans"/>
+              </a:rPr>
+              <a:t>	</a:t>
+            </a:r>
+            <a:r>
+              <a:rPr b="0" lang="de-DE" sz="1800" spc="-1" strike="noStrike">
+                <a:solidFill>
+                  <a:srgbClr val="000000"/>
+                </a:solidFill>
+                <a:latin typeface="Arial"/>
+                <a:ea typeface="DejaVu Sans"/>
+              </a:rPr>
+              <a:t>     </a:t>
+            </a:r>
+            <a:endParaRPr b="0" lang="de-DE" sz="1800" spc="-1" strike="noStrike">
+              <a:latin typeface="Arial"/>
+            </a:endParaRPr>
+          </a:p>
+          <a:p>
+            <a:pPr>
+              <a:lnSpc>
+                <a:spcPct val="100000"/>
+              </a:lnSpc>
+            </a:pPr>
+            <a:endParaRPr b="0" lang="de-DE" sz="1800" spc="-1" strike="noStrike">
+              <a:latin typeface="Arial"/>
+            </a:endParaRPr>
+          </a:p>
+          <a:p>
+            <a:pPr>
+              <a:lnSpc>
+                <a:spcPct val="100000"/>
+              </a:lnSpc>
+            </a:pPr>
+            <a:endParaRPr b="0" lang="de-DE" sz="1800" spc="-1" strike="noStrike">
+              <a:latin typeface="Arial"/>
+            </a:endParaRPr>
+          </a:p>
+          <a:p>
+            <a:pPr>
+              <a:lnSpc>
+                <a:spcPct val="100000"/>
+              </a:lnSpc>
+            </a:pPr>
+            <a:endParaRPr b="0" lang="de-DE" sz="1800" spc="-1" strike="noStrike">
+              <a:latin typeface="Arial"/>
+            </a:endParaRPr>
+          </a:p>
+        </p:txBody>
+      </p:sp>
+      <p:sp>
+        <p:nvSpPr>
+          <p:cNvPr id="122" name="CustomShape 8"/>
+          <p:cNvSpPr/>
+          <p:nvPr/>
+        </p:nvSpPr>
+        <p:spPr>
+          <a:xfrm>
+            <a:off x="1008000" y="3456000"/>
+            <a:ext cx="564480" cy="215280"/>
+          </a:xfrm>
+          <a:custGeom>
+            <a:avLst/>
+            <a:gdLst/>
+            <a:ahLst/>
+            <a:rect l="l" t="t" r="r" b="b"/>
+            <a:pathLst>
+              <a:path w="1572" h="602">
+                <a:moveTo>
+                  <a:pt x="0" y="150"/>
+                </a:moveTo>
+                <a:lnTo>
+                  <a:pt x="1178" y="150"/>
+                </a:lnTo>
+                <a:lnTo>
+                  <a:pt x="1178" y="0"/>
+                </a:lnTo>
+                <a:lnTo>
+                  <a:pt x="1571" y="300"/>
+                </a:lnTo>
+                <a:lnTo>
+                  <a:pt x="1178" y="601"/>
+                </a:lnTo>
+                <a:lnTo>
+                  <a:pt x="1178" y="450"/>
+                </a:lnTo>
+                <a:lnTo>
+                  <a:pt x="0" y="450"/>
+                </a:lnTo>
+                <a:lnTo>
+                  <a:pt x="0" y="150"/>
+                </a:lnTo>
+              </a:path>
+            </a:pathLst>
+          </a:custGeom>
+          <a:solidFill>
+            <a:srgbClr val="02d35f"/>
+          </a:solidFill>
+          <a:ln>
+            <a:solidFill>
+              <a:srgbClr val="3465a4"/>
+            </a:solidFill>
+          </a:ln>
+        </p:spPr>
+        <p:style>
+          <a:lnRef idx="0"/>
+          <a:fillRef idx="0"/>
+          <a:effectRef idx="0"/>
+          <a:fontRef idx="minor"/>
+        </p:style>
+      </p:sp>
+      <p:sp>
+        <p:nvSpPr>
+          <p:cNvPr id="123" name="CustomShape 9"/>
+          <p:cNvSpPr/>
+          <p:nvPr/>
+        </p:nvSpPr>
+        <p:spPr>
+          <a:xfrm>
+            <a:off x="1728000" y="3384000"/>
+            <a:ext cx="4031640" cy="345960"/>
+          </a:xfrm>
+          <a:prstGeom prst="rect">
+            <a:avLst/>
+          </a:prstGeom>
+          <a:noFill/>
+          <a:ln>
+            <a:noFill/>
+          </a:ln>
+        </p:spPr>
+        <p:style>
+          <a:lnRef idx="0"/>
+          <a:fillRef idx="0"/>
+          <a:effectRef idx="0"/>
+          <a:fontRef idx="minor"/>
+        </p:style>
+        <p:txBody>
+          <a:bodyPr lIns="90000" rIns="90000" tIns="45000" bIns="45000">
+            <a:noAutofit/>
+          </a:bodyPr>
+          <a:p>
+            <a:pPr>
+              <a:lnSpc>
+                <a:spcPct val="100000"/>
+              </a:lnSpc>
+            </a:pPr>
+            <a:r>
+              <a:rPr b="0" lang="de-DE" sz="1800" spc="-1" strike="noStrike">
+                <a:solidFill>
+                  <a:srgbClr val="000000"/>
+                </a:solidFill>
+                <a:latin typeface="Arial"/>
+                <a:ea typeface="DejaVu Sans"/>
+              </a:rPr>
+              <a:t>Oft GmbH als Komplementär</a:t>
+            </a:r>
             <a:endParaRPr b="0" lang="de-DE" sz="1800" spc="-1" strike="noStrike">
               <a:latin typeface="Arial"/>
             </a:endParaRPr>

</xml_diff>